<commit_message>
Add Delta rules for ! and ~@ + Add ActiveVariables to Tableaux Node
</commit_message>
<xml_diff>
--- a/Documents/Slides/Week 6 - Semantic Tabeloux .pptx
+++ b/Documents/Slides/Week 6 - Semantic Tabeloux .pptx
@@ -312,7 +312,7 @@
               <a:pPr>
                 <a:defRPr/>
               </a:pPr>
-              <a:t>27-5-2020</a:t>
+              <a:t>25-6-2020</a:t>
             </a:fld>
             <a:endParaRPr lang="nl-NL"/>
           </a:p>
@@ -563,7 +563,7 @@
               <a:pPr>
                 <a:defRPr/>
               </a:pPr>
-              <a:t>27-5-2020</a:t>
+              <a:t>25-6-2020</a:t>
             </a:fld>
             <a:endParaRPr lang="en-US"/>
           </a:p>
@@ -1107,7 +1107,7 @@
               </a:pPr>
               <a:t>1</a:t>
             </a:fld>
-            <a:endParaRPr lang="en-US" altLang="nl-NL" smtClean="0"/>
+            <a:endParaRPr lang="en-US" altLang="nl-NL"/>
           </a:p>
         </p:txBody>
       </p:sp>
@@ -1162,7 +1162,7 @@
           <a:lstStyle/>
           <a:p>
             <a:pPr eaLnBrk="1" hangingPunct="1"/>
-            <a:endParaRPr lang="nl-NL" altLang="nl-NL" smtClean="0">
+            <a:endParaRPr lang="nl-NL" altLang="nl-NL">
               <a:latin typeface="Times New Roman" pitchFamily="18" charset="0"/>
             </a:endParaRPr>
           </a:p>
@@ -1337,9 +1337,9 @@
                   <a:spcPct val="0"/>
                 </a:spcBef>
               </a:pPr>
-              <a:t>27-5-2020</a:t>
+              <a:t>25-6-2020</a:t>
             </a:fld>
-            <a:endParaRPr lang="en-US" altLang="nl-NL" smtClean="0"/>
+            <a:endParaRPr lang="en-US" altLang="nl-NL"/>
           </a:p>
         </p:txBody>
       </p:sp>
@@ -1505,7 +1505,7 @@
                 <a:spcPct val="0"/>
               </a:spcBef>
             </a:pPr>
-            <a:endParaRPr lang="nl-NL" altLang="nl-NL" smtClean="0"/>
+            <a:endParaRPr lang="nl-NL" altLang="nl-NL"/>
           </a:p>
         </p:txBody>
       </p:sp>
@@ -1671,7 +1671,7 @@
                 <a:spcPct val="0"/>
               </a:spcBef>
             </a:pPr>
-            <a:endParaRPr lang="nl-NL" altLang="nl-NL" smtClean="0"/>
+            <a:endParaRPr lang="nl-NL" altLang="nl-NL"/>
           </a:p>
         </p:txBody>
       </p:sp>
@@ -1728,38 +1728,38 @@
           <a:lstStyle/>
           <a:p>
             <a:r>
-              <a:rPr lang="en-US" dirty="0" smtClean="0"/>
+              <a:rPr lang="en-US" dirty="0"/>
               <a:t>exercises:  </a:t>
             </a:r>
           </a:p>
           <a:p>
             <a:r>
-              <a:rPr lang="en-US" dirty="0" smtClean="0"/>
+              <a:rPr lang="en-US" dirty="0"/>
               <a:t>~(P &amp; ~P)</a:t>
             </a:r>
           </a:p>
           <a:p>
             <a:r>
-              <a:rPr lang="en-US" dirty="0" smtClean="0"/>
+              <a:rPr lang="en-US" dirty="0"/>
               <a:t>~(P &amp; </a:t>
             </a:r>
             <a:r>
-              <a:rPr lang="en-US" smtClean="0"/>
+              <a:rPr lang="en-US"/>
               <a:t>Q)</a:t>
             </a:r>
-            <a:endParaRPr lang="en-US" dirty="0" smtClean="0"/>
+            <a:endParaRPr lang="en-US" dirty="0"/>
           </a:p>
           <a:p>
             <a:r>
-              <a:rPr lang="en-US" dirty="0" smtClean="0"/>
+              <a:rPr lang="en-US" dirty="0"/>
               <a:t>~((P &amp; ~P)</a:t>
             </a:r>
             <a:r>
-              <a:rPr lang="en-US" baseline="0" dirty="0" smtClean="0"/>
+              <a:rPr lang="en-US" baseline="0" dirty="0"/>
               <a:t> | </a:t>
             </a:r>
             <a:r>
-              <a:rPr lang="en-US" dirty="0" smtClean="0"/>
+              <a:rPr lang="en-US" dirty="0"/>
               <a:t>(P &amp; Q))</a:t>
             </a:r>
           </a:p>
@@ -1782,15 +1782,15 @@
               <a:defRPr/>
             </a:pPr>
             <a:r>
-              <a:rPr lang="en-US" dirty="0" smtClean="0"/>
+              <a:rPr lang="en-US" dirty="0"/>
               <a:t>~((P &amp; ~P)</a:t>
             </a:r>
             <a:r>
-              <a:rPr lang="en-US" baseline="0" dirty="0" smtClean="0"/>
+              <a:rPr lang="en-US" baseline="0" dirty="0"/>
               <a:t> | </a:t>
             </a:r>
             <a:r>
-              <a:rPr lang="en-US" dirty="0" smtClean="0"/>
+              <a:rPr lang="en-US" dirty="0"/>
               <a:t>(Q &amp; ~Q))</a:t>
             </a:r>
           </a:p>
@@ -1844,7 +1844,7 @@
               <a:pPr>
                 <a:defRPr/>
               </a:pPr>
-              <a:t>27-5-2020</a:t>
+              <a:t>25-6-2020</a:t>
             </a:fld>
             <a:endParaRPr lang="en-US"/>
           </a:p>
@@ -1959,17 +1959,17 @@
           <a:lstStyle/>
           <a:p>
             <a:r>
-              <a:rPr lang="nl-NL" dirty="0" smtClean="0"/>
+              <a:rPr lang="nl-NL" dirty="0"/>
               <a:t>[in prefix: &gt;(&gt;(|(P,Q),R),|(&gt;(P,R),&gt;(Q,R))) ]</a:t>
             </a:r>
           </a:p>
           <a:p>
             <a:r>
-              <a:rPr lang="nl-NL" dirty="0" smtClean="0"/>
+              <a:rPr lang="nl-NL" dirty="0"/>
               <a:t>It seems that a </a:t>
             </a:r>
             <a:r>
-              <a:rPr lang="nl-NL" sz="1200" dirty="0" smtClean="0">
+              <a:rPr lang="nl-NL" sz="1200" dirty="0">
                 <a:latin typeface="Arial Unicode MS"/>
                 <a:ea typeface="Arial Unicode MS"/>
                 <a:cs typeface="Arial Unicode MS"/>
@@ -1977,7 +1977,7 @@
               <a:t>¬R disappears,</a:t>
             </a:r>
             <a:r>
-              <a:rPr lang="nl-NL" sz="1200" baseline="0" dirty="0" smtClean="0">
+              <a:rPr lang="nl-NL" sz="1200" baseline="0" dirty="0">
                 <a:latin typeface="Arial Unicode MS"/>
                 <a:ea typeface="Arial Unicode MS"/>
                 <a:cs typeface="Arial Unicode MS"/>
@@ -1985,7 +1985,7 @@
               <a:t> but that's not the case: they are SETS and there was already a </a:t>
             </a:r>
             <a:r>
-              <a:rPr lang="nl-NL" sz="1200" dirty="0" smtClean="0">
+              <a:rPr lang="nl-NL" sz="1200" dirty="0">
                 <a:latin typeface="Arial Unicode MS"/>
                 <a:ea typeface="Arial Unicode MS"/>
                 <a:cs typeface="Arial Unicode MS"/>
@@ -1994,7 +1994,7 @@
             </a:r>
           </a:p>
           <a:p>
-            <a:endParaRPr lang="en-US" sz="1200" dirty="0" smtClean="0">
+            <a:endParaRPr lang="en-US" sz="1200" dirty="0">
               <a:latin typeface="Arial Unicode MS"/>
               <a:ea typeface="Arial Unicode MS"/>
               <a:cs typeface="Arial Unicode MS"/>
@@ -2002,7 +2002,7 @@
           </a:p>
           <a:p>
             <a:r>
-              <a:rPr lang="en-US" sz="1200" dirty="0" smtClean="0">
+              <a:rPr lang="en-US" sz="1200" dirty="0">
                 <a:latin typeface="Arial Unicode MS"/>
                 <a:ea typeface="Arial Unicode MS"/>
                 <a:cs typeface="Arial Unicode MS"/>
@@ -2012,7 +2012,7 @@
           </a:p>
           <a:p>
             <a:r>
-              <a:rPr lang="en-US" sz="1200" dirty="0" smtClean="0">
+              <a:rPr lang="en-US" sz="1200" dirty="0">
                 <a:latin typeface="Arial Unicode MS"/>
                 <a:ea typeface="Arial Unicode MS"/>
                 <a:cs typeface="Arial Unicode MS"/>
@@ -2020,14 +2020,14 @@
               <a:t>|(P,~(P))	1</a:t>
             </a:r>
             <a:r>
-              <a:rPr lang="en-US" sz="1200" baseline="0" dirty="0" smtClean="0">
+              <a:rPr lang="en-US" sz="1200" baseline="0" dirty="0">
                 <a:latin typeface="Arial Unicode MS"/>
                 <a:ea typeface="Arial Unicode MS"/>
                 <a:cs typeface="Arial Unicode MS"/>
               </a:rPr>
               <a:t> leaf, closed</a:t>
             </a:r>
-            <a:endParaRPr lang="en-US" sz="1200" dirty="0" smtClean="0">
+            <a:endParaRPr lang="en-US" sz="1200" dirty="0">
               <a:latin typeface="Arial Unicode MS"/>
               <a:ea typeface="Arial Unicode MS"/>
               <a:cs typeface="Arial Unicode MS"/>
@@ -2035,7 +2035,7 @@
           </a:p>
           <a:p>
             <a:r>
-              <a:rPr lang="en-US" sz="1200" dirty="0" smtClean="0">
+              <a:rPr lang="en-US" sz="1200" dirty="0">
                 <a:latin typeface="Arial Unicode MS"/>
                 <a:ea typeface="Arial Unicode MS"/>
                 <a:cs typeface="Arial Unicode MS"/>
@@ -2043,14 +2043,14 @@
               <a:t>&amp;(P,~(P))	2 leaves,</a:t>
             </a:r>
             <a:r>
-              <a:rPr lang="en-US" sz="1200" baseline="0" dirty="0" smtClean="0">
+              <a:rPr lang="en-US" sz="1200" baseline="0" dirty="0">
                 <a:latin typeface="Arial Unicode MS"/>
                 <a:ea typeface="Arial Unicode MS"/>
                 <a:cs typeface="Arial Unicode MS"/>
               </a:rPr>
               <a:t> both not-closed</a:t>
             </a:r>
-            <a:endParaRPr lang="en-US" sz="1200" dirty="0" smtClean="0">
+            <a:endParaRPr lang="en-US" sz="1200" dirty="0">
               <a:latin typeface="Arial Unicode MS"/>
               <a:ea typeface="Arial Unicode MS"/>
               <a:cs typeface="Arial Unicode MS"/>
@@ -2058,7 +2058,7 @@
           </a:p>
           <a:p>
             <a:r>
-              <a:rPr lang="en-US" sz="1200" dirty="0" smtClean="0">
+              <a:rPr lang="en-US" sz="1200" dirty="0">
                 <a:latin typeface="Arial Unicode MS"/>
                 <a:ea typeface="Arial Unicode MS"/>
                 <a:cs typeface="Arial Unicode MS"/>
@@ -2066,7 +2066,7 @@
               <a:t>~(&gt;(|(P,~(P)),P))	2 leaves,</a:t>
             </a:r>
             <a:r>
-              <a:rPr lang="en-US" sz="1200" baseline="0" dirty="0" smtClean="0">
+              <a:rPr lang="en-US" sz="1200" baseline="0" dirty="0">
                 <a:latin typeface="Arial Unicode MS"/>
                 <a:ea typeface="Arial Unicode MS"/>
                 <a:cs typeface="Arial Unicode MS"/>
@@ -2076,7 +2076,7 @@
           </a:p>
           <a:p>
             <a:r>
-              <a:rPr lang="en-US" sz="1200" baseline="0" dirty="0" smtClean="0">
+              <a:rPr lang="en-US" sz="1200" baseline="0" dirty="0">
                 <a:latin typeface="Arial Unicode MS"/>
                 <a:ea typeface="Arial Unicode MS"/>
                 <a:cs typeface="Arial Unicode MS"/>
@@ -2086,7 +2086,7 @@
           </a:p>
           <a:p>
             <a:r>
-              <a:rPr lang="pt-BR" sz="1200" dirty="0" smtClean="0">
+              <a:rPr lang="pt-BR" sz="1200" dirty="0">
                 <a:latin typeface="Calibri" panose="020F0502020204030204" pitchFamily="34" charset="0"/>
                 <a:cs typeface="Calibri" panose="020F0502020204030204" pitchFamily="34" charset="0"/>
               </a:rPr>
@@ -2141,7 +2141,7 @@
               <a:pPr>
                 <a:defRPr/>
               </a:pPr>
-              <a:t>27-5-2020</a:t>
+              <a:t>25-6-2020</a:t>
             </a:fld>
             <a:endParaRPr lang="en-US"/>
           </a:p>
@@ -2256,23 +2256,23 @@
           <a:lstStyle/>
           <a:p>
             <a:r>
-              <a:rPr lang="en-US" dirty="0" smtClean="0"/>
+              <a:rPr lang="en-US" dirty="0"/>
               <a:t>&gt;(!x.(@y.(P(</a:t>
             </a:r>
             <a:r>
-              <a:rPr lang="en-US" dirty="0" err="1" smtClean="0"/>
+              <a:rPr lang="en-US" dirty="0" err="1"/>
               <a:t>x,y</a:t>
             </a:r>
             <a:r>
-              <a:rPr lang="en-US" dirty="0" smtClean="0"/>
+              <a:rPr lang="en-US" dirty="0"/>
               <a:t>))),@q.(!p.(P(</a:t>
             </a:r>
             <a:r>
-              <a:rPr lang="en-US" dirty="0" err="1" smtClean="0"/>
-              <a:t>p,q</a:t>
-            </a:r>
-            <a:r>
-              <a:rPr lang="en-US" dirty="0" smtClean="0"/>
+              <a:rPr lang="en-US" dirty="0" err="1"/>
+              <a:t>p,q,z</a:t>
+            </a:r>
+            <a:r>
+              <a:rPr lang="en-US" dirty="0"/>
               <a:t>))))</a:t>
             </a:r>
           </a:p>
@@ -2295,40 +2295,39 @@
               <a:defRPr/>
             </a:pPr>
             <a:r>
-              <a:rPr lang="en-US" dirty="0" smtClean="0"/>
+              <a:rPr lang="en-US" dirty="0"/>
               <a:t>&gt;(@q.(!p.(P(</a:t>
             </a:r>
             <a:r>
-              <a:rPr lang="en-US" dirty="0" err="1" smtClean="0"/>
+              <a:rPr lang="en-US" dirty="0" err="1"/>
               <a:t>p,q</a:t>
             </a:r>
             <a:r>
-              <a:rPr lang="en-US" dirty="0" smtClean="0"/>
+              <a:rPr lang="en-US" dirty="0"/>
               <a:t>))),!x.(@y.(P(</a:t>
             </a:r>
             <a:r>
-              <a:rPr lang="en-US" dirty="0" err="1" smtClean="0"/>
+              <a:rPr lang="en-US" dirty="0" err="1"/>
               <a:t>x,y</a:t>
             </a:r>
             <a:r>
-              <a:rPr lang="en-US" dirty="0" smtClean="0"/>
+              <a:rPr lang="en-US" dirty="0"/>
               <a:t>))))</a:t>
             </a:r>
           </a:p>
           <a:p>
             <a:r>
-              <a:rPr lang="en-US" dirty="0" smtClean="0"/>
+              <a:rPr lang="en-US" dirty="0"/>
               <a:t>@x.(!y.(P(</a:t>
             </a:r>
             <a:r>
-              <a:rPr lang="en-US" dirty="0" err="1" smtClean="0"/>
+              <a:rPr lang="en-US" dirty="0" err="1"/>
               <a:t>x,y</a:t>
             </a:r>
             <a:r>
-              <a:rPr lang="en-US" dirty="0" smtClean="0"/>
+              <a:rPr lang="en-US" dirty="0"/>
               <a:t>)))</a:t>
             </a:r>
-            <a:endParaRPr lang="en-US" dirty="0"/>
           </a:p>
         </p:txBody>
       </p:sp>
@@ -2377,7 +2376,7 @@
               <a:pPr>
                 <a:defRPr/>
               </a:pPr>
-              <a:t>27-5-2020</a:t>
+              <a:t>25-6-2020</a:t>
             </a:fld>
             <a:endParaRPr lang="en-US"/>
           </a:p>
@@ -2485,7 +2484,7 @@
           <a:lstStyle/>
           <a:p>
             <a:r>
-              <a:rPr lang="en-US" smtClean="0"/>
+              <a:rPr lang="en-US"/>
               <a:t>Titelstijl van model bewerken</a:t>
             </a:r>
             <a:endParaRPr lang="nl-NL"/>
@@ -2550,7 +2549,7 @@
           </a:lstStyle>
           <a:p>
             <a:r>
-              <a:rPr lang="en-US" smtClean="0"/>
+              <a:rPr lang="en-US"/>
               <a:t>Klik om de titelstijl van het model te bewerken</a:t>
             </a:r>
             <a:endParaRPr lang="nl-NL"/>
@@ -2679,7 +2678,7 @@
           <a:lstStyle/>
           <a:p>
             <a:r>
-              <a:rPr lang="en-US" smtClean="0"/>
+              <a:rPr lang="en-US"/>
               <a:t>Titelstijl van model bewerken</a:t>
             </a:r>
             <a:endParaRPr lang="nl-NL"/>
@@ -2703,35 +2702,35 @@
           <a:p>
             <a:pPr lvl="0"/>
             <a:r>
-              <a:rPr lang="en-US" smtClean="0"/>
+              <a:rPr lang="en-US"/>
               <a:t>Klik om de tekststijl van het model te bewerken</a:t>
             </a:r>
           </a:p>
           <a:p>
             <a:pPr lvl="1"/>
             <a:r>
-              <a:rPr lang="en-US" smtClean="0"/>
+              <a:rPr lang="en-US"/>
               <a:t>Tweede niveau</a:t>
             </a:r>
           </a:p>
           <a:p>
             <a:pPr lvl="2"/>
             <a:r>
-              <a:rPr lang="en-US" smtClean="0"/>
+              <a:rPr lang="en-US"/>
               <a:t>Derde niveau</a:t>
             </a:r>
           </a:p>
           <a:p>
             <a:pPr lvl="3"/>
             <a:r>
-              <a:rPr lang="en-US" smtClean="0"/>
+              <a:rPr lang="en-US"/>
               <a:t>Vierde niveau</a:t>
             </a:r>
           </a:p>
           <a:p>
             <a:pPr lvl="4"/>
             <a:r>
-              <a:rPr lang="en-US" smtClean="0"/>
+              <a:rPr lang="en-US"/>
               <a:t>Vijfde niveau</a:t>
             </a:r>
             <a:endParaRPr lang="nl-NL"/>
@@ -2869,7 +2868,7 @@
           </a:lstStyle>
           <a:p>
             <a:r>
-              <a:rPr lang="en-US" smtClean="0"/>
+              <a:rPr lang="en-US"/>
               <a:t>Titelstijl van model bewerken</a:t>
             </a:r>
             <a:endParaRPr lang="nl-NL"/>
@@ -2935,7 +2934,7 @@
           <a:p>
             <a:pPr lvl="0"/>
             <a:r>
-              <a:rPr lang="en-US" smtClean="0"/>
+              <a:rPr lang="en-US"/>
               <a:t>Klik om de tekststijl van het model te bewerken</a:t>
             </a:r>
           </a:p>
@@ -3068,15 +3067,15 @@
           <a:lstStyle/>
           <a:p>
             <a:r>
-              <a:rPr lang="en-US" dirty="0" err="1" smtClean="0"/>
+              <a:rPr lang="en-US" dirty="0" err="1"/>
               <a:t>Titelstijl</a:t>
             </a:r>
             <a:r>
-              <a:rPr lang="en-US" dirty="0" smtClean="0"/>
+              <a:rPr lang="en-US" dirty="0"/>
               <a:t> van model </a:t>
             </a:r>
             <a:r>
-              <a:rPr lang="en-US" dirty="0" err="1" smtClean="0"/>
+              <a:rPr lang="en-US" dirty="0" err="1"/>
               <a:t>bewerken</a:t>
             </a:r>
             <a:endParaRPr lang="nl-NL" dirty="0"/>
@@ -3133,35 +3132,35 @@
           <a:p>
             <a:pPr lvl="0"/>
             <a:r>
-              <a:rPr lang="en-US" smtClean="0"/>
+              <a:rPr lang="en-US"/>
               <a:t>Klik om de tekststijl van het model te bewerken</a:t>
             </a:r>
           </a:p>
           <a:p>
             <a:pPr lvl="1"/>
             <a:r>
-              <a:rPr lang="en-US" smtClean="0"/>
+              <a:rPr lang="en-US"/>
               <a:t>Tweede niveau</a:t>
             </a:r>
           </a:p>
           <a:p>
             <a:pPr lvl="2"/>
             <a:r>
-              <a:rPr lang="en-US" smtClean="0"/>
+              <a:rPr lang="en-US"/>
               <a:t>Derde niveau</a:t>
             </a:r>
           </a:p>
           <a:p>
             <a:pPr lvl="3"/>
             <a:r>
-              <a:rPr lang="en-US" smtClean="0"/>
+              <a:rPr lang="en-US"/>
               <a:t>Vierde niveau</a:t>
             </a:r>
           </a:p>
           <a:p>
             <a:pPr lvl="4"/>
             <a:r>
-              <a:rPr lang="en-US" smtClean="0"/>
+              <a:rPr lang="en-US"/>
               <a:t>Vijfde niveau</a:t>
             </a:r>
             <a:endParaRPr lang="nl-NL"/>
@@ -3218,35 +3217,35 @@
           <a:p>
             <a:pPr lvl="0"/>
             <a:r>
-              <a:rPr lang="en-US" smtClean="0"/>
+              <a:rPr lang="en-US"/>
               <a:t>Klik om de tekststijl van het model te bewerken</a:t>
             </a:r>
           </a:p>
           <a:p>
             <a:pPr lvl="1"/>
             <a:r>
-              <a:rPr lang="en-US" smtClean="0"/>
+              <a:rPr lang="en-US"/>
               <a:t>Tweede niveau</a:t>
             </a:r>
           </a:p>
           <a:p>
             <a:pPr lvl="2"/>
             <a:r>
-              <a:rPr lang="en-US" smtClean="0"/>
+              <a:rPr lang="en-US"/>
               <a:t>Derde niveau</a:t>
             </a:r>
           </a:p>
           <a:p>
             <a:pPr lvl="3"/>
             <a:r>
-              <a:rPr lang="en-US" smtClean="0"/>
+              <a:rPr lang="en-US"/>
               <a:t>Vierde niveau</a:t>
             </a:r>
           </a:p>
           <a:p>
             <a:pPr lvl="4"/>
             <a:r>
-              <a:rPr lang="en-US" smtClean="0"/>
+              <a:rPr lang="en-US"/>
               <a:t>Vijfde niveau</a:t>
             </a:r>
             <a:endParaRPr lang="nl-NL"/>
@@ -3380,15 +3379,15 @@
           <a:lstStyle/>
           <a:p>
             <a:r>
-              <a:rPr lang="en-US" dirty="0" err="1" smtClean="0"/>
+              <a:rPr lang="en-US" dirty="0" err="1"/>
               <a:t>Titelstijl</a:t>
             </a:r>
             <a:r>
-              <a:rPr lang="en-US" dirty="0" smtClean="0"/>
+              <a:rPr lang="en-US" dirty="0"/>
               <a:t> van model </a:t>
             </a:r>
             <a:r>
-              <a:rPr lang="en-US" dirty="0" err="1" smtClean="0"/>
+              <a:rPr lang="en-US" dirty="0" err="1"/>
               <a:t>bewerken</a:t>
             </a:r>
             <a:endParaRPr lang="nl-NL" dirty="0"/>
@@ -3596,7 +3595,7 @@
           </a:lstStyle>
           <a:p>
             <a:r>
-              <a:rPr lang="en-US" smtClean="0"/>
+              <a:rPr lang="en-US"/>
               <a:t>Titelstijl van model bewerken</a:t>
             </a:r>
             <a:endParaRPr lang="nl-NL"/>
@@ -3653,35 +3652,35 @@
           <a:p>
             <a:pPr lvl="0"/>
             <a:r>
-              <a:rPr lang="en-US" smtClean="0"/>
+              <a:rPr lang="en-US"/>
               <a:t>Klik om de tekststijl van het model te bewerken</a:t>
             </a:r>
           </a:p>
           <a:p>
             <a:pPr lvl="1"/>
             <a:r>
-              <a:rPr lang="en-US" smtClean="0"/>
+              <a:rPr lang="en-US"/>
               <a:t>Tweede niveau</a:t>
             </a:r>
           </a:p>
           <a:p>
             <a:pPr lvl="2"/>
             <a:r>
-              <a:rPr lang="en-US" smtClean="0"/>
+              <a:rPr lang="en-US"/>
               <a:t>Derde niveau</a:t>
             </a:r>
           </a:p>
           <a:p>
             <a:pPr lvl="3"/>
             <a:r>
-              <a:rPr lang="en-US" smtClean="0"/>
+              <a:rPr lang="en-US"/>
               <a:t>Vierde niveau</a:t>
             </a:r>
           </a:p>
           <a:p>
             <a:pPr lvl="4"/>
             <a:r>
-              <a:rPr lang="en-US" smtClean="0"/>
+              <a:rPr lang="en-US"/>
               <a:t>Vijfde niveau</a:t>
             </a:r>
             <a:endParaRPr lang="nl-NL"/>
@@ -3747,7 +3746,7 @@
           <a:p>
             <a:pPr lvl="0"/>
             <a:r>
-              <a:rPr lang="en-US" smtClean="0"/>
+              <a:rPr lang="en-US"/>
               <a:t>Klik om de tekststijl van het model te bewerken</a:t>
             </a:r>
           </a:p>
@@ -3884,7 +3883,7 @@
           </a:lstStyle>
           <a:p>
             <a:r>
-              <a:rPr lang="en-US" smtClean="0"/>
+              <a:rPr lang="en-US"/>
               <a:t>Titelstijl van model bewerken</a:t>
             </a:r>
             <a:endParaRPr lang="nl-NL"/>
@@ -4012,7 +4011,7 @@
           <a:p>
             <a:pPr lvl="0"/>
             <a:r>
-              <a:rPr lang="en-US" smtClean="0"/>
+              <a:rPr lang="en-US"/>
               <a:t>Klik om de tekststijl van het model te bewerken</a:t>
             </a:r>
           </a:p>
@@ -4184,7 +4183,7 @@
           <a:p>
             <a:pPr lvl="0"/>
             <a:r>
-              <a:rPr lang="en-US" altLang="nl-NL" smtClean="0"/>
+              <a:rPr lang="en-US" altLang="nl-NL"/>
               <a:t>Titelstijl van model bewerken</a:t>
             </a:r>
           </a:p>
@@ -4392,35 +4391,35 @@
           <a:p>
             <a:pPr lvl="0"/>
             <a:r>
-              <a:rPr lang="en-US" altLang="nl-NL" smtClean="0"/>
+              <a:rPr lang="en-US" altLang="nl-NL"/>
               <a:t>Klik om de tekststijl van het model te bewerken</a:t>
             </a:r>
           </a:p>
           <a:p>
             <a:pPr lvl="1"/>
             <a:r>
-              <a:rPr lang="en-US" altLang="nl-NL" smtClean="0"/>
+              <a:rPr lang="en-US" altLang="nl-NL"/>
               <a:t>Tweede niveau</a:t>
             </a:r>
           </a:p>
           <a:p>
             <a:pPr lvl="2"/>
             <a:r>
-              <a:rPr lang="en-US" altLang="nl-NL" smtClean="0"/>
+              <a:rPr lang="en-US" altLang="nl-NL"/>
               <a:t>Derde niveau</a:t>
             </a:r>
           </a:p>
           <a:p>
             <a:pPr lvl="3"/>
             <a:r>
-              <a:rPr lang="en-US" altLang="nl-NL" smtClean="0"/>
+              <a:rPr lang="en-US" altLang="nl-NL"/>
               <a:t>Vierde niveau</a:t>
             </a:r>
           </a:p>
           <a:p>
             <a:pPr lvl="4"/>
             <a:r>
-              <a:rPr lang="en-US" altLang="nl-NL" smtClean="0"/>
+              <a:rPr lang="en-US" altLang="nl-NL"/>
               <a:t>Vijfde niveau</a:t>
             </a:r>
           </a:p>
@@ -4439,13 +4438,6 @@
     <p:sldLayoutId id="2147483696" r:id="rId7"/>
     <p:sldLayoutId id="2147483697" r:id="rId8"/>
   </p:sldLayoutIdLst>
-  <p:timing>
-    <p:tnLst>
-      <p:par>
-        <p:cTn id="1" dur="indefinite" restart="never" nodeType="tmRoot"/>
-      </p:par>
-    </p:tnLst>
-  </p:timing>
   <p:hf hdr="0" dt="0"/>
   <p:txStyles>
     <p:titleStyle>
@@ -4933,7 +4925,7 @@
           <a:p>
             <a:pPr eaLnBrk="1" hangingPunct="1"/>
             <a:r>
-              <a:rPr lang="nl-NL" altLang="nl-NL" sz="3400" dirty="0" smtClean="0">
+              <a:rPr lang="nl-NL" altLang="nl-NL" sz="3400" dirty="0">
                 <a:solidFill>
                   <a:schemeClr val="bg1"/>
                 </a:solidFill>
@@ -5267,23 +5259,7 @@
                   <a:schemeClr val="bg1"/>
                 </a:solidFill>
               </a:rPr>
-              <a:t>Logic in </a:t>
-            </a:r>
-            <a:r>
-              <a:rPr lang="en-GB" altLang="nl-NL" sz="3700" b="1" dirty="0" smtClean="0">
-                <a:solidFill>
-                  <a:schemeClr val="bg1"/>
-                </a:solidFill>
-              </a:rPr>
-              <a:t>Professional Practice</a:t>
-            </a:r>
-            <a:r>
-              <a:rPr lang="en-GB" altLang="nl-NL" sz="3700" b="1" dirty="0">
-                <a:solidFill>
-                  <a:schemeClr val="bg1"/>
-                </a:solidFill>
-              </a:rPr>
-              <a:t>: </a:t>
+              <a:t>Logic in Professional Practice: </a:t>
             </a:r>
             <a:br>
               <a:rPr lang="en-GB" altLang="nl-NL" sz="3700" b="1" dirty="0">
@@ -5633,13 +5609,6 @@
   <p:clrMapOvr>
     <a:masterClrMapping/>
   </p:clrMapOvr>
-  <p:timing>
-    <p:tnLst>
-      <p:par>
-        <p:cTn id="1" dur="indefinite" restart="never" nodeType="tmRoot"/>
-      </p:par>
-    </p:tnLst>
-  </p:timing>
 </p:sld>
 </file>
 
@@ -5676,10 +5645,9 @@
           <a:lstStyle/>
           <a:p>
             <a:r>
-              <a:rPr lang="nl-NL" dirty="0" smtClean="0"/>
+              <a:rPr lang="nl-NL" dirty="0"/>
               <a:t>Tableau rules for quantifiers</a:t>
             </a:r>
-            <a:endParaRPr lang="nl-NL" dirty="0"/>
           </a:p>
         </p:txBody>
       </p:sp>
@@ -5926,7 +5894,7 @@
                 <a:defRPr/>
               </a:pPr>
               <a:r>
-                <a:rPr lang="nl-NL" sz="2400" kern="0" dirty="0" smtClean="0">
+                <a:rPr lang="nl-NL" sz="2400" kern="0" dirty="0">
                   <a:latin typeface="Arial Unicode MS"/>
                   <a:ea typeface="Arial Unicode MS"/>
                   <a:cs typeface="Arial Unicode MS"/>
@@ -5934,7 +5902,7 @@
                 <a:t>(∀</a:t>
               </a:r>
               <a:r>
-                <a:rPr lang="nl-NL" sz="2400" kern="0" dirty="0" err="1" smtClean="0">
+                <a:rPr lang="nl-NL" sz="2400" kern="0" dirty="0" err="1">
                   <a:latin typeface="Arial Unicode MS"/>
                   <a:ea typeface="Arial Unicode MS"/>
                   <a:cs typeface="Arial Unicode MS"/>
@@ -5942,7 +5910,7 @@
                 <a:t>x.P</a:t>
               </a:r>
               <a:r>
-                <a:rPr lang="nl-NL" sz="2400" kern="0" dirty="0" smtClean="0">
+                <a:rPr lang="nl-NL" sz="2400" kern="0" dirty="0">
                   <a:latin typeface="Arial Unicode MS"/>
                   <a:ea typeface="Arial Unicode MS"/>
                   <a:cs typeface="Arial Unicode MS"/>
@@ -6160,7 +6128,7 @@
                 <a:defRPr/>
               </a:pPr>
               <a:r>
-                <a:rPr lang="nl-NL" sz="2400" kern="0" dirty="0" smtClean="0">
+                <a:rPr lang="nl-NL" sz="2400" kern="0" dirty="0">
                   <a:latin typeface="Arial Unicode MS"/>
                   <a:ea typeface="Arial Unicode MS"/>
                   <a:cs typeface="Arial Unicode MS"/>
@@ -6168,7 +6136,7 @@
                 <a:t>(∀</a:t>
               </a:r>
               <a:r>
-                <a:rPr lang="nl-NL" sz="2400" kern="0" dirty="0" err="1" smtClean="0">
+                <a:rPr lang="nl-NL" sz="2400" kern="0" dirty="0" err="1">
                   <a:latin typeface="Arial Unicode MS"/>
                   <a:ea typeface="Arial Unicode MS"/>
                   <a:cs typeface="Arial Unicode MS"/>
@@ -6176,7 +6144,7 @@
                 <a:t>x.P</a:t>
               </a:r>
               <a:r>
-                <a:rPr lang="nl-NL" sz="2400" kern="0" dirty="0" smtClean="0">
+                <a:rPr lang="nl-NL" sz="2400" kern="0" dirty="0">
                   <a:latin typeface="Arial Unicode MS"/>
                   <a:ea typeface="Arial Unicode MS"/>
                   <a:cs typeface="Arial Unicode MS"/>
@@ -6184,10 +6152,9 @@
                 <a:t>)</a:t>
               </a:r>
               <a:r>
-                <a:rPr lang="nl-NL" sz="2400" kern="0" dirty="0" smtClean="0"/>
+                <a:rPr lang="nl-NL" sz="2400" kern="0" dirty="0"/>
                 <a:t>, P[x:=t]</a:t>
               </a:r>
-              <a:endParaRPr lang="nl-NL" sz="2400" kern="0" dirty="0"/>
             </a:p>
           </p:txBody>
         </p:sp>
@@ -6256,23 +6223,19 @@
             <a:lstStyle/>
             <a:p>
               <a:r>
-                <a:rPr lang="el-GR" dirty="0" smtClean="0">
+                <a:rPr lang="el-GR" dirty="0">
                   <a:latin typeface="Times New Roman"/>
                   <a:cs typeface="Times New Roman"/>
                 </a:rPr>
                 <a:t>γ</a:t>
               </a:r>
               <a:r>
-                <a:rPr lang="nl-NL" dirty="0" smtClean="0">
+                <a:rPr lang="nl-NL" dirty="0">
                   <a:latin typeface="Arial" panose="020B0604020202020204" pitchFamily="34" charset="0"/>
                   <a:cs typeface="Arial" panose="020B0604020202020204" pitchFamily="34" charset="0"/>
                 </a:rPr>
                 <a:t>-rules</a:t>
               </a:r>
-              <a:endParaRPr lang="nl-NL" dirty="0">
-                <a:latin typeface="Arial" panose="020B0604020202020204" pitchFamily="34" charset="0"/>
-                <a:cs typeface="Arial" panose="020B0604020202020204" pitchFamily="34" charset="0"/>
-              </a:endParaRPr>
             </a:p>
           </p:txBody>
         </p:sp>
@@ -6476,7 +6439,7 @@
                 <a:defRPr/>
               </a:pPr>
               <a:r>
-                <a:rPr lang="nl-NL" sz="2400" kern="0" dirty="0" smtClean="0">
+                <a:rPr lang="nl-NL" sz="2400" kern="0" dirty="0">
                   <a:latin typeface="Arial Unicode MS"/>
                   <a:ea typeface="Arial Unicode MS"/>
                   <a:cs typeface="Arial Unicode MS"/>
@@ -6484,7 +6447,7 @@
                 <a:t>¬(∃</a:t>
               </a:r>
               <a:r>
-                <a:rPr lang="nl-NL" sz="2400" kern="0" dirty="0" err="1" smtClean="0">
+                <a:rPr lang="nl-NL" sz="2400" kern="0" dirty="0" err="1">
                   <a:latin typeface="Arial Unicode MS"/>
                   <a:ea typeface="Arial Unicode MS"/>
                   <a:cs typeface="Arial Unicode MS"/>
@@ -6492,7 +6455,7 @@
                 <a:t>x.P</a:t>
               </a:r>
               <a:r>
-                <a:rPr lang="nl-NL" sz="2400" kern="0" dirty="0" smtClean="0">
+                <a:rPr lang="nl-NL" sz="2400" kern="0" dirty="0">
                   <a:latin typeface="Arial Unicode MS"/>
                   <a:ea typeface="Arial Unicode MS"/>
                   <a:cs typeface="Arial Unicode MS"/>
@@ -6709,7 +6672,7 @@
                 <a:defRPr/>
               </a:pPr>
               <a:r>
-                <a:rPr lang="nl-NL" sz="2400" kern="0" dirty="0" smtClean="0">
+                <a:rPr lang="nl-NL" sz="2400" kern="0" dirty="0">
                   <a:latin typeface="Arial Unicode MS"/>
                   <a:ea typeface="Arial Unicode MS"/>
                   <a:cs typeface="Arial Unicode MS"/>
@@ -6717,7 +6680,7 @@
                 <a:t>¬(∃</a:t>
               </a:r>
               <a:r>
-                <a:rPr lang="nl-NL" sz="2400" kern="0" dirty="0" err="1" smtClean="0">
+                <a:rPr lang="nl-NL" sz="2400" kern="0" dirty="0" err="1">
                   <a:latin typeface="Arial Unicode MS"/>
                   <a:ea typeface="Arial Unicode MS"/>
                   <a:cs typeface="Arial Unicode MS"/>
@@ -6725,7 +6688,7 @@
                 <a:t>x.P</a:t>
               </a:r>
               <a:r>
-                <a:rPr lang="nl-NL" sz="2400" kern="0" dirty="0" smtClean="0">
+                <a:rPr lang="nl-NL" sz="2400" kern="0" dirty="0">
                   <a:latin typeface="Arial Unicode MS"/>
                   <a:ea typeface="Arial Unicode MS"/>
                   <a:cs typeface="Arial Unicode MS"/>
@@ -6733,7 +6696,7 @@
                 <a:t>)</a:t>
               </a:r>
               <a:r>
-                <a:rPr lang="nl-NL" sz="2400" kern="0" dirty="0" smtClean="0"/>
+                <a:rPr lang="nl-NL" sz="2400" kern="0" dirty="0"/>
                 <a:t>, </a:t>
               </a:r>
               <a:r>
@@ -6745,10 +6708,9 @@
                 <a:t>¬</a:t>
               </a:r>
               <a:r>
-                <a:rPr lang="nl-NL" sz="2400" kern="0" dirty="0" smtClean="0"/>
+                <a:rPr lang="nl-NL" sz="2400" kern="0" dirty="0"/>
                 <a:t>P[x:=t]</a:t>
               </a:r>
-              <a:endParaRPr lang="nl-NL" sz="2400" kern="0" dirty="0"/>
             </a:p>
           </p:txBody>
         </p:sp>
@@ -6817,30 +6779,26 @@
             <a:lstStyle/>
             <a:p>
               <a:r>
-                <a:rPr lang="nl-NL" dirty="0" smtClean="0">
+                <a:rPr lang="nl-NL" dirty="0">
                   <a:latin typeface="Arial" panose="020B0604020202020204" pitchFamily="34" charset="0"/>
                   <a:cs typeface="Arial" panose="020B0604020202020204" pitchFamily="34" charset="0"/>
                 </a:rPr>
                 <a:t>for an </a:t>
               </a:r>
               <a:r>
-                <a:rPr lang="nl-NL" i="1" dirty="0" smtClean="0">
+                <a:rPr lang="nl-NL" i="1" dirty="0">
                   <a:latin typeface="Arial" panose="020B0604020202020204" pitchFamily="34" charset="0"/>
                   <a:cs typeface="Arial" panose="020B0604020202020204" pitchFamily="34" charset="0"/>
                 </a:rPr>
                 <a:t>existing</a:t>
               </a:r>
               <a:r>
-                <a:rPr lang="nl-NL" dirty="0" smtClean="0">
+                <a:rPr lang="nl-NL" dirty="0">
                   <a:latin typeface="Arial" panose="020B0604020202020204" pitchFamily="34" charset="0"/>
                   <a:cs typeface="Arial" panose="020B0604020202020204" pitchFamily="34" charset="0"/>
                 </a:rPr>
                 <a:t> variable t</a:t>
               </a:r>
-              <a:endParaRPr lang="nl-NL" dirty="0">
-                <a:latin typeface="Arial" panose="020B0604020202020204" pitchFamily="34" charset="0"/>
-                <a:cs typeface="Arial" panose="020B0604020202020204" pitchFamily="34" charset="0"/>
-              </a:endParaRPr>
             </a:p>
           </p:txBody>
         </p:sp>
@@ -6889,16 +6847,12 @@
                 <a:t>δ</a:t>
               </a:r>
               <a:r>
-                <a:rPr lang="nl-NL" dirty="0" smtClean="0">
+                <a:rPr lang="nl-NL" dirty="0">
                   <a:latin typeface="Arial" panose="020B0604020202020204" pitchFamily="34" charset="0"/>
                   <a:cs typeface="Arial" panose="020B0604020202020204" pitchFamily="34" charset="0"/>
                 </a:rPr>
                 <a:t>-rules</a:t>
               </a:r>
-              <a:endParaRPr lang="nl-NL" dirty="0">
-                <a:latin typeface="Arial" panose="020B0604020202020204" pitchFamily="34" charset="0"/>
-                <a:cs typeface="Arial" panose="020B0604020202020204" pitchFamily="34" charset="0"/>
-              </a:endParaRPr>
             </a:p>
           </p:txBody>
         </p:sp>
@@ -7118,7 +7072,7 @@
                 <a:t>x.P</a:t>
               </a:r>
               <a:r>
-                <a:rPr lang="nl-NL" sz="2400" kern="0" dirty="0" smtClean="0">
+                <a:rPr lang="nl-NL" sz="2400" kern="0" dirty="0">
                   <a:latin typeface="Arial Unicode MS"/>
                   <a:ea typeface="Arial Unicode MS"/>
                   <a:cs typeface="Arial Unicode MS"/>
@@ -7336,10 +7290,9 @@
                 <a:defRPr/>
               </a:pPr>
               <a:r>
-                <a:rPr lang="nl-NL" sz="2400" kern="0" dirty="0" smtClean="0"/>
+                <a:rPr lang="nl-NL" sz="2400" kern="0" dirty="0"/>
                 <a:t>P[x:=v]</a:t>
               </a:r>
-              <a:endParaRPr lang="nl-NL" sz="2400" kern="0" dirty="0"/>
             </a:p>
           </p:txBody>
         </p:sp>
@@ -7585,7 +7538,7 @@
                 <a:defRPr/>
               </a:pPr>
               <a:r>
-                <a:rPr lang="nl-NL" sz="2400" kern="0" dirty="0" smtClean="0">
+                <a:rPr lang="nl-NL" sz="2400" kern="0" dirty="0">
                   <a:latin typeface="Arial Unicode MS"/>
                   <a:ea typeface="Arial Unicode MS"/>
                   <a:cs typeface="Arial Unicode MS"/>
@@ -7593,7 +7546,7 @@
                 <a:t>¬(∀</a:t>
               </a:r>
               <a:r>
-                <a:rPr lang="nl-NL" sz="2400" kern="0" dirty="0" err="1" smtClean="0">
+                <a:rPr lang="nl-NL" sz="2400" kern="0" dirty="0" err="1">
                   <a:latin typeface="Arial Unicode MS"/>
                   <a:ea typeface="Arial Unicode MS"/>
                   <a:cs typeface="Arial Unicode MS"/>
@@ -7601,7 +7554,7 @@
                 <a:t>x.P</a:t>
               </a:r>
               <a:r>
-                <a:rPr lang="nl-NL" sz="2400" kern="0" dirty="0" smtClean="0">
+                <a:rPr lang="nl-NL" sz="2400" kern="0" dirty="0">
                   <a:latin typeface="Arial Unicode MS"/>
                   <a:ea typeface="Arial Unicode MS"/>
                   <a:cs typeface="Arial Unicode MS"/>
@@ -7818,7 +7771,7 @@
                 <a:defRPr/>
               </a:pPr>
               <a:r>
-                <a:rPr lang="nl-NL" sz="2400" kern="0" dirty="0" smtClean="0">
+                <a:rPr lang="nl-NL" sz="2400" kern="0" dirty="0">
                   <a:latin typeface="Arial Unicode MS"/>
                   <a:ea typeface="Arial Unicode MS"/>
                   <a:cs typeface="Arial Unicode MS"/>
@@ -7826,10 +7779,9 @@
                 <a:t>¬</a:t>
               </a:r>
               <a:r>
-                <a:rPr lang="nl-NL" sz="2400" kern="0" dirty="0" smtClean="0"/>
+                <a:rPr lang="nl-NL" sz="2400" kern="0" dirty="0"/>
                 <a:t>P[x:=v]</a:t>
               </a:r>
-              <a:endParaRPr lang="nl-NL" sz="2400" kern="0" dirty="0"/>
             </a:p>
           </p:txBody>
         </p:sp>
@@ -7898,30 +7850,26 @@
             <a:lstStyle/>
             <a:p>
               <a:r>
-                <a:rPr lang="nl-NL" dirty="0" smtClean="0">
+                <a:rPr lang="nl-NL" dirty="0">
                   <a:latin typeface="Arial" panose="020B0604020202020204" pitchFamily="34" charset="0"/>
                   <a:cs typeface="Arial" panose="020B0604020202020204" pitchFamily="34" charset="0"/>
                 </a:rPr>
                 <a:t>for a </a:t>
               </a:r>
               <a:r>
-                <a:rPr lang="nl-NL" i="1" dirty="0" smtClean="0">
+                <a:rPr lang="nl-NL" i="1" dirty="0">
                   <a:latin typeface="Arial" panose="020B0604020202020204" pitchFamily="34" charset="0"/>
                   <a:cs typeface="Arial" panose="020B0604020202020204" pitchFamily="34" charset="0"/>
                 </a:rPr>
                 <a:t>new</a:t>
               </a:r>
               <a:r>
-                <a:rPr lang="nl-NL" dirty="0" smtClean="0">
+                <a:rPr lang="nl-NL" dirty="0">
                   <a:latin typeface="Arial" panose="020B0604020202020204" pitchFamily="34" charset="0"/>
                   <a:cs typeface="Arial" panose="020B0604020202020204" pitchFamily="34" charset="0"/>
                 </a:rPr>
                 <a:t> variable v</a:t>
               </a:r>
-              <a:endParaRPr lang="nl-NL" dirty="0">
-                <a:latin typeface="Arial" panose="020B0604020202020204" pitchFamily="34" charset="0"/>
-                <a:cs typeface="Arial" panose="020B0604020202020204" pitchFamily="34" charset="0"/>
-              </a:endParaRPr>
             </a:p>
           </p:txBody>
         </p:sp>
@@ -7936,13 +7884,6 @@
   <p:clrMapOvr>
     <a:masterClrMapping/>
   </p:clrMapOvr>
-  <p:timing>
-    <p:tnLst>
-      <p:par>
-        <p:cTn id="1" dur="indefinite" restart="never" nodeType="tmRoot"/>
-      </p:par>
-    </p:tnLst>
-  </p:timing>
 </p:sld>
 </file>
 
@@ -7979,7 +7920,7 @@
           <a:lstStyle/>
           <a:p>
             <a:r>
-              <a:rPr lang="en-US" dirty="0" smtClean="0"/>
+              <a:rPr lang="en-US" dirty="0"/>
               <a:t>the new rules</a:t>
             </a:r>
             <a:endParaRPr lang="nl-NL" dirty="0"/>
@@ -8006,18 +7947,18 @@
               <a:buChar char="q"/>
             </a:pPr>
             <a:r>
-              <a:rPr lang="nl-NL" sz="2400" dirty="0" smtClean="0"/>
+              <a:rPr lang="nl-NL" sz="2400" dirty="0"/>
               <a:t>because </a:t>
             </a:r>
             <a:r>
-              <a:rPr lang="el-GR" sz="2400" dirty="0" smtClean="0">
+              <a:rPr lang="el-GR" sz="2400" dirty="0">
                 <a:latin typeface="Times New Roman"/>
                 <a:cs typeface="Times New Roman"/>
               </a:rPr>
               <a:t>γ</a:t>
             </a:r>
             <a:r>
-              <a:rPr lang="nl-NL" sz="2400" dirty="0" smtClean="0">
+              <a:rPr lang="nl-NL" sz="2400" dirty="0">
                 <a:latin typeface="Arial" panose="020B0604020202020204" pitchFamily="34" charset="0"/>
                 <a:cs typeface="Arial" panose="020B0604020202020204" pitchFamily="34" charset="0"/>
               </a:rPr>
@@ -8030,7 +7971,7 @@
               <a:buChar char="q"/>
             </a:pPr>
             <a:r>
-              <a:rPr lang="nl-NL" sz="2400" dirty="0" smtClean="0">
+              <a:rPr lang="nl-NL" sz="2400" dirty="0">
                 <a:latin typeface="Arial" panose="020B0604020202020204" pitchFamily="34" charset="0"/>
                 <a:cs typeface="Arial" panose="020B0604020202020204" pitchFamily="34" charset="0"/>
               </a:rPr>
@@ -8043,13 +7984,13 @@
               <a:buChar char="q"/>
             </a:pPr>
             <a:r>
-              <a:rPr lang="en-US" sz="2400" dirty="0" smtClean="0">
+              <a:rPr lang="en-US" sz="2400" dirty="0">
                 <a:latin typeface="Arial" panose="020B0604020202020204" pitchFamily="34" charset="0"/>
                 <a:cs typeface="Arial" panose="020B0604020202020204" pitchFamily="34" charset="0"/>
               </a:rPr>
               <a:t>if implemented correctly, proving tautologies will end (although it might take thousands of years…)</a:t>
             </a:r>
-            <a:endParaRPr lang="nl-NL" sz="2400" dirty="0" smtClean="0">
+            <a:endParaRPr lang="nl-NL" sz="2400" dirty="0">
               <a:latin typeface="Arial" panose="020B0604020202020204" pitchFamily="34" charset="0"/>
               <a:cs typeface="Arial" panose="020B0604020202020204" pitchFamily="34" charset="0"/>
             </a:endParaRPr>
@@ -8060,16 +8001,12 @@
               <a:buChar char="q"/>
             </a:pPr>
             <a:r>
-              <a:rPr lang="nl-NL" sz="2400" dirty="0" smtClean="0">
+              <a:rPr lang="nl-NL" sz="2400" dirty="0">
                 <a:latin typeface="Arial" panose="020B0604020202020204" pitchFamily="34" charset="0"/>
                 <a:cs typeface="Arial" panose="020B0604020202020204" pitchFamily="34" charset="0"/>
               </a:rPr>
               <a:t>this is called: semi-decidability (if a formula is a tautology, the method finishes in a finite amount of time, but you can't prove it for any formula)</a:t>
             </a:r>
-            <a:endParaRPr lang="nl-NL" sz="2400" dirty="0">
-              <a:latin typeface="Arial" panose="020B0604020202020204" pitchFamily="34" charset="0"/>
-              <a:cs typeface="Arial" panose="020B0604020202020204" pitchFamily="34" charset="0"/>
-            </a:endParaRPr>
           </a:p>
         </p:txBody>
       </p:sp>
@@ -8112,13 +8049,6 @@
   <p:clrMapOvr>
     <a:masterClrMapping/>
   </p:clrMapOvr>
-  <p:timing>
-    <p:tnLst>
-      <p:par>
-        <p:cTn id="1" dur="indefinite" restart="never" nodeType="tmRoot"/>
-      </p:par>
-    </p:tnLst>
-  </p:timing>
 </p:sld>
 </file>
 
@@ -8155,10 +8085,9 @@
           <a:lstStyle/>
           <a:p>
             <a:r>
-              <a:rPr lang="nl-NL" dirty="0" smtClean="0"/>
+              <a:rPr lang="nl-NL" dirty="0"/>
               <a:t>implement tableaux with quantifiers</a:t>
             </a:r>
-            <a:endParaRPr lang="nl-NL" dirty="0"/>
           </a:p>
         </p:txBody>
       </p:sp>
@@ -8182,7 +8111,7 @@
               <a:buChar char="q"/>
             </a:pPr>
             <a:r>
-              <a:rPr lang="nl-NL" dirty="0" smtClean="0"/>
+              <a:rPr lang="nl-NL" dirty="0"/>
               <a:t>only formulas with bound variables </a:t>
             </a:r>
           </a:p>
@@ -8192,7 +8121,7 @@
               <a:buChar char="q"/>
             </a:pPr>
             <a:r>
-              <a:rPr lang="nl-NL" dirty="0" smtClean="0"/>
+              <a:rPr lang="nl-NL" dirty="0"/>
               <a:t>in each node: keep track of active variables (so initially: none)</a:t>
             </a:r>
           </a:p>
@@ -8202,7 +8131,7 @@
               <a:buChar char="q"/>
             </a:pPr>
             <a:r>
-              <a:rPr lang="nl-NL" dirty="0" smtClean="0"/>
+              <a:rPr lang="nl-NL" dirty="0"/>
               <a:t>apply the rules with priority: </a:t>
             </a:r>
           </a:p>
@@ -8212,7 +8141,7 @@
               <a:buAutoNum type="arabicPeriod"/>
             </a:pPr>
             <a:r>
-              <a:rPr lang="el-GR" dirty="0" smtClean="0">
+              <a:rPr lang="el-GR" dirty="0">
                 <a:latin typeface="Times New Roman"/>
                 <a:cs typeface="Times New Roman"/>
               </a:rPr>
@@ -8229,13 +8158,13 @@
               <a:buAutoNum type="arabicPeriod"/>
             </a:pPr>
             <a:r>
-              <a:rPr lang="el-GR" dirty="0" smtClean="0">
+              <a:rPr lang="el-GR" dirty="0">
                 <a:latin typeface="Times New Roman"/>
                 <a:cs typeface="Times New Roman"/>
               </a:rPr>
               <a:t>δ</a:t>
             </a:r>
-            <a:endParaRPr lang="nl-NL" dirty="0" smtClean="0">
+            <a:endParaRPr lang="nl-NL" dirty="0">
               <a:latin typeface="Arial" panose="020B0604020202020204" pitchFamily="34" charset="0"/>
               <a:cs typeface="Arial" panose="020B0604020202020204" pitchFamily="34" charset="0"/>
             </a:endParaRPr>
@@ -8246,14 +8175,14 @@
               <a:buAutoNum type="arabicPeriod"/>
             </a:pPr>
             <a:r>
-              <a:rPr lang="el-GR" dirty="0" smtClean="0">
+              <a:rPr lang="el-GR" dirty="0">
                 <a:latin typeface="Times New Roman"/>
                 <a:cs typeface="Times New Roman"/>
               </a:rPr>
               <a:t>β</a:t>
             </a:r>
             <a:r>
-              <a:rPr lang="nl-NL" dirty="0" smtClean="0">
+              <a:rPr lang="nl-NL" dirty="0">
                 <a:latin typeface="Arial" panose="020B0604020202020204" pitchFamily="34" charset="0"/>
                 <a:cs typeface="Arial" panose="020B0604020202020204" pitchFamily="34" charset="0"/>
               </a:rPr>
@@ -8266,20 +8195,20 @@
               <a:buAutoNum type="arabicPeriod"/>
             </a:pPr>
             <a:r>
-              <a:rPr lang="nl-NL" dirty="0" smtClean="0">
+              <a:rPr lang="nl-NL" dirty="0">
                 <a:latin typeface="Arial" panose="020B0604020202020204" pitchFamily="34" charset="0"/>
                 <a:cs typeface="Arial" panose="020B0604020202020204" pitchFamily="34" charset="0"/>
               </a:rPr>
               <a:t>(finally) </a:t>
             </a:r>
             <a:r>
-              <a:rPr lang="el-GR" dirty="0" smtClean="0">
+              <a:rPr lang="el-GR" dirty="0">
                 <a:latin typeface="Times New Roman"/>
                 <a:cs typeface="Times New Roman"/>
               </a:rPr>
               <a:t>γ</a:t>
             </a:r>
-            <a:endParaRPr lang="nl-NL" dirty="0" smtClean="0">
+            <a:endParaRPr lang="nl-NL" dirty="0">
               <a:latin typeface="Arial" panose="020B0604020202020204" pitchFamily="34" charset="0"/>
               <a:cs typeface="Arial" panose="020B0604020202020204" pitchFamily="34" charset="0"/>
             </a:endParaRPr>
@@ -8335,13 +8264,6 @@
   <p:clrMapOvr>
     <a:masterClrMapping/>
   </p:clrMapOvr>
-  <p:timing>
-    <p:tnLst>
-      <p:par>
-        <p:cTn id="1" dur="indefinite" restart="never" nodeType="tmRoot"/>
-      </p:par>
-    </p:tnLst>
-  </p:timing>
 </p:sld>
 </file>
 
@@ -8378,21 +8300,20 @@
           <a:lstStyle/>
           <a:p>
             <a:r>
-              <a:rPr lang="nl-NL" dirty="0" smtClean="0"/>
+              <a:rPr lang="nl-NL" dirty="0"/>
               <a:t>apply the </a:t>
             </a:r>
             <a:r>
-              <a:rPr lang="el-GR" dirty="0" smtClean="0">
+              <a:rPr lang="el-GR" dirty="0">
                 <a:latin typeface="Times New Roman"/>
                 <a:cs typeface="Times New Roman"/>
               </a:rPr>
               <a:t>γ </a:t>
             </a:r>
             <a:r>
-              <a:rPr lang="nl-NL" dirty="0" smtClean="0"/>
+              <a:rPr lang="nl-NL" dirty="0"/>
               <a:t>rule</a:t>
             </a:r>
-            <a:endParaRPr lang="nl-NL" dirty="0"/>
           </a:p>
         </p:txBody>
       </p:sp>
@@ -8416,7 +8337,7 @@
               <a:buChar char="q"/>
             </a:pPr>
             <a:r>
-              <a:rPr lang="nl-NL" sz="2400" dirty="0" smtClean="0">
+              <a:rPr lang="nl-NL" sz="2400" dirty="0">
                 <a:latin typeface="Arial" panose="020B0604020202020204" pitchFamily="34" charset="0"/>
                 <a:cs typeface="Arial" panose="020B0604020202020204" pitchFamily="34" charset="0"/>
               </a:rPr>
@@ -8427,24 +8348,17 @@
                 <a:latin typeface="Times New Roman"/>
                 <a:cs typeface="Times New Roman"/>
               </a:rPr>
-              <a:t>δ</a:t>
-            </a:r>
-            <a:r>
-              <a:rPr lang="el-GR" sz="2400" dirty="0" smtClean="0">
-                <a:latin typeface="Times New Roman"/>
-                <a:cs typeface="Times New Roman"/>
-              </a:rPr>
-              <a:t> </a:t>
-            </a:r>
-            <a:r>
-              <a:rPr lang="nl-NL" sz="2400" dirty="0" smtClean="0">
+              <a:t>δ </a:t>
+            </a:r>
+            <a:r>
+              <a:rPr lang="nl-NL" sz="2400" dirty="0">
                 <a:latin typeface="Arial" panose="020B0604020202020204" pitchFamily="34" charset="0"/>
                 <a:cs typeface="Arial" panose="020B0604020202020204" pitchFamily="34" charset="0"/>
               </a:rPr>
               <a:t>rule </a:t>
             </a:r>
             <a:r>
-              <a:rPr lang="nl-NL" sz="2800" dirty="0" smtClean="0">
+              <a:rPr lang="nl-NL" sz="2800" dirty="0">
                 <a:latin typeface="Arial" panose="020B0604020202020204" pitchFamily="34" charset="0"/>
                 <a:cs typeface="Arial" panose="020B0604020202020204" pitchFamily="34" charset="0"/>
               </a:rPr>
@@ -8457,34 +8371,34 @@
               <a:buChar char="q"/>
             </a:pPr>
             <a:r>
-              <a:rPr lang="nl-NL" sz="2800" dirty="0" smtClean="0">
+              <a:rPr lang="nl-NL" sz="2800" dirty="0">
                 <a:latin typeface="Arial" panose="020B0604020202020204" pitchFamily="34" charset="0"/>
                 <a:cs typeface="Arial" panose="020B0604020202020204" pitchFamily="34" charset="0"/>
               </a:rPr>
               <a:t>the </a:t>
             </a:r>
             <a:r>
-              <a:rPr lang="el-GR" sz="2800" dirty="0" smtClean="0">
+              <a:rPr lang="el-GR" sz="2800" dirty="0">
                 <a:latin typeface="Times New Roman"/>
                 <a:cs typeface="Times New Roman"/>
               </a:rPr>
               <a:t>γ </a:t>
             </a:r>
             <a:r>
-              <a:rPr lang="nl-NL" sz="2800" dirty="0" smtClean="0">
+              <a:rPr lang="nl-NL" sz="2800" dirty="0">
                 <a:latin typeface="Arial" panose="020B0604020202020204" pitchFamily="34" charset="0"/>
                 <a:cs typeface="Arial" panose="020B0604020202020204" pitchFamily="34" charset="0"/>
               </a:rPr>
               <a:t>rule: apply all existing variables on a formula</a:t>
             </a:r>
             <a:br>
-              <a:rPr lang="nl-NL" sz="2800" dirty="0" smtClean="0">
+              <a:rPr lang="nl-NL" sz="2800" dirty="0">
                 <a:latin typeface="Arial" panose="020B0604020202020204" pitchFamily="34" charset="0"/>
                 <a:cs typeface="Arial" panose="020B0604020202020204" pitchFamily="34" charset="0"/>
               </a:rPr>
             </a:br>
             <a:r>
-              <a:rPr lang="nl-NL" sz="2800" dirty="0" smtClean="0">
+              <a:rPr lang="nl-NL" sz="2800" dirty="0">
                 <a:latin typeface="Arial" panose="020B0604020202020204" pitchFamily="34" charset="0"/>
                 <a:cs typeface="Arial" panose="020B0604020202020204" pitchFamily="34" charset="0"/>
               </a:rPr>
@@ -8497,7 +8411,7 @@
               <a:buChar char="q"/>
             </a:pPr>
             <a:r>
-              <a:rPr lang="nl-NL" sz="2800" dirty="0" smtClean="0">
+              <a:rPr lang="nl-NL" sz="2800" dirty="0">
                 <a:latin typeface="Arial" panose="020B0604020202020204" pitchFamily="34" charset="0"/>
                 <a:cs typeface="Arial" panose="020B0604020202020204" pitchFamily="34" charset="0"/>
               </a:rPr>
@@ -8518,28 +8432,28 @@
               <a:t>, </a:t>
             </a:r>
             <a:r>
-              <a:rPr lang="el-GR" sz="2800" dirty="0" smtClean="0">
+              <a:rPr lang="el-GR" sz="2800" dirty="0">
                 <a:latin typeface="Times New Roman"/>
                 <a:cs typeface="Times New Roman"/>
               </a:rPr>
               <a:t>β</a:t>
             </a:r>
             <a:r>
-              <a:rPr lang="nl-NL" sz="2800" dirty="0" smtClean="0">
+              <a:rPr lang="nl-NL" sz="2800" dirty="0">
                 <a:latin typeface="Arial" panose="020B0604020202020204" pitchFamily="34" charset="0"/>
                 <a:cs typeface="Arial" panose="020B0604020202020204" pitchFamily="34" charset="0"/>
               </a:rPr>
               <a:t> and </a:t>
             </a:r>
             <a:r>
-              <a:rPr lang="el-GR" sz="2800" dirty="0" smtClean="0">
+              <a:rPr lang="el-GR" sz="2800" dirty="0">
                 <a:latin typeface="Times New Roman"/>
                 <a:cs typeface="Times New Roman"/>
               </a:rPr>
               <a:t>δ</a:t>
             </a:r>
             <a:r>
-              <a:rPr lang="nl-NL" sz="2800" dirty="0" smtClean="0">
+              <a:rPr lang="nl-NL" sz="2800" dirty="0">
                 <a:latin typeface="Arial" panose="020B0604020202020204" pitchFamily="34" charset="0"/>
                 <a:cs typeface="Arial" panose="020B0604020202020204" pitchFamily="34" charset="0"/>
               </a:rPr>
@@ -8552,13 +8466,13 @@
               <a:buChar char="q"/>
             </a:pPr>
             <a:r>
-              <a:rPr lang="en-US" sz="2800" dirty="0" smtClean="0">
+              <a:rPr lang="en-US" sz="2800" dirty="0">
                 <a:latin typeface="Arial" panose="020B0604020202020204" pitchFamily="34" charset="0"/>
                 <a:cs typeface="Arial" panose="020B0604020202020204" pitchFamily="34" charset="0"/>
               </a:rPr>
               <a:t>etc.</a:t>
             </a:r>
-            <a:endParaRPr lang="nl-NL" sz="2800" dirty="0" smtClean="0">
+            <a:endParaRPr lang="nl-NL" sz="2800" dirty="0">
               <a:latin typeface="Arial" panose="020B0604020202020204" pitchFamily="34" charset="0"/>
               <a:cs typeface="Arial" panose="020B0604020202020204" pitchFamily="34" charset="0"/>
             </a:endParaRPr>
@@ -8614,13 +8528,6 @@
   <p:clrMapOvr>
     <a:masterClrMapping/>
   </p:clrMapOvr>
-  <p:timing>
-    <p:tnLst>
-      <p:par>
-        <p:cTn id="1" dur="indefinite" restart="never" nodeType="tmRoot"/>
-      </p:par>
-    </p:tnLst>
-  </p:timing>
 </p:sld>
 </file>
 
@@ -9146,10 +9053,9 @@
           <a:lstStyle/>
           <a:p>
             <a:r>
-              <a:rPr lang="nl-NL" dirty="0" smtClean="0"/>
+              <a:rPr lang="nl-NL" dirty="0"/>
               <a:t>example</a:t>
             </a:r>
-            <a:endParaRPr lang="nl-NL" dirty="0"/>
           </a:p>
         </p:txBody>
       </p:sp>
@@ -9206,7 +9112,7 @@
           <a:p>
             <a:pPr algn="ctr"/>
             <a:r>
-              <a:rPr lang="nl-NL" sz="1600" dirty="0" smtClean="0">
+              <a:rPr lang="nl-NL" sz="1600" dirty="0">
                 <a:latin typeface="Arial Unicode MS" panose="020B0604020202020204" pitchFamily="34" charset="-128"/>
                 <a:ea typeface="Arial Unicode MS" panose="020B0604020202020204" pitchFamily="34" charset="-128"/>
                 <a:cs typeface="Arial Unicode MS" panose="020B0604020202020204" pitchFamily="34" charset="-128"/>
@@ -9214,7 +9120,7 @@
               <a:t>{ </a:t>
             </a:r>
             <a:r>
-              <a:rPr lang="nl-NL" sz="1600" dirty="0" smtClean="0">
+              <a:rPr lang="nl-NL" sz="1600" dirty="0">
                 <a:latin typeface="Arial Unicode MS"/>
                 <a:ea typeface="Arial Unicode MS"/>
                 <a:cs typeface="Arial Unicode MS"/>
@@ -9222,7 +9128,7 @@
               <a:t>¬((∃x.(∀</a:t>
             </a:r>
             <a:r>
-              <a:rPr lang="nl-NL" sz="1600" dirty="0" err="1" smtClean="0">
+              <a:rPr lang="nl-NL" sz="1600" dirty="0" err="1">
                 <a:latin typeface="Arial Unicode MS"/>
                 <a:ea typeface="Arial Unicode MS"/>
                 <a:cs typeface="Arial Unicode MS"/>
@@ -9230,7 +9136,7 @@
               <a:t>y.P</a:t>
             </a:r>
             <a:r>
-              <a:rPr lang="nl-NL" sz="1600" dirty="0" smtClean="0">
+              <a:rPr lang="nl-NL" sz="1600" dirty="0">
                 <a:latin typeface="Arial Unicode MS"/>
                 <a:ea typeface="Arial Unicode MS"/>
                 <a:cs typeface="Arial Unicode MS"/>
@@ -9238,7 +9144,7 @@
               <a:t>(</a:t>
             </a:r>
             <a:r>
-              <a:rPr lang="nl-NL" sz="1600" dirty="0" err="1" smtClean="0">
+              <a:rPr lang="nl-NL" sz="1600" dirty="0" err="1">
                 <a:latin typeface="Arial Unicode MS"/>
                 <a:ea typeface="Arial Unicode MS"/>
                 <a:cs typeface="Arial Unicode MS"/>
@@ -9246,7 +9152,7 @@
               <a:t>x,y</a:t>
             </a:r>
             <a:r>
-              <a:rPr lang="nl-NL" sz="1600" dirty="0" smtClean="0">
+              <a:rPr lang="nl-NL" sz="1600" dirty="0">
                 <a:latin typeface="Arial Unicode MS"/>
                 <a:ea typeface="Arial Unicode MS"/>
                 <a:cs typeface="Arial Unicode MS"/>
@@ -9254,7 +9160,7 @@
               <a:t>)))⇒(∀q.(∃</a:t>
             </a:r>
             <a:r>
-              <a:rPr lang="nl-NL" sz="1600" dirty="0" err="1" smtClean="0">
+              <a:rPr lang="nl-NL" sz="1600" dirty="0" err="1">
                 <a:latin typeface="Arial Unicode MS"/>
                 <a:ea typeface="Arial Unicode MS"/>
                 <a:cs typeface="Arial Unicode MS"/>
@@ -9262,7 +9168,7 @@
               <a:t>p.P</a:t>
             </a:r>
             <a:r>
-              <a:rPr lang="nl-NL" sz="1600" dirty="0" smtClean="0">
+              <a:rPr lang="nl-NL" sz="1600" dirty="0">
                 <a:latin typeface="Arial Unicode MS"/>
                 <a:ea typeface="Arial Unicode MS"/>
                 <a:cs typeface="Arial Unicode MS"/>
@@ -9270,7 +9176,7 @@
               <a:t>(</a:t>
             </a:r>
             <a:r>
-              <a:rPr lang="nl-NL" sz="1600" dirty="0" err="1" smtClean="0">
+              <a:rPr lang="nl-NL" sz="1600" dirty="0" err="1">
                 <a:latin typeface="Arial Unicode MS"/>
                 <a:ea typeface="Arial Unicode MS"/>
                 <a:cs typeface="Arial Unicode MS"/>
@@ -9278,7 +9184,7 @@
               <a:t>p,q</a:t>
             </a:r>
             <a:r>
-              <a:rPr lang="nl-NL" sz="1600" dirty="0" smtClean="0">
+              <a:rPr lang="nl-NL" sz="1600" dirty="0">
                 <a:latin typeface="Arial Unicode MS"/>
                 <a:ea typeface="Arial Unicode MS"/>
                 <a:cs typeface="Arial Unicode MS"/>
@@ -9313,7 +9219,7 @@
           <a:p>
             <a:pPr algn="ctr"/>
             <a:r>
-              <a:rPr lang="nl-NL" sz="1600" dirty="0" smtClean="0">
+              <a:rPr lang="nl-NL" sz="1600" dirty="0">
                 <a:latin typeface="Arial Unicode MS" panose="020B0604020202020204" pitchFamily="34" charset="-128"/>
                 <a:ea typeface="Arial Unicode MS" panose="020B0604020202020204" pitchFamily="34" charset="-128"/>
                 <a:cs typeface="Arial Unicode MS" panose="020B0604020202020204" pitchFamily="34" charset="-128"/>
@@ -9321,7 +9227,7 @@
               <a:t>{</a:t>
             </a:r>
             <a:r>
-              <a:rPr lang="nl-NL" sz="1600" dirty="0" smtClean="0">
+              <a:rPr lang="nl-NL" sz="1600" dirty="0">
                 <a:latin typeface="Arial Unicode MS"/>
                 <a:ea typeface="Arial Unicode MS"/>
                 <a:cs typeface="Arial Unicode MS"/>
@@ -9329,7 +9235,7 @@
               <a:t> (∃x.(∀</a:t>
             </a:r>
             <a:r>
-              <a:rPr lang="nl-NL" sz="1600" dirty="0" err="1" smtClean="0">
+              <a:rPr lang="nl-NL" sz="1600" dirty="0" err="1">
                 <a:latin typeface="Arial Unicode MS"/>
                 <a:ea typeface="Arial Unicode MS"/>
                 <a:cs typeface="Arial Unicode MS"/>
@@ -9337,7 +9243,7 @@
               <a:t>y.P</a:t>
             </a:r>
             <a:r>
-              <a:rPr lang="nl-NL" sz="1600" dirty="0" smtClean="0">
+              <a:rPr lang="nl-NL" sz="1600" dirty="0">
                 <a:latin typeface="Arial Unicode MS"/>
                 <a:ea typeface="Arial Unicode MS"/>
                 <a:cs typeface="Arial Unicode MS"/>
@@ -9345,7 +9251,7 @@
               <a:t>(</a:t>
             </a:r>
             <a:r>
-              <a:rPr lang="nl-NL" sz="1600" dirty="0" err="1" smtClean="0">
+              <a:rPr lang="nl-NL" sz="1600" dirty="0" err="1">
                 <a:latin typeface="Arial Unicode MS"/>
                 <a:ea typeface="Arial Unicode MS"/>
                 <a:cs typeface="Arial Unicode MS"/>
@@ -9353,7 +9259,7 @@
               <a:t>x,y</a:t>
             </a:r>
             <a:r>
-              <a:rPr lang="nl-NL" sz="1600" dirty="0" smtClean="0">
+              <a:rPr lang="nl-NL" sz="1600" dirty="0">
                 <a:latin typeface="Arial Unicode MS"/>
                 <a:ea typeface="Arial Unicode MS"/>
                 <a:cs typeface="Arial Unicode MS"/>
@@ -9361,7 +9267,7 @@
               <a:t>))), ¬(∀q.(∃</a:t>
             </a:r>
             <a:r>
-              <a:rPr lang="nl-NL" sz="1600" dirty="0" err="1" smtClean="0">
+              <a:rPr lang="nl-NL" sz="1600" dirty="0" err="1">
                 <a:latin typeface="Arial Unicode MS"/>
                 <a:ea typeface="Arial Unicode MS"/>
                 <a:cs typeface="Arial Unicode MS"/>
@@ -9369,7 +9275,7 @@
               <a:t>p.P</a:t>
             </a:r>
             <a:r>
-              <a:rPr lang="nl-NL" sz="1600" dirty="0" smtClean="0">
+              <a:rPr lang="nl-NL" sz="1600" dirty="0">
                 <a:latin typeface="Arial Unicode MS"/>
                 <a:ea typeface="Arial Unicode MS"/>
                 <a:cs typeface="Arial Unicode MS"/>
@@ -9377,7 +9283,7 @@
               <a:t>(</a:t>
             </a:r>
             <a:r>
-              <a:rPr lang="nl-NL" sz="1600" dirty="0" err="1" smtClean="0">
+              <a:rPr lang="nl-NL" sz="1600" dirty="0" err="1">
                 <a:latin typeface="Arial Unicode MS"/>
                 <a:ea typeface="Arial Unicode MS"/>
                 <a:cs typeface="Arial Unicode MS"/>
@@ -9385,7 +9291,7 @@
               <a:t>p,q</a:t>
             </a:r>
             <a:r>
-              <a:rPr lang="nl-NL" sz="1600" dirty="0" smtClean="0">
+              <a:rPr lang="nl-NL" sz="1600" dirty="0">
                 <a:latin typeface="Arial Unicode MS"/>
                 <a:ea typeface="Arial Unicode MS"/>
                 <a:cs typeface="Arial Unicode MS"/>
@@ -9420,7 +9326,7 @@
           <a:p>
             <a:pPr algn="ctr"/>
             <a:r>
-              <a:rPr lang="nl-NL" sz="1600" dirty="0" smtClean="0">
+              <a:rPr lang="nl-NL" sz="1600" dirty="0">
                 <a:latin typeface="Arial Unicode MS" panose="020B0604020202020204" pitchFamily="34" charset="-128"/>
                 <a:ea typeface="Arial Unicode MS" panose="020B0604020202020204" pitchFamily="34" charset="-128"/>
                 <a:cs typeface="Arial Unicode MS" panose="020B0604020202020204" pitchFamily="34" charset="-128"/>
@@ -9428,7 +9334,7 @@
               <a:t>{</a:t>
             </a:r>
             <a:r>
-              <a:rPr lang="nl-NL" sz="1600" dirty="0" smtClean="0">
+              <a:rPr lang="nl-NL" sz="1600" dirty="0">
                 <a:latin typeface="Arial Unicode MS"/>
                 <a:ea typeface="Arial Unicode MS"/>
                 <a:cs typeface="Arial Unicode MS"/>
@@ -9444,7 +9350,7 @@
               <a:t>a</a:t>
             </a:r>
             <a:r>
-              <a:rPr lang="nl-NL" sz="1600" dirty="0" smtClean="0">
+              <a:rPr lang="nl-NL" sz="1600" dirty="0">
                 <a:latin typeface="Arial Unicode MS"/>
                 <a:ea typeface="Arial Unicode MS"/>
                 <a:cs typeface="Arial Unicode MS"/>
@@ -9452,7 +9358,7 @@
               <a:t>,y)), ¬(∀q.(∃p.P(p,q))) }   [</a:t>
             </a:r>
             <a:r>
-              <a:rPr lang="nl-NL" sz="1600" i="1" dirty="0" smtClean="0">
+              <a:rPr lang="nl-NL" sz="1600" i="1" dirty="0">
                 <a:latin typeface="Times New Roman" panose="02020603050405020304" pitchFamily="18" charset="0"/>
                 <a:ea typeface="Arial Unicode MS"/>
                 <a:cs typeface="Times New Roman" panose="02020603050405020304" pitchFamily="18" charset="0"/>
@@ -9460,7 +9366,7 @@
               <a:t>a</a:t>
             </a:r>
             <a:r>
-              <a:rPr lang="nl-NL" sz="1600" dirty="0" smtClean="0">
+              <a:rPr lang="nl-NL" sz="1600" dirty="0">
                 <a:latin typeface="Arial Unicode MS"/>
                 <a:ea typeface="Arial Unicode MS"/>
                 <a:cs typeface="Arial Unicode MS"/>
@@ -9495,7 +9401,7 @@
           <a:p>
             <a:pPr algn="ctr"/>
             <a:r>
-              <a:rPr lang="nl-NL" sz="1600" dirty="0" smtClean="0">
+              <a:rPr lang="nl-NL" sz="1600" dirty="0">
                 <a:latin typeface="Arial Unicode MS" panose="020B0604020202020204" pitchFamily="34" charset="-128"/>
                 <a:ea typeface="Arial Unicode MS" panose="020B0604020202020204" pitchFamily="34" charset="-128"/>
                 <a:cs typeface="Arial Unicode MS" panose="020B0604020202020204" pitchFamily="34" charset="-128"/>
@@ -9503,7 +9409,7 @@
               <a:t>{</a:t>
             </a:r>
             <a:r>
-              <a:rPr lang="nl-NL" sz="1600" dirty="0" smtClean="0">
+              <a:rPr lang="nl-NL" sz="1600" dirty="0">
                 <a:latin typeface="Arial Unicode MS"/>
                 <a:ea typeface="Arial Unicode MS"/>
                 <a:cs typeface="Arial Unicode MS"/>
@@ -9519,28 +9425,12 @@
               <a:t>a</a:t>
             </a:r>
             <a:r>
-              <a:rPr lang="nl-NL" sz="1600" dirty="0" smtClean="0">
-                <a:latin typeface="Arial Unicode MS"/>
-                <a:ea typeface="Arial Unicode MS"/>
-                <a:cs typeface="Arial Unicode MS"/>
-              </a:rPr>
-              <a:t>,y)), </a:t>
-            </a:r>
-            <a:r>
               <a:rPr lang="nl-NL" sz="1600" dirty="0">
                 <a:latin typeface="Arial Unicode MS"/>
                 <a:ea typeface="Arial Unicode MS"/>
                 <a:cs typeface="Arial Unicode MS"/>
               </a:rPr>
-              <a:t>¬</a:t>
-            </a:r>
-            <a:r>
-              <a:rPr lang="nl-NL" sz="1600" dirty="0" smtClean="0">
-                <a:latin typeface="Arial Unicode MS"/>
-                <a:ea typeface="Arial Unicode MS"/>
-                <a:cs typeface="Arial Unicode MS"/>
-              </a:rPr>
-              <a:t>(∃p.P(p,</a:t>
+              <a:t>,y)), ¬(∃p.P(p,</a:t>
             </a:r>
             <a:r>
               <a:rPr lang="nl-NL" sz="1600" i="1" dirty="0">
@@ -9551,7 +9441,7 @@
               <a:t>b</a:t>
             </a:r>
             <a:r>
-              <a:rPr lang="nl-NL" sz="1600" dirty="0" smtClean="0">
+              <a:rPr lang="nl-NL" sz="1600" dirty="0">
                 <a:latin typeface="Arial Unicode MS"/>
                 <a:ea typeface="Arial Unicode MS"/>
                 <a:cs typeface="Arial Unicode MS"/>
@@ -9559,7 +9449,7 @@
               <a:t>)) }   [</a:t>
             </a:r>
             <a:r>
-              <a:rPr lang="nl-NL" sz="1600" i="1" dirty="0" smtClean="0">
+              <a:rPr lang="nl-NL" sz="1600" i="1" dirty="0">
                 <a:latin typeface="Times New Roman" panose="02020603050405020304" pitchFamily="18" charset="0"/>
                 <a:ea typeface="Arial Unicode MS"/>
                 <a:cs typeface="Times New Roman" panose="02020603050405020304" pitchFamily="18" charset="0"/>
@@ -9567,7 +9457,7 @@
               <a:t>a,b</a:t>
             </a:r>
             <a:r>
-              <a:rPr lang="nl-NL" sz="1600" dirty="0" smtClean="0">
+              <a:rPr lang="nl-NL" sz="1600" dirty="0">
                 <a:latin typeface="Arial Unicode MS"/>
                 <a:ea typeface="Arial Unicode MS"/>
                 <a:cs typeface="Arial Unicode MS"/>
@@ -9602,7 +9492,7 @@
           <a:p>
             <a:pPr algn="ctr"/>
             <a:r>
-              <a:rPr lang="nl-NL" sz="1600" dirty="0" smtClean="0">
+              <a:rPr lang="nl-NL" sz="1600" dirty="0">
                 <a:latin typeface="Arial Unicode MS" panose="020B0604020202020204" pitchFamily="34" charset="-128"/>
                 <a:ea typeface="Arial Unicode MS" panose="020B0604020202020204" pitchFamily="34" charset="-128"/>
                 <a:cs typeface="Arial Unicode MS" panose="020B0604020202020204" pitchFamily="34" charset="-128"/>
@@ -9610,7 +9500,7 @@
               <a:t>{</a:t>
             </a:r>
             <a:r>
-              <a:rPr lang="nl-NL" sz="1600" dirty="0" smtClean="0">
+              <a:rPr lang="nl-NL" sz="1600" dirty="0">
                 <a:latin typeface="Arial Unicode MS"/>
                 <a:ea typeface="Arial Unicode MS"/>
                 <a:cs typeface="Arial Unicode MS"/>
@@ -9626,28 +9516,12 @@
               <a:t>a</a:t>
             </a:r>
             <a:r>
-              <a:rPr lang="nl-NL" sz="1600" dirty="0" smtClean="0">
+              <a:rPr lang="nl-NL" sz="1600" dirty="0">
                 <a:latin typeface="Arial Unicode MS"/>
                 <a:ea typeface="Arial Unicode MS"/>
                 <a:cs typeface="Arial Unicode MS"/>
               </a:rPr>
               <a:t>,y)), P(</a:t>
-            </a:r>
-            <a:r>
-              <a:rPr lang="nl-NL" sz="1600" i="1" dirty="0" smtClean="0">
-                <a:latin typeface="Times New Roman" panose="02020603050405020304" pitchFamily="18" charset="0"/>
-                <a:ea typeface="Arial Unicode MS"/>
-                <a:cs typeface="Times New Roman" panose="02020603050405020304" pitchFamily="18" charset="0"/>
-              </a:rPr>
-              <a:t>a</a:t>
-            </a:r>
-            <a:r>
-              <a:rPr lang="nl-NL" sz="1600" dirty="0" smtClean="0">
-                <a:latin typeface="Arial Unicode MS"/>
-                <a:ea typeface="Arial Unicode MS"/>
-                <a:cs typeface="Arial Unicode MS"/>
-              </a:rPr>
-              <a:t>,</a:t>
             </a:r>
             <a:r>
               <a:rPr lang="nl-NL" sz="1600" i="1" dirty="0">
@@ -9658,7 +9532,23 @@
               <a:t>a</a:t>
             </a:r>
             <a:r>
-              <a:rPr lang="nl-NL" sz="1600" dirty="0" smtClean="0">
+              <a:rPr lang="nl-NL" sz="1600" dirty="0">
+                <a:latin typeface="Arial Unicode MS"/>
+                <a:ea typeface="Arial Unicode MS"/>
+                <a:cs typeface="Arial Unicode MS"/>
+              </a:rPr>
+              <a:t>,</a:t>
+            </a:r>
+            <a:r>
+              <a:rPr lang="nl-NL" sz="1600" i="1" dirty="0">
+                <a:latin typeface="Times New Roman" panose="02020603050405020304" pitchFamily="18" charset="0"/>
+                <a:ea typeface="Arial Unicode MS"/>
+                <a:cs typeface="Times New Roman" panose="02020603050405020304" pitchFamily="18" charset="0"/>
+              </a:rPr>
+              <a:t>a</a:t>
+            </a:r>
+            <a:r>
+              <a:rPr lang="nl-NL" sz="1600" dirty="0">
                 <a:latin typeface="Arial Unicode MS"/>
                 <a:ea typeface="Arial Unicode MS"/>
                 <a:cs typeface="Arial Unicode MS"/>
@@ -9666,7 +9556,7 @@
               <a:t>), P(</a:t>
             </a:r>
             <a:r>
-              <a:rPr lang="nl-NL" sz="1600" i="1" dirty="0" smtClean="0">
+              <a:rPr lang="nl-NL" sz="1600" i="1" dirty="0">
                 <a:latin typeface="Times New Roman" panose="02020603050405020304" pitchFamily="18" charset="0"/>
                 <a:ea typeface="Arial Unicode MS"/>
                 <a:cs typeface="Times New Roman" panose="02020603050405020304" pitchFamily="18" charset="0"/>
@@ -9674,7 +9564,7 @@
               <a:t>a</a:t>
             </a:r>
             <a:r>
-              <a:rPr lang="nl-NL" sz="1600" dirty="0" smtClean="0">
+              <a:rPr lang="nl-NL" sz="1600" dirty="0">
                 <a:latin typeface="Arial Unicode MS"/>
                 <a:ea typeface="Arial Unicode MS"/>
                 <a:cs typeface="Arial Unicode MS"/>
@@ -9690,7 +9580,7 @@
               <a:t>b</a:t>
             </a:r>
             <a:r>
-              <a:rPr lang="nl-NL" sz="1600" dirty="0" smtClean="0">
+              <a:rPr lang="nl-NL" sz="1600" dirty="0">
                 <a:latin typeface="Arial Unicode MS"/>
                 <a:ea typeface="Arial Unicode MS"/>
                 <a:cs typeface="Arial Unicode MS"/>
@@ -9706,7 +9596,7 @@
               <a:t>b</a:t>
             </a:r>
             <a:r>
-              <a:rPr lang="nl-NL" sz="1600" dirty="0" smtClean="0">
+              <a:rPr lang="nl-NL" sz="1600" dirty="0">
                 <a:latin typeface="Arial Unicode MS"/>
                 <a:ea typeface="Arial Unicode MS"/>
                 <a:cs typeface="Arial Unicode MS"/>
@@ -9714,7 +9604,7 @@
               <a:t>)) }   [</a:t>
             </a:r>
             <a:r>
-              <a:rPr lang="nl-NL" sz="1600" i="1" dirty="0" smtClean="0">
+              <a:rPr lang="nl-NL" sz="1600" i="1" dirty="0">
                 <a:latin typeface="Times New Roman" panose="02020603050405020304" pitchFamily="18" charset="0"/>
                 <a:ea typeface="Arial Unicode MS"/>
                 <a:cs typeface="Times New Roman" panose="02020603050405020304" pitchFamily="18" charset="0"/>
@@ -9722,7 +9612,7 @@
               <a:t>a,b</a:t>
             </a:r>
             <a:r>
-              <a:rPr lang="nl-NL" sz="1600" dirty="0" smtClean="0">
+              <a:rPr lang="nl-NL" sz="1600" dirty="0">
                 <a:latin typeface="Arial Unicode MS"/>
                 <a:ea typeface="Arial Unicode MS"/>
                 <a:cs typeface="Arial Unicode MS"/>
@@ -9757,7 +9647,7 @@
           <a:p>
             <a:pPr algn="ctr"/>
             <a:r>
-              <a:rPr lang="nl-NL" sz="1600" dirty="0" smtClean="0">
+              <a:rPr lang="nl-NL" sz="1600" dirty="0">
                 <a:latin typeface="Arial Unicode MS" panose="020B0604020202020204" pitchFamily="34" charset="-128"/>
                 <a:ea typeface="Arial Unicode MS" panose="020B0604020202020204" pitchFamily="34" charset="-128"/>
                 <a:cs typeface="Arial Unicode MS" panose="020B0604020202020204" pitchFamily="34" charset="-128"/>
@@ -9765,28 +9655,12 @@
               <a:t>{ </a:t>
             </a:r>
             <a:r>
-              <a:rPr lang="nl-NL" sz="1600" dirty="0" smtClean="0">
-                <a:latin typeface="Arial Unicode MS"/>
-                <a:ea typeface="Arial Unicode MS"/>
-                <a:cs typeface="Arial Unicode MS"/>
-              </a:rPr>
-              <a:t>(</a:t>
-            </a:r>
-            <a:r>
               <a:rPr lang="nl-NL" sz="1600" dirty="0">
                 <a:latin typeface="Arial Unicode MS"/>
                 <a:ea typeface="Arial Unicode MS"/>
                 <a:cs typeface="Arial Unicode MS"/>
               </a:rPr>
-              <a:t>∀</a:t>
-            </a:r>
-            <a:r>
-              <a:rPr lang="nl-NL" sz="1600" dirty="0" smtClean="0">
-                <a:latin typeface="Arial Unicode MS"/>
-                <a:ea typeface="Arial Unicode MS"/>
-                <a:cs typeface="Arial Unicode MS"/>
-              </a:rPr>
-              <a:t>y.P(</a:t>
+              <a:t>(∀y.P(</a:t>
             </a:r>
             <a:r>
               <a:rPr lang="nl-NL" sz="1600" i="1" dirty="0">
@@ -9797,31 +9671,15 @@
               <a:t>a</a:t>
             </a:r>
             <a:r>
-              <a:rPr lang="nl-NL" sz="1600" dirty="0" smtClean="0">
-                <a:latin typeface="Arial Unicode MS"/>
-                <a:ea typeface="Arial Unicode MS"/>
-                <a:cs typeface="Arial Unicode MS"/>
-              </a:rPr>
-              <a:t>,y</a:t>
-            </a:r>
-            <a:r>
               <a:rPr lang="nl-NL" sz="1600" dirty="0">
                 <a:latin typeface="Arial Unicode MS"/>
                 <a:ea typeface="Arial Unicode MS"/>
                 <a:cs typeface="Arial Unicode MS"/>
               </a:rPr>
-              <a:t>)), </a:t>
-            </a:r>
-            <a:r>
-              <a:rPr lang="nl-NL" sz="1600" dirty="0" smtClean="0">
-                <a:latin typeface="Arial Unicode MS"/>
-                <a:ea typeface="Arial Unicode MS"/>
-                <a:cs typeface="Arial Unicode MS"/>
-              </a:rPr>
-              <a:t>P(</a:t>
-            </a:r>
-            <a:r>
-              <a:rPr lang="nl-NL" sz="1600" i="1" dirty="0" smtClean="0">
+              <a:t>,y)), P(</a:t>
+            </a:r>
+            <a:r>
+              <a:rPr lang="nl-NL" sz="1600" i="1" dirty="0">
                 <a:latin typeface="Times New Roman" panose="02020603050405020304" pitchFamily="18" charset="0"/>
                 <a:ea typeface="Arial Unicode MS"/>
                 <a:cs typeface="Times New Roman" panose="02020603050405020304" pitchFamily="18" charset="0"/>
@@ -9829,7 +9687,7 @@
               <a:t>a,a</a:t>
             </a:r>
             <a:r>
-              <a:rPr lang="nl-NL" sz="1600" dirty="0" smtClean="0">
+              <a:rPr lang="nl-NL" sz="1600" dirty="0">
                 <a:latin typeface="Arial Unicode MS"/>
                 <a:ea typeface="Arial Unicode MS"/>
                 <a:cs typeface="Arial Unicode MS"/>
@@ -9837,7 +9695,7 @@
               <a:t>), P(</a:t>
             </a:r>
             <a:r>
-              <a:rPr lang="nl-NL" sz="1600" i="1" dirty="0" smtClean="0">
+              <a:rPr lang="nl-NL" sz="1600" i="1" dirty="0">
                 <a:latin typeface="Times New Roman" panose="02020603050405020304" pitchFamily="18" charset="0"/>
                 <a:ea typeface="Arial Unicode MS"/>
                 <a:cs typeface="Times New Roman" panose="02020603050405020304" pitchFamily="18" charset="0"/>
@@ -9845,28 +9703,12 @@
               <a:t>a,b</a:t>
             </a:r>
             <a:r>
-              <a:rPr lang="nl-NL" sz="1600" dirty="0" smtClean="0">
-                <a:latin typeface="Arial Unicode MS"/>
-                <a:ea typeface="Arial Unicode MS"/>
-                <a:cs typeface="Arial Unicode MS"/>
-              </a:rPr>
-              <a:t>), </a:t>
-            </a:r>
-            <a:r>
               <a:rPr lang="nl-NL" sz="1600" dirty="0">
                 <a:latin typeface="Arial Unicode MS"/>
                 <a:ea typeface="Arial Unicode MS"/>
                 <a:cs typeface="Arial Unicode MS"/>
               </a:rPr>
-              <a:t>¬(∃</a:t>
-            </a:r>
-            <a:r>
-              <a:rPr lang="nl-NL" sz="1600" dirty="0" smtClean="0">
-                <a:latin typeface="Arial Unicode MS"/>
-                <a:ea typeface="Arial Unicode MS"/>
-                <a:cs typeface="Arial Unicode MS"/>
-              </a:rPr>
-              <a:t>p.P(p,</a:t>
+              <a:t>), ¬(∃p.P(p,</a:t>
             </a:r>
             <a:r>
               <a:rPr lang="nl-NL" sz="1600" i="1" dirty="0">
@@ -9877,7 +9719,7 @@
               <a:t>b</a:t>
             </a:r>
             <a:r>
-              <a:rPr lang="nl-NL" sz="1600" dirty="0" smtClean="0">
+              <a:rPr lang="nl-NL" sz="1600" dirty="0">
                 <a:latin typeface="Arial Unicode MS"/>
                 <a:ea typeface="Arial Unicode MS"/>
                 <a:cs typeface="Arial Unicode MS"/>
@@ -9885,7 +9727,7 @@
               <a:t>)), ¬P(</a:t>
             </a:r>
             <a:r>
-              <a:rPr lang="nl-NL" sz="1600" i="1" dirty="0" smtClean="0">
+              <a:rPr lang="nl-NL" sz="1600" i="1" dirty="0">
                 <a:latin typeface="Times New Roman" panose="02020603050405020304" pitchFamily="18" charset="0"/>
                 <a:ea typeface="Arial Unicode MS"/>
                 <a:cs typeface="Times New Roman" panose="02020603050405020304" pitchFamily="18" charset="0"/>
@@ -9893,7 +9735,7 @@
               <a:t>a,b</a:t>
             </a:r>
             <a:r>
-              <a:rPr lang="nl-NL" sz="1600" dirty="0" smtClean="0">
+              <a:rPr lang="nl-NL" sz="1600" dirty="0">
                 <a:latin typeface="Arial Unicode MS"/>
                 <a:ea typeface="Arial Unicode MS"/>
                 <a:cs typeface="Arial Unicode MS"/>
@@ -9901,7 +9743,7 @@
               <a:t>), ¬P(</a:t>
             </a:r>
             <a:r>
-              <a:rPr lang="nl-NL" sz="1600" i="1" dirty="0" smtClean="0">
+              <a:rPr lang="nl-NL" sz="1600" i="1" dirty="0">
                 <a:latin typeface="Times New Roman" panose="02020603050405020304" pitchFamily="18" charset="0"/>
                 <a:ea typeface="Arial Unicode MS"/>
                 <a:cs typeface="Times New Roman" panose="02020603050405020304" pitchFamily="18" charset="0"/>
@@ -9909,7 +9751,7 @@
               <a:t>b,b</a:t>
             </a:r>
             <a:r>
-              <a:rPr lang="nl-NL" sz="1600" dirty="0" smtClean="0">
+              <a:rPr lang="nl-NL" sz="1600" dirty="0">
                 <a:latin typeface="Arial Unicode MS"/>
                 <a:ea typeface="Arial Unicode MS"/>
                 <a:cs typeface="Arial Unicode MS"/>
@@ -9917,7 +9759,7 @@
               <a:t>) }   [</a:t>
             </a:r>
             <a:r>
-              <a:rPr lang="nl-NL" sz="1600" i="1" dirty="0" smtClean="0">
+              <a:rPr lang="nl-NL" sz="1600" i="1" dirty="0">
                 <a:latin typeface="Times New Roman" panose="02020603050405020304" pitchFamily="18" charset="0"/>
                 <a:ea typeface="Arial Unicode MS"/>
                 <a:cs typeface="Times New Roman" panose="02020603050405020304" pitchFamily="18" charset="0"/>
@@ -9925,7 +9767,7 @@
               <a:t>a,b</a:t>
             </a:r>
             <a:r>
-              <a:rPr lang="nl-NL" sz="1600" dirty="0" smtClean="0">
+              <a:rPr lang="nl-NL" sz="1600" dirty="0">
                 <a:latin typeface="Arial Unicode MS"/>
                 <a:ea typeface="Arial Unicode MS"/>
                 <a:cs typeface="Arial Unicode MS"/>
@@ -10141,18 +9983,13 @@
             <a:lstStyle/>
             <a:p>
               <a:r>
-                <a:rPr lang="nl-NL" sz="1600" dirty="0" smtClean="0">
+                <a:rPr lang="nl-NL" sz="1600" dirty="0">
                   <a:latin typeface="Arial Unicode MS" panose="020B0604020202020204" pitchFamily="34" charset="-128"/>
                   <a:ea typeface="Arial Unicode MS" panose="020B0604020202020204" pitchFamily="34" charset="-128"/>
                   <a:cs typeface="Arial Unicode MS" panose="020B0604020202020204" pitchFamily="34" charset="-128"/>
                 </a:rPr>
                 <a:t>closed!</a:t>
               </a:r>
-              <a:endParaRPr lang="nl-NL" sz="1600" dirty="0">
-                <a:latin typeface="Arial Unicode MS" panose="020B0604020202020204" pitchFamily="34" charset="-128"/>
-                <a:ea typeface="Arial Unicode MS" panose="020B0604020202020204" pitchFamily="34" charset="-128"/>
-                <a:cs typeface="Arial Unicode MS" panose="020B0604020202020204" pitchFamily="34" charset="-128"/>
-              </a:endParaRPr>
             </a:p>
           </p:txBody>
         </p:sp>
@@ -10419,43 +10256,10 @@
                 <a:ea typeface="Arial Unicode MS"/>
                 <a:cs typeface="Arial Unicode MS"/>
               </a:rPr>
-              <a:t>(∃x.(∀y.P(x,y</a:t>
-            </a:r>
-            <a:r>
-              <a:rPr lang="nl-NL" sz="1800" dirty="0" smtClean="0">
-                <a:solidFill>
-                  <a:schemeClr val="bg1"/>
-                </a:solidFill>
-                <a:latin typeface="Arial Unicode MS"/>
-                <a:ea typeface="Arial Unicode MS"/>
-                <a:cs typeface="Arial Unicode MS"/>
-              </a:rPr>
-              <a:t>))) ⇒ (</a:t>
-            </a:r>
-            <a:r>
+              <a:t>(∃x.(∀y.P(x,y))) ⇒ (∀q.(∃p.P(p,q)))</a:t>
+            </a:r>
+            <a:br>
               <a:rPr lang="nl-NL" sz="1800" dirty="0">
-                <a:solidFill>
-                  <a:schemeClr val="bg1"/>
-                </a:solidFill>
-                <a:latin typeface="Arial Unicode MS"/>
-                <a:ea typeface="Arial Unicode MS"/>
-                <a:cs typeface="Arial Unicode MS"/>
-              </a:rPr>
-              <a:t>∀q.(∃p.P(p,q</a:t>
-            </a:r>
-            <a:r>
-              <a:rPr lang="nl-NL" sz="1800" dirty="0" smtClean="0">
-                <a:solidFill>
-                  <a:schemeClr val="bg1"/>
-                </a:solidFill>
-                <a:latin typeface="Arial Unicode MS"/>
-                <a:ea typeface="Arial Unicode MS"/>
-                <a:cs typeface="Arial Unicode MS"/>
-              </a:rPr>
-              <a:t>)))</a:t>
-            </a:r>
-            <a:br>
-              <a:rPr lang="nl-NL" sz="1800" dirty="0" smtClean="0">
                 <a:solidFill>
                   <a:schemeClr val="bg1"/>
                 </a:solidFill>
@@ -10504,7 +10308,7 @@
           <a:p>
             <a:pPr algn="ctr"/>
             <a:r>
-              <a:rPr lang="nl-NL" sz="1800" dirty="0" smtClean="0">
+              <a:rPr lang="nl-NL" sz="1800" dirty="0">
                 <a:solidFill>
                   <a:schemeClr val="bg1"/>
                 </a:solidFill>
@@ -10514,14 +10318,6 @@
               </a:rPr>
               <a:t>is a tautology</a:t>
             </a:r>
-            <a:endParaRPr lang="nl-NL" sz="1800" dirty="0">
-              <a:solidFill>
-                <a:schemeClr val="bg1"/>
-              </a:solidFill>
-              <a:latin typeface="Arial Unicode MS" panose="020B0604020202020204" pitchFamily="34" charset="-128"/>
-              <a:ea typeface="Arial Unicode MS" panose="020B0604020202020204" pitchFamily="34" charset="-128"/>
-              <a:cs typeface="Arial Unicode MS" panose="020B0604020202020204" pitchFamily="34" charset="-128"/>
-            </a:endParaRPr>
           </a:p>
         </p:txBody>
       </p:sp>
@@ -10596,14 +10392,14 @@
                 <a:t>α</a:t>
               </a:r>
               <a:r>
-                <a:rPr lang="nl-NL" sz="1600" dirty="0" smtClean="0">
+                <a:rPr lang="nl-NL" sz="1600" dirty="0">
                   <a:latin typeface="Arial" panose="020B0604020202020204" pitchFamily="34" charset="0"/>
                   <a:cs typeface="Arial" panose="020B0604020202020204" pitchFamily="34" charset="0"/>
                 </a:rPr>
                 <a:t>-rules	    </a:t>
               </a:r>
               <a:r>
-                <a:rPr lang="el-GR" sz="1600" dirty="0" smtClean="0">
+                <a:rPr lang="el-GR" sz="1600" dirty="0">
                   <a:latin typeface="Times New Roman"/>
                   <a:cs typeface="Times New Roman"/>
                 </a:rPr>
@@ -10619,16 +10415,12 @@
             </a:p>
             <a:p>
               <a:r>
-                <a:rPr lang="nl-NL" sz="1600" dirty="0" smtClean="0">
+                <a:rPr lang="nl-NL" sz="1600" dirty="0">
                   <a:latin typeface="Arial" panose="020B0604020202020204" pitchFamily="34" charset="0"/>
                   <a:cs typeface="Arial" panose="020B0604020202020204" pitchFamily="34" charset="0"/>
                 </a:rPr>
                 <a:t>	</a:t>
               </a:r>
-              <a:endParaRPr lang="nl-NL" sz="1600" dirty="0">
-                <a:latin typeface="Arial" panose="020B0604020202020204" pitchFamily="34" charset="0"/>
-                <a:cs typeface="Arial" panose="020B0604020202020204" pitchFamily="34" charset="0"/>
-              </a:endParaRPr>
             </a:p>
           </p:txBody>
         </p:sp>
@@ -12029,7 +11821,7 @@
           <a:lstStyle/>
           <a:p>
             <a:r>
-              <a:rPr lang="nl-NL" altLang="nl-NL" dirty="0" smtClean="0">
+              <a:rPr lang="nl-NL" altLang="nl-NL" dirty="0">
                 <a:latin typeface="Arial" pitchFamily="34" charset="0"/>
                 <a:cs typeface="Arial" pitchFamily="34" charset="0"/>
               </a:rPr>
@@ -12061,7 +11853,7 @@
               <a:defRPr/>
             </a:pPr>
             <a:r>
-              <a:rPr lang="en-US" sz="2800" dirty="0" smtClean="0"/>
+              <a:rPr lang="en-US" sz="2800" dirty="0"/>
               <a:t>assignment:</a:t>
             </a:r>
           </a:p>
@@ -12075,7 +11867,7 @@
               <a:defRPr/>
             </a:pPr>
             <a:r>
-              <a:rPr lang="en-US" sz="2800" dirty="0" smtClean="0"/>
+              <a:rPr lang="en-US" sz="2800" dirty="0"/>
               <a:t>validate that a proposition is a tautology</a:t>
             </a:r>
           </a:p>
@@ -12088,7 +11880,7 @@
               <a:buChar char="•"/>
               <a:defRPr/>
             </a:pPr>
-            <a:endParaRPr lang="nl-NL" dirty="0" smtClean="0"/>
+            <a:endParaRPr lang="nl-NL" dirty="0"/>
           </a:p>
           <a:p>
             <a:pPr marL="0" indent="0">
@@ -12099,20 +11891,8 @@
               <a:defRPr/>
             </a:pPr>
             <a:r>
-              <a:rPr lang="nl-NL" sz="2800" dirty="0" smtClean="0"/>
-              <a:t>can </a:t>
-            </a:r>
-            <a:r>
-              <a:rPr lang="nl-NL" sz="2800" dirty="0" smtClean="0"/>
-              <a:t>be done with truth </a:t>
-            </a:r>
-            <a:r>
-              <a:rPr lang="nl-NL" sz="2800" dirty="0" smtClean="0"/>
-              <a:t>tables; disadvantages</a:t>
-            </a:r>
-            <a:r>
-              <a:rPr lang="nl-NL" sz="2800" dirty="0" smtClean="0"/>
-              <a:t>:</a:t>
+              <a:rPr lang="nl-NL" sz="2800" dirty="0"/>
+              <a:t>can be done with truth tables; disadvantages:</a:t>
             </a:r>
           </a:p>
           <a:p>
@@ -12125,7 +11905,7 @@
               <a:defRPr/>
             </a:pPr>
             <a:r>
-              <a:rPr lang="nl-NL" sz="2800" dirty="0" smtClean="0"/>
+              <a:rPr lang="nl-NL" sz="2800" dirty="0"/>
               <a:t>exponential growth with variables</a:t>
             </a:r>
           </a:p>
@@ -12139,18 +11919,18 @@
               <a:defRPr/>
             </a:pPr>
             <a:r>
-              <a:rPr lang="nl-NL" sz="2800" dirty="0" smtClean="0"/>
+              <a:rPr lang="nl-NL" sz="2800" dirty="0"/>
               <a:t>cannot deal with </a:t>
             </a:r>
             <a:r>
-              <a:rPr lang="nl-NL" sz="2800" dirty="0" smtClean="0">
+              <a:rPr lang="nl-NL" sz="2800" dirty="0">
                 <a:latin typeface="Arial Unicode MS"/>
                 <a:ea typeface="Arial Unicode MS"/>
                 <a:cs typeface="Arial Unicode MS"/>
               </a:rPr>
               <a:t>∀ and ∃</a:t>
             </a:r>
-            <a:endParaRPr lang="nl-NL" sz="2800" dirty="0" smtClean="0"/>
+            <a:endParaRPr lang="nl-NL" sz="2800" dirty="0"/>
           </a:p>
           <a:p>
             <a:pPr>
@@ -12197,13 +11977,6 @@
   <p:clrMapOvr>
     <a:masterClrMapping/>
   </p:clrMapOvr>
-  <p:timing>
-    <p:tnLst>
-      <p:par>
-        <p:cTn id="1" dur="indefinite" restart="never" nodeType="tmRoot"/>
-      </p:par>
-    </p:tnLst>
-  </p:timing>
 </p:sld>
 </file>
 
@@ -12240,7 +12013,7 @@
           <a:lstStyle/>
           <a:p>
             <a:r>
-              <a:rPr lang="en-US" dirty="0" smtClean="0"/>
+              <a:rPr lang="en-US" dirty="0"/>
               <a:t>Universe of propositions</a:t>
             </a:r>
             <a:endParaRPr lang="nl-NL" dirty="0"/>
@@ -12285,10 +12058,9 @@
               <a:defRPr/>
             </a:pPr>
             <a:r>
-              <a:rPr lang="nl-NL" smtClean="0"/>
+              <a:rPr lang="nl-NL"/>
               <a:t>Voettekst</a:t>
             </a:r>
-            <a:endParaRPr lang="nl-NL"/>
           </a:p>
         </p:txBody>
       </p:sp>
@@ -12348,7 +12120,6 @@
             <a:tailEnd type="none" w="med" len="med"/>
           </a:ln>
           <a:effectLst/>
-          <a:extLst/>
         </p:spPr>
         <p:txBody>
           <a:bodyPr vert="horz" wrap="square" lIns="91440" tIns="45720" rIns="91440" bIns="45720" numCol="1" rtlCol="0" anchor="ctr" anchorCtr="0" compatLnSpc="1">
@@ -12360,7 +12131,7 @@
           <a:p>
             <a:pPr algn="ctr" eaLnBrk="0" hangingPunct="0"/>
             <a:r>
-              <a:rPr lang="en-US" sz="1800" dirty="0" smtClean="0">
+              <a:rPr lang="en-US" sz="1800" dirty="0">
                 <a:solidFill>
                   <a:srgbClr val="000000"/>
                 </a:solidFill>
@@ -12408,7 +12179,6 @@
             <a:tailEnd type="none" w="med" len="med"/>
           </a:ln>
           <a:effectLst/>
-          <a:extLst/>
         </p:spPr>
         <p:txBody>
           <a:bodyPr vert="horz" wrap="square" lIns="91440" tIns="45720" rIns="91440" bIns="45720" numCol="1" rtlCol="0" anchor="t" anchorCtr="0" compatLnSpc="1">
@@ -12457,7 +12227,6 @@
             <a:tailEnd type="none" w="med" len="med"/>
           </a:ln>
           <a:effectLst/>
-          <a:extLst/>
         </p:spPr>
         <p:txBody>
           <a:bodyPr vert="horz" wrap="square" lIns="91440" tIns="45720" rIns="91440" bIns="45720" numCol="1" rtlCol="0" anchor="ctr" anchorCtr="0" compatLnSpc="1">
@@ -12522,7 +12291,6 @@
             <a:tailEnd type="none" w="med" len="med"/>
           </a:ln>
           <a:effectLst/>
-          <a:extLst/>
         </p:spPr>
         <p:txBody>
           <a:bodyPr rtlCol="0" anchor="ctr"/>
@@ -12557,17 +12325,6 @@
           <a:p>
             <a:pPr algn="ctr"/>
             <a:r>
-              <a:rPr lang="en-US" sz="1800" dirty="0" smtClean="0">
-                <a:solidFill>
-                  <a:srgbClr val="000000"/>
-                </a:solidFill>
-                <a:latin typeface="Calibri" panose="020F0502020204030204" pitchFamily="34" charset="0"/>
-                <a:ea typeface="ＭＳ Ｐゴシック" charset="0"/>
-                <a:cs typeface="Calibri" panose="020F0502020204030204" pitchFamily="34" charset="0"/>
-              </a:rPr>
-              <a:t>is not </a:t>
-            </a:r>
-            <a:r>
               <a:rPr lang="en-US" sz="1800" dirty="0">
                 <a:solidFill>
                   <a:srgbClr val="000000"/>
@@ -12576,18 +12333,7 @@
                 <a:ea typeface="ＭＳ Ｐゴシック" charset="0"/>
                 <a:cs typeface="Calibri" panose="020F0502020204030204" pitchFamily="34" charset="0"/>
               </a:rPr>
-              <a:t>a </a:t>
-            </a:r>
-            <a:r>
-              <a:rPr lang="en-US" sz="1800" dirty="0" smtClean="0">
-                <a:solidFill>
-                  <a:srgbClr val="000000"/>
-                </a:solidFill>
-                <a:latin typeface="Calibri" panose="020F0502020204030204" pitchFamily="34" charset="0"/>
-                <a:ea typeface="ＭＳ Ｐゴシック" charset="0"/>
-                <a:cs typeface="Calibri" panose="020F0502020204030204" pitchFamily="34" charset="0"/>
-              </a:rPr>
-              <a:t>tautology</a:t>
+              <a:t>is not a tautology</a:t>
             </a:r>
             <a:endParaRPr lang="nl-NL" sz="1800" dirty="0">
               <a:solidFill>
@@ -12622,7 +12368,7 @@
           <a:lstStyle/>
           <a:p>
             <a:r>
-              <a:rPr lang="nl-NL" altLang="nl-NL" dirty="0" smtClean="0">
+              <a:rPr lang="nl-NL" altLang="nl-NL" dirty="0">
                 <a:solidFill>
                   <a:schemeClr val="accent1">
                     <a:lumMod val="25000"/>
@@ -12634,16 +12380,6 @@
               </a:rPr>
               <a:t>P</a:t>
             </a:r>
-            <a:endParaRPr lang="nl-NL" altLang="nl-NL" dirty="0">
-              <a:solidFill>
-                <a:schemeClr val="accent1">
-                  <a:lumMod val="25000"/>
-                </a:schemeClr>
-              </a:solidFill>
-              <a:latin typeface="Arial Unicode MS" pitchFamily="34" charset="-128"/>
-              <a:ea typeface="Arial Unicode MS" pitchFamily="34" charset="-128"/>
-              <a:cs typeface="Arial Unicode MS" pitchFamily="34" charset="-128"/>
-            </a:endParaRPr>
           </a:p>
         </p:txBody>
       </p:sp>
@@ -12681,16 +12417,6 @@
               </a:rPr>
               <a:t>¬P</a:t>
             </a:r>
-            <a:endParaRPr lang="nl-NL" altLang="nl-NL" dirty="0">
-              <a:solidFill>
-                <a:schemeClr val="accent1">
-                  <a:lumMod val="25000"/>
-                </a:schemeClr>
-              </a:solidFill>
-              <a:latin typeface="Arial Unicode MS" pitchFamily="34" charset="-128"/>
-              <a:ea typeface="Arial Unicode MS" pitchFamily="34" charset="-128"/>
-              <a:cs typeface="Arial Unicode MS" pitchFamily="34" charset="-128"/>
-            </a:endParaRPr>
           </a:p>
         </p:txBody>
       </p:sp>
@@ -12726,7 +12452,6 @@
             <a:tailEnd type="none" w="med" len="med"/>
           </a:ln>
           <a:effectLst/>
-          <a:extLst/>
         </p:spPr>
         <p:txBody>
           <a:bodyPr rtlCol="0" anchor="ctr"/>
@@ -12760,17 +12485,6 @@
           <a:lstStyle/>
           <a:p>
             <a:r>
-              <a:rPr lang="en-US" sz="1800" dirty="0" smtClean="0">
-                <a:solidFill>
-                  <a:srgbClr val="000000"/>
-                </a:solidFill>
-                <a:latin typeface="Calibri" panose="020F0502020204030204" pitchFamily="34" charset="0"/>
-                <a:ea typeface="ＭＳ Ｐゴシック" charset="0"/>
-                <a:cs typeface="Calibri" panose="020F0502020204030204" pitchFamily="34" charset="0"/>
-              </a:rPr>
-              <a:t>is a </a:t>
-            </a:r>
-            <a:r>
               <a:rPr lang="en-US" sz="1800" dirty="0">
                 <a:solidFill>
                   <a:srgbClr val="000000"/>
@@ -12779,7 +12493,7 @@
                 <a:ea typeface="ＭＳ Ｐゴシック" charset="0"/>
                 <a:cs typeface="Calibri" panose="020F0502020204030204" pitchFamily="34" charset="0"/>
               </a:rPr>
-              <a:t>tautology</a:t>
+              <a:t>is a tautology</a:t>
             </a:r>
             <a:endParaRPr lang="nl-NL" sz="1800" dirty="0">
               <a:solidFill>
@@ -12824,7 +12538,6 @@
             <a:tailEnd type="none" w="med" len="med"/>
           </a:ln>
           <a:effectLst/>
-          <a:extLst/>
         </p:spPr>
         <p:txBody>
           <a:bodyPr rtlCol="0" anchor="ctr"/>
@@ -12858,7 +12571,7 @@
           <a:lstStyle/>
           <a:p>
             <a:r>
-              <a:rPr lang="en-US" sz="1800" dirty="0" smtClean="0">
+              <a:rPr lang="en-US" sz="1800" dirty="0">
                 <a:solidFill>
                   <a:srgbClr val="000000"/>
                 </a:solidFill>
@@ -12911,7 +12624,6 @@
             <a:tailEnd type="none" w="med" len="med"/>
           </a:ln>
           <a:effectLst/>
-          <a:extLst/>
         </p:spPr>
         <p:txBody>
           <a:bodyPr rtlCol="0" anchor="ctr"/>
@@ -12945,17 +12657,6 @@
           <a:lstStyle/>
           <a:p>
             <a:r>
-              <a:rPr lang="en-US" sz="1800" dirty="0" smtClean="0">
-                <a:solidFill>
-                  <a:srgbClr val="000000"/>
-                </a:solidFill>
-                <a:latin typeface="Calibri" panose="020F0502020204030204" pitchFamily="34" charset="0"/>
-                <a:ea typeface="ＭＳ Ｐゴシック" charset="0"/>
-                <a:cs typeface="Calibri" panose="020F0502020204030204" pitchFamily="34" charset="0"/>
-              </a:rPr>
-              <a:t>is not </a:t>
-            </a:r>
-            <a:r>
               <a:rPr lang="en-US" sz="1800" dirty="0">
                 <a:solidFill>
                   <a:srgbClr val="000000"/>
@@ -12964,18 +12665,7 @@
                 <a:ea typeface="ＭＳ Ｐゴシック" charset="0"/>
                 <a:cs typeface="Calibri" panose="020F0502020204030204" pitchFamily="34" charset="0"/>
               </a:rPr>
-              <a:t>a </a:t>
-            </a:r>
-            <a:r>
-              <a:rPr lang="en-US" sz="1800" dirty="0" smtClean="0">
-                <a:solidFill>
-                  <a:srgbClr val="000000"/>
-                </a:solidFill>
-                <a:latin typeface="Calibri" panose="020F0502020204030204" pitchFamily="34" charset="0"/>
-                <a:ea typeface="ＭＳ Ｐゴシック" charset="0"/>
-                <a:cs typeface="Calibri" panose="020F0502020204030204" pitchFamily="34" charset="0"/>
-              </a:rPr>
-              <a:t>contradiction</a:t>
+              <a:t>is not a contradiction</a:t>
             </a:r>
             <a:endParaRPr lang="nl-NL" sz="1800" dirty="0">
               <a:solidFill>
@@ -13012,7 +12702,7 @@
           <a:p>
             <a:pPr algn="ctr"/>
             <a:r>
-              <a:rPr lang="en-US" sz="1800" dirty="0" smtClean="0">
+              <a:rPr lang="en-US" sz="1800" dirty="0">
                 <a:solidFill>
                   <a:srgbClr val="000000"/>
                 </a:solidFill>
@@ -13026,7 +12716,7 @@
           <a:p>
             <a:pPr algn="ctr"/>
             <a:r>
-              <a:rPr lang="en-US" sz="1800" dirty="0" smtClean="0">
+              <a:rPr lang="en-US" sz="1800" dirty="0">
                 <a:solidFill>
                   <a:srgbClr val="000000"/>
                 </a:solidFill>
@@ -13071,7 +12761,7 @@
           <a:p>
             <a:pPr algn="ctr"/>
             <a:r>
-              <a:rPr lang="en-US" sz="1800" dirty="0" smtClean="0">
+              <a:rPr lang="en-US" sz="1800" dirty="0">
                 <a:solidFill>
                   <a:srgbClr val="000000"/>
                 </a:solidFill>
@@ -13085,7 +12775,7 @@
           <a:p>
             <a:pPr algn="ctr"/>
             <a:r>
-              <a:rPr lang="en-US" sz="1800" dirty="0" smtClean="0">
+              <a:rPr lang="en-US" sz="1800" dirty="0">
                 <a:solidFill>
                   <a:srgbClr val="000000"/>
                 </a:solidFill>
@@ -13664,18 +13354,14 @@
           <a:lstStyle/>
           <a:p>
             <a:r>
-              <a:rPr lang="en-US" dirty="0" err="1" smtClean="0"/>
+              <a:rPr lang="en-US" dirty="0" err="1"/>
               <a:t>Reductio</a:t>
             </a:r>
             <a:r>
-              <a:rPr lang="en-US" dirty="0" smtClean="0"/>
-              <a:t> </a:t>
-            </a:r>
-            <a:r>
               <a:rPr lang="en-US" dirty="0"/>
-              <a:t>ad absurdum</a:t>
-            </a:r>
-            <a:endParaRPr lang="nl-NL" altLang="nl-NL" dirty="0" smtClean="0">
+              <a:t> ad absurdum</a:t>
+            </a:r>
+            <a:endParaRPr lang="nl-NL" altLang="nl-NL" dirty="0">
               <a:latin typeface="Arial" pitchFamily="34" charset="0"/>
               <a:cs typeface="Arial" pitchFamily="34" charset="0"/>
             </a:endParaRPr>
@@ -13701,7 +13387,7 @@
               <a:buFont typeface="Wingdings" pitchFamily="2" charset="2"/>
               <a:buChar char="q"/>
             </a:pPr>
-            <a:endParaRPr lang="nl-NL" altLang="nl-NL" sz="2800" dirty="0" smtClean="0">
+            <a:endParaRPr lang="nl-NL" altLang="nl-NL" sz="2800" dirty="0">
               <a:latin typeface="Arial" pitchFamily="34" charset="0"/>
               <a:cs typeface="Arial" pitchFamily="34" charset="0"/>
             </a:endParaRPr>
@@ -13712,41 +13398,26 @@
               <a:buChar char="q"/>
             </a:pPr>
             <a:r>
-              <a:rPr lang="nl-NL" altLang="nl-NL" sz="2800" dirty="0" smtClean="0">
+              <a:rPr lang="nl-NL" altLang="nl-NL" sz="2800" dirty="0">
                 <a:latin typeface="Arial" pitchFamily="34" charset="0"/>
                 <a:cs typeface="Arial" pitchFamily="34" charset="0"/>
               </a:rPr>
-              <a:t>prove </a:t>
-            </a:r>
-            <a:r>
-              <a:rPr lang="nl-NL" altLang="nl-NL" sz="2800" dirty="0" smtClean="0">
-                <a:latin typeface="Arial" pitchFamily="34" charset="0"/>
-                <a:cs typeface="Arial" pitchFamily="34" charset="0"/>
-              </a:rPr>
-              <a:t>a proposition with </a:t>
-            </a:r>
-            <a:r>
-              <a:rPr lang="en-US" sz="2800" dirty="0" smtClean="0"/>
+              <a:t>prove a proposition with </a:t>
+            </a:r>
+            <a:r>
+              <a:rPr lang="en-US" sz="2800" dirty="0"/>
               <a:t>"</a:t>
             </a:r>
             <a:r>
-              <a:rPr lang="en-US" sz="2800" dirty="0" err="1" smtClean="0"/>
+              <a:rPr lang="en-US" sz="2800" dirty="0" err="1"/>
               <a:t>reductio</a:t>
             </a:r>
             <a:r>
-              <a:rPr lang="en-US" sz="2800" dirty="0" smtClean="0"/>
-              <a:t> </a:t>
-            </a:r>
-            <a:r>
               <a:rPr lang="en-US" sz="2800" dirty="0"/>
-              <a:t>ad </a:t>
-            </a:r>
-            <a:r>
-              <a:rPr lang="en-US" sz="2800" dirty="0" smtClean="0"/>
-              <a:t>absurdum"</a:t>
-            </a:r>
-            <a:r>
-              <a:rPr lang="nl-NL" altLang="nl-NL" sz="2800" dirty="0" smtClean="0">
+              <a:t> ad absurdum"</a:t>
+            </a:r>
+            <a:r>
+              <a:rPr lang="nl-NL" altLang="nl-NL" sz="2800" dirty="0">
                 <a:latin typeface="Arial" pitchFamily="34" charset="0"/>
                 <a:cs typeface="Arial" pitchFamily="34" charset="0"/>
               </a:rPr>
@@ -13759,7 +13430,7 @@
               <a:buNone/>
             </a:pPr>
             <a:r>
-              <a:rPr lang="nl-NL" altLang="nl-NL" sz="2800" i="1" dirty="0" smtClean="0">
+              <a:rPr lang="nl-NL" altLang="nl-NL" sz="2800" i="1" dirty="0">
                 <a:solidFill>
                   <a:srgbClr val="00B050"/>
                 </a:solidFill>
@@ -13769,7 +13440,7 @@
               <a:t>“if a proposition is never false,</a:t>
             </a:r>
             <a:br>
-              <a:rPr lang="nl-NL" altLang="nl-NL" sz="2800" i="1" dirty="0" smtClean="0">
+              <a:rPr lang="nl-NL" altLang="nl-NL" sz="2800" i="1" dirty="0">
                 <a:solidFill>
                   <a:srgbClr val="00B050"/>
                 </a:solidFill>
@@ -13778,7 +13449,7 @@
               </a:rPr>
             </a:br>
             <a:r>
-              <a:rPr lang="nl-NL" altLang="nl-NL" sz="2800" i="1" dirty="0" smtClean="0">
+              <a:rPr lang="nl-NL" altLang="nl-NL" sz="2800" i="1" dirty="0">
                 <a:solidFill>
                   <a:srgbClr val="00B050"/>
                 </a:solidFill>
@@ -13794,14 +13465,14 @@
               <a:buChar char="q"/>
             </a:pPr>
             <a:r>
-              <a:rPr lang="nl-NL" altLang="nl-NL" sz="2800" dirty="0" smtClean="0">
+              <a:rPr lang="nl-NL" altLang="nl-NL" sz="2800" dirty="0">
                 <a:latin typeface="Arial" pitchFamily="34" charset="0"/>
                 <a:cs typeface="Arial" pitchFamily="34" charset="0"/>
               </a:rPr>
               <a:t>in other words: </a:t>
             </a:r>
             <a:r>
-              <a:rPr lang="nl-NL" altLang="nl-NL" sz="2800" dirty="0" smtClean="0">
+              <a:rPr lang="nl-NL" altLang="nl-NL" sz="2800" dirty="0">
                 <a:latin typeface="Arial Unicode MS" pitchFamily="34" charset="-128"/>
                 <a:ea typeface="Arial Unicode MS" pitchFamily="34" charset="-128"/>
                 <a:cs typeface="Arial Unicode MS" pitchFamily="34" charset="-128"/>
@@ -13815,7 +13486,7 @@
               <a:buChar char="q"/>
             </a:pPr>
             <a:r>
-              <a:rPr lang="nl-NL" altLang="nl-NL" sz="2800" dirty="0" smtClean="0">
+              <a:rPr lang="nl-NL" altLang="nl-NL" sz="2800" dirty="0">
                 <a:latin typeface="Arial" panose="020B0604020202020204" pitchFamily="34" charset="0"/>
                 <a:ea typeface="Arial Unicode MS" pitchFamily="34" charset="-128"/>
                 <a:cs typeface="Arial" panose="020B0604020202020204" pitchFamily="34" charset="0"/>
@@ -13829,7 +13500,7 @@
               <a:buChar char="q"/>
             </a:pPr>
             <a:r>
-              <a:rPr lang="en-US" altLang="nl-NL" sz="2400" dirty="0" smtClean="0">
+              <a:rPr lang="en-US" altLang="nl-NL" sz="2400" dirty="0">
                 <a:latin typeface="Arial" panose="020B0604020202020204" pitchFamily="34" charset="0"/>
                 <a:ea typeface="Arial Unicode MS" pitchFamily="34" charset="-128"/>
                 <a:cs typeface="Arial" panose="020B0604020202020204" pitchFamily="34" charset="0"/>
@@ -13842,15 +13513,7 @@
                 <a:ea typeface="Arial Unicode MS" pitchFamily="34" charset="-128"/>
                 <a:cs typeface="Arial Unicode MS" pitchFamily="34" charset="-128"/>
               </a:rPr>
-              <a:t>¬P </a:t>
-            </a:r>
-            <a:r>
-              <a:rPr lang="nl-NL" altLang="nl-NL" sz="2400" dirty="0" smtClean="0">
-                <a:latin typeface="Arial Unicode MS" pitchFamily="34" charset="-128"/>
-                <a:ea typeface="Arial Unicode MS" pitchFamily="34" charset="-128"/>
-                <a:cs typeface="Arial Unicode MS" pitchFamily="34" charset="-128"/>
-              </a:rPr>
-              <a:t>is never true</a:t>
+              <a:t>¬P is never true</a:t>
             </a:r>
           </a:p>
           <a:p>
@@ -13859,7 +13522,7 @@
               <a:buChar char="q"/>
             </a:pPr>
             <a:r>
-              <a:rPr lang="en-US" altLang="nl-NL" sz="2400" dirty="0" smtClean="0">
+              <a:rPr lang="en-US" altLang="nl-NL" sz="2400" dirty="0">
                 <a:latin typeface="Arial" panose="020B0604020202020204" pitchFamily="34" charset="0"/>
                 <a:ea typeface="Arial Unicode MS" pitchFamily="34" charset="-128"/>
                 <a:cs typeface="Arial" panose="020B0604020202020204" pitchFamily="34" charset="0"/>
@@ -13867,14 +13530,14 @@
               <a:t>show that </a:t>
             </a:r>
             <a:r>
-              <a:rPr lang="nl-NL" altLang="nl-NL" sz="2400" dirty="0" smtClean="0">
+              <a:rPr lang="nl-NL" altLang="nl-NL" sz="2400" dirty="0">
                 <a:latin typeface="Arial Unicode MS" pitchFamily="34" charset="-128"/>
                 <a:ea typeface="Arial Unicode MS" pitchFamily="34" charset="-128"/>
                 <a:cs typeface="Arial Unicode MS" pitchFamily="34" charset="-128"/>
               </a:rPr>
               <a:t>¬P is a contradiction!</a:t>
             </a:r>
-            <a:endParaRPr lang="nl-NL" altLang="nl-NL" sz="2400" dirty="0" smtClean="0">
+            <a:endParaRPr lang="nl-NL" altLang="nl-NL" sz="2400" dirty="0">
               <a:latin typeface="Arial" pitchFamily="34" charset="0"/>
               <a:cs typeface="Arial" pitchFamily="34" charset="0"/>
             </a:endParaRPr>
@@ -13937,7 +13600,6 @@
             <a:tailEnd type="none" w="med" len="med"/>
           </a:ln>
           <a:effectLst/>
-          <a:extLst/>
         </p:spPr>
         <p:txBody>
           <a:bodyPr vert="horz" wrap="square" lIns="91440" tIns="45720" rIns="91440" bIns="45720" numCol="1" rtlCol="0" anchor="ctr" anchorCtr="0" compatLnSpc="1">
@@ -13949,7 +13611,7 @@
           <a:p>
             <a:pPr algn="ctr" eaLnBrk="0" hangingPunct="0"/>
             <a:r>
-              <a:rPr lang="en-US" sz="1400" dirty="0" smtClean="0">
+              <a:rPr lang="en-US" sz="1400" dirty="0">
                 <a:solidFill>
                   <a:srgbClr val="000000"/>
                 </a:solidFill>
@@ -13997,7 +13659,6 @@
             <a:tailEnd type="none" w="med" len="med"/>
           </a:ln>
           <a:effectLst/>
-          <a:extLst/>
         </p:spPr>
         <p:txBody>
           <a:bodyPr vert="horz" wrap="square" lIns="91440" tIns="45720" rIns="91440" bIns="45720" numCol="1" rtlCol="0" anchor="t" anchorCtr="0" compatLnSpc="1">
@@ -14046,7 +13707,6 @@
             <a:tailEnd type="none" w="med" len="med"/>
           </a:ln>
           <a:effectLst/>
-          <a:extLst/>
         </p:spPr>
         <p:txBody>
           <a:bodyPr vert="horz" wrap="square" lIns="91440" tIns="45720" rIns="91440" bIns="45720" numCol="1" rtlCol="0" anchor="ctr" anchorCtr="0" compatLnSpc="1">
@@ -14058,7 +13718,7 @@
           <a:p>
             <a:pPr algn="ctr" eaLnBrk="0" hangingPunct="0"/>
             <a:r>
-              <a:rPr lang="en-US" sz="1400" dirty="0" smtClean="0">
+              <a:rPr lang="en-US" sz="1400" dirty="0">
                 <a:solidFill>
                   <a:srgbClr val="000000"/>
                 </a:solidFill>
@@ -14740,7 +14400,7 @@
           <a:lstStyle/>
           <a:p>
             <a:r>
-              <a:rPr lang="nl-NL" altLang="nl-NL" dirty="0" smtClean="0">
+              <a:rPr lang="nl-NL" altLang="nl-NL" dirty="0">
                 <a:latin typeface="Arial" pitchFamily="34" charset="0"/>
                 <a:cs typeface="Arial" pitchFamily="34" charset="0"/>
               </a:rPr>
@@ -14774,7 +14434,7 @@
               <a:buChar char="q"/>
             </a:pPr>
             <a:r>
-              <a:rPr lang="nl-NL" altLang="nl-NL" sz="2000" dirty="0" smtClean="0">
+              <a:rPr lang="nl-NL" altLang="nl-NL" sz="2000" dirty="0">
                 <a:latin typeface="Arial" pitchFamily="34" charset="0"/>
                 <a:cs typeface="Arial" pitchFamily="34" charset="0"/>
               </a:rPr>
@@ -14787,7 +14447,7 @@
               <a:buChar char="q"/>
             </a:pPr>
             <a:r>
-              <a:rPr lang="nl-NL" altLang="nl-NL" sz="2000" dirty="0" smtClean="0">
+              <a:rPr lang="nl-NL" altLang="nl-NL" sz="2000" dirty="0">
                 <a:latin typeface="Arial" pitchFamily="34" charset="0"/>
                 <a:cs typeface="Arial" pitchFamily="34" charset="0"/>
               </a:rPr>
@@ -14799,15 +14459,7 @@
                 <a:ea typeface="Arial Unicode MS" pitchFamily="34" charset="-128"/>
                 <a:cs typeface="Arial Unicode MS" pitchFamily="34" charset="-128"/>
               </a:rPr>
-              <a:t>¬P </a:t>
-            </a:r>
-            <a:r>
-              <a:rPr lang="nl-NL" altLang="nl-NL" sz="2000" dirty="0" smtClean="0">
-                <a:latin typeface="Arial Unicode MS" pitchFamily="34" charset="-128"/>
-                <a:ea typeface="Arial Unicode MS" pitchFamily="34" charset="-128"/>
-                <a:cs typeface="Arial Unicode MS" pitchFamily="34" charset="-128"/>
-              </a:rPr>
-              <a:t>}</a:t>
+              <a:t>¬P }</a:t>
             </a:r>
           </a:p>
           <a:p>
@@ -14816,7 +14468,7 @@
               <a:buChar char="q"/>
             </a:pPr>
             <a:r>
-              <a:rPr lang="en-US" altLang="nl-NL" sz="2000" dirty="0" smtClean="0">
+              <a:rPr lang="en-US" altLang="nl-NL" sz="2000" dirty="0">
                 <a:latin typeface="Arial Unicode MS" pitchFamily="34" charset="-128"/>
                 <a:ea typeface="Arial Unicode MS" pitchFamily="34" charset="-128"/>
                 <a:cs typeface="Arial Unicode MS" pitchFamily="34" charset="-128"/>
@@ -14829,52 +14481,23 @@
                 <a:ea typeface="Arial Unicode MS" pitchFamily="34" charset="-128"/>
                 <a:cs typeface="Arial Unicode MS" pitchFamily="34" charset="-128"/>
               </a:rPr>
-              <a:t>¬</a:t>
-            </a:r>
-            <a:r>
-              <a:rPr lang="nl-NL" altLang="nl-NL" sz="2000" dirty="0" smtClean="0">
-                <a:latin typeface="Arial Unicode MS" pitchFamily="34" charset="-128"/>
-                <a:ea typeface="Arial Unicode MS" pitchFamily="34" charset="-128"/>
-                <a:cs typeface="Arial Unicode MS" pitchFamily="34" charset="-128"/>
-              </a:rPr>
-              <a:t>P is a contradiction</a:t>
+              <a:t>¬P is a contradiction</a:t>
             </a:r>
             <a:br>
-              <a:rPr lang="nl-NL" altLang="nl-NL" sz="2000" dirty="0" smtClean="0">
+              <a:rPr lang="nl-NL" altLang="nl-NL" sz="2000" dirty="0">
                 <a:latin typeface="Arial Unicode MS" pitchFamily="34" charset="-128"/>
                 <a:ea typeface="Arial Unicode MS" pitchFamily="34" charset="-128"/>
                 <a:cs typeface="Arial Unicode MS" pitchFamily="34" charset="-128"/>
               </a:rPr>
             </a:br>
             <a:r>
-              <a:rPr lang="nl-NL" altLang="nl-NL" sz="2000" dirty="0" smtClean="0">
+              <a:rPr lang="nl-NL" altLang="nl-NL" sz="2000" dirty="0">
                 <a:latin typeface="Arial Unicode MS" pitchFamily="34" charset="-128"/>
                 <a:ea typeface="Arial Unicode MS" pitchFamily="34" charset="-128"/>
                 <a:cs typeface="Arial Unicode MS" pitchFamily="34" charset="-128"/>
               </a:rPr>
-              <a:t>(because</a:t>
-            </a:r>
-            <a:r>
-              <a:rPr lang="nl-NL" altLang="nl-NL" sz="2000" dirty="0" smtClean="0">
-                <a:latin typeface="Arial Unicode MS" pitchFamily="34" charset="-128"/>
-                <a:ea typeface="Arial Unicode MS" pitchFamily="34" charset="-128"/>
-                <a:cs typeface="Arial Unicode MS" pitchFamily="34" charset="-128"/>
-              </a:rPr>
-              <a:t>: then P is a </a:t>
-            </a:r>
-            <a:r>
-              <a:rPr lang="nl-NL" altLang="nl-NL" sz="2000" dirty="0" smtClean="0">
-                <a:latin typeface="Arial Unicode MS" pitchFamily="34" charset="-128"/>
-                <a:ea typeface="Arial Unicode MS" pitchFamily="34" charset="-128"/>
-                <a:cs typeface="Arial Unicode MS" pitchFamily="34" charset="-128"/>
-              </a:rPr>
-              <a:t>tautology)</a:t>
-            </a:r>
-            <a:endParaRPr lang="nl-NL" altLang="nl-NL" sz="2000" dirty="0" smtClean="0">
-              <a:latin typeface="Arial Unicode MS" pitchFamily="34" charset="-128"/>
-              <a:ea typeface="Arial Unicode MS" pitchFamily="34" charset="-128"/>
-              <a:cs typeface="Arial Unicode MS" pitchFamily="34" charset="-128"/>
-            </a:endParaRPr>
+              <a:t>(because: then P is a tautology)</a:t>
+            </a:r>
           </a:p>
           <a:p>
             <a:pPr>
@@ -14882,7 +14505,7 @@
               <a:buChar char="q"/>
             </a:pPr>
             <a:r>
-              <a:rPr lang="nl-NL" altLang="nl-NL" sz="2000" dirty="0" smtClean="0">
+              <a:rPr lang="nl-NL" altLang="nl-NL" sz="2000" dirty="0">
                 <a:latin typeface="Arial Unicode MS" pitchFamily="34" charset="-128"/>
                 <a:ea typeface="Arial Unicode MS" pitchFamily="34" charset="-128"/>
                 <a:cs typeface="Arial Unicode MS" pitchFamily="34" charset="-128"/>
@@ -14896,7 +14519,7 @@
               <a:buChar char="q"/>
             </a:pPr>
             <a:r>
-              <a:rPr lang="nl-NL" altLang="nl-NL" sz="2000" dirty="0" smtClean="0">
+              <a:rPr lang="nl-NL" altLang="nl-NL" sz="2000" dirty="0">
                 <a:latin typeface="Arial Unicode MS" pitchFamily="34" charset="-128"/>
                 <a:ea typeface="Arial Unicode MS" pitchFamily="34" charset="-128"/>
                 <a:cs typeface="Arial Unicode MS" pitchFamily="34" charset="-128"/>
@@ -14904,14 +14527,14 @@
               <a:t>if a set in a node contains formulas like X and ¬X, </a:t>
             </a:r>
             <a:br>
-              <a:rPr lang="nl-NL" altLang="nl-NL" sz="2000" dirty="0" smtClean="0">
+              <a:rPr lang="nl-NL" altLang="nl-NL" sz="2000" dirty="0">
                 <a:latin typeface="Arial Unicode MS" pitchFamily="34" charset="-128"/>
                 <a:ea typeface="Arial Unicode MS" pitchFamily="34" charset="-128"/>
                 <a:cs typeface="Arial Unicode MS" pitchFamily="34" charset="-128"/>
               </a:rPr>
             </a:br>
             <a:r>
-              <a:rPr lang="nl-NL" altLang="nl-NL" sz="2000" dirty="0" smtClean="0">
+              <a:rPr lang="nl-NL" altLang="nl-NL" sz="2000" dirty="0">
                 <a:latin typeface="Arial Unicode MS" pitchFamily="34" charset="-128"/>
                 <a:ea typeface="Arial Unicode MS" pitchFamily="34" charset="-128"/>
                 <a:cs typeface="Arial Unicode MS" pitchFamily="34" charset="-128"/>
@@ -14930,37 +14553,8 @@
                 <a:ea typeface="Arial Unicode MS" pitchFamily="34" charset="-128"/>
                 <a:cs typeface="Arial Unicode MS" pitchFamily="34" charset="-128"/>
               </a:rPr>
-              <a:t>if </a:t>
-            </a:r>
-            <a:r>
-              <a:rPr lang="nl-NL" altLang="nl-NL" sz="2000" dirty="0" smtClean="0">
-                <a:latin typeface="Arial Unicode MS" pitchFamily="34" charset="-128"/>
-                <a:ea typeface="Arial Unicode MS" pitchFamily="34" charset="-128"/>
-                <a:cs typeface="Arial Unicode MS" pitchFamily="34" charset="-128"/>
-              </a:rPr>
-              <a:t>all children contain a contradiction, </a:t>
-            </a:r>
-            <a:r>
-              <a:rPr lang="nl-NL" altLang="nl-NL" sz="2000" dirty="0">
-                <a:latin typeface="Arial Unicode MS" pitchFamily="34" charset="-128"/>
-                <a:ea typeface="Arial Unicode MS" pitchFamily="34" charset="-128"/>
-                <a:cs typeface="Arial Unicode MS" pitchFamily="34" charset="-128"/>
-              </a:rPr>
-              <a:t>then the parent node </a:t>
-            </a:r>
-            <a:r>
-              <a:rPr lang="nl-NL" altLang="nl-NL" sz="2000" dirty="0" smtClean="0">
-                <a:latin typeface="Arial Unicode MS" pitchFamily="34" charset="-128"/>
-                <a:ea typeface="Arial Unicode MS" pitchFamily="34" charset="-128"/>
-                <a:cs typeface="Arial Unicode MS" pitchFamily="34" charset="-128"/>
-              </a:rPr>
-              <a:t>contains a contradiction as well; we can close the parent</a:t>
-            </a:r>
-            <a:endParaRPr lang="nl-NL" altLang="nl-NL" sz="2000" dirty="0">
-              <a:latin typeface="Arial Unicode MS" pitchFamily="34" charset="-128"/>
-              <a:ea typeface="Arial Unicode MS" pitchFamily="34" charset="-128"/>
-              <a:cs typeface="Arial Unicode MS" pitchFamily="34" charset="-128"/>
-            </a:endParaRPr>
+              <a:t>if all children contain a contradiction, then the parent node contains a contradiction as well; we can close the parent</a:t>
+            </a:r>
           </a:p>
           <a:p>
             <a:pPr>
@@ -14968,7 +14562,7 @@
               <a:buChar char="q"/>
             </a:pPr>
             <a:r>
-              <a:rPr lang="nl-NL" altLang="nl-NL" sz="2000" dirty="0" smtClean="0">
+              <a:rPr lang="nl-NL" altLang="nl-NL" sz="2000" dirty="0">
                 <a:latin typeface="Arial Unicode MS" pitchFamily="34" charset="-128"/>
                 <a:ea typeface="Arial Unicode MS" pitchFamily="34" charset="-128"/>
                 <a:cs typeface="Arial Unicode MS" pitchFamily="34" charset="-128"/>
@@ -14976,14 +14570,14 @@
               <a:t>if all nodes in a tree are closed then we are ready:</a:t>
             </a:r>
             <a:br>
-              <a:rPr lang="nl-NL" altLang="nl-NL" sz="2000" dirty="0" smtClean="0">
+              <a:rPr lang="nl-NL" altLang="nl-NL" sz="2000" dirty="0">
                 <a:latin typeface="Arial Unicode MS" pitchFamily="34" charset="-128"/>
                 <a:ea typeface="Arial Unicode MS" pitchFamily="34" charset="-128"/>
                 <a:cs typeface="Arial Unicode MS" pitchFamily="34" charset="-128"/>
               </a:rPr>
             </a:br>
             <a:r>
-              <a:rPr lang="nl-NL" altLang="nl-NL" sz="2000" dirty="0" smtClean="0">
+              <a:rPr lang="nl-NL" altLang="nl-NL" sz="2000" dirty="0">
                 <a:latin typeface="Arial Unicode MS" pitchFamily="34" charset="-128"/>
                 <a:ea typeface="Arial Unicode MS" pitchFamily="34" charset="-128"/>
                 <a:cs typeface="Arial Unicode MS" pitchFamily="34" charset="-128"/>
@@ -14996,7 +14590,7 @@
               <a:buFont typeface="Wingdings" pitchFamily="2" charset="2"/>
               <a:buChar char="q"/>
             </a:pPr>
-            <a:endParaRPr lang="nl-NL" altLang="nl-NL" sz="2000" dirty="0" smtClean="0">
+            <a:endParaRPr lang="nl-NL" altLang="nl-NL" sz="2000" dirty="0">
               <a:latin typeface="Arial" pitchFamily="34" charset="0"/>
               <a:cs typeface="Arial" pitchFamily="34" charset="0"/>
             </a:endParaRPr>
@@ -15827,7 +15421,7 @@
           <a:lstStyle/>
           <a:p>
             <a:r>
-              <a:rPr lang="nl-NL" altLang="nl-NL" dirty="0" smtClean="0">
+              <a:rPr lang="nl-NL" altLang="nl-NL" dirty="0">
                 <a:latin typeface="Arial" pitchFamily="34" charset="0"/>
                 <a:cs typeface="Arial" pitchFamily="34" charset="0"/>
               </a:rPr>
@@ -15856,7 +15450,7 @@
               <a:buChar char="q"/>
             </a:pPr>
             <a:r>
-              <a:rPr lang="nl-NL" altLang="nl-NL" sz="2000" dirty="0" smtClean="0">
+              <a:rPr lang="nl-NL" altLang="nl-NL" sz="2000" dirty="0">
                 <a:latin typeface="Arial" pitchFamily="34" charset="0"/>
                 <a:cs typeface="Arial" pitchFamily="34" charset="0"/>
               </a:rPr>
@@ -15868,17 +15462,9 @@
                 <a:ea typeface="Arial Unicode MS" pitchFamily="34" charset="-128"/>
                 <a:cs typeface="Arial Unicode MS" pitchFamily="34" charset="-128"/>
               </a:rPr>
-              <a:t>¬</a:t>
-            </a:r>
-            <a:r>
-              <a:rPr lang="nl-NL" altLang="nl-NL" sz="2000" dirty="0" smtClean="0">
-                <a:latin typeface="Arial Unicode MS" pitchFamily="34" charset="-128"/>
-                <a:ea typeface="Arial Unicode MS" pitchFamily="34" charset="-128"/>
-                <a:cs typeface="Arial Unicode MS" pitchFamily="34" charset="-128"/>
-              </a:rPr>
-              <a:t>P}</a:t>
-            </a:r>
-            <a:endParaRPr lang="nl-NL" altLang="nl-NL" sz="2000" dirty="0" smtClean="0">
+              <a:t>¬P}</a:t>
+            </a:r>
+            <a:endParaRPr lang="nl-NL" altLang="nl-NL" sz="2000" dirty="0">
               <a:latin typeface="Arial" pitchFamily="34" charset="0"/>
               <a:cs typeface="Arial" pitchFamily="34" charset="0"/>
             </a:endParaRPr>
@@ -15889,7 +15475,7 @@
               <a:buChar char="q"/>
             </a:pPr>
             <a:r>
-              <a:rPr lang="nl-NL" altLang="nl-NL" sz="2000" dirty="0" smtClean="0">
+              <a:rPr lang="nl-NL" altLang="nl-NL" sz="2000" dirty="0">
                 <a:latin typeface="Arial Unicode MS" pitchFamily="34" charset="-128"/>
                 <a:ea typeface="Arial Unicode MS" pitchFamily="34" charset="-128"/>
                 <a:cs typeface="Arial Unicode MS" pitchFamily="34" charset="-128"/>
@@ -15903,7 +15489,7 @@
               <a:buChar char="q"/>
             </a:pPr>
             <a:r>
-              <a:rPr lang="nl-NL" altLang="nl-NL" sz="2000" dirty="0" smtClean="0">
+              <a:rPr lang="nl-NL" altLang="nl-NL" sz="2000" dirty="0">
                 <a:latin typeface="Arial Unicode MS" pitchFamily="34" charset="-128"/>
                 <a:ea typeface="Arial Unicode MS" pitchFamily="34" charset="-128"/>
                 <a:cs typeface="Arial Unicode MS" pitchFamily="34" charset="-128"/>
@@ -15917,7 +15503,7 @@
               <a:buChar char="q"/>
             </a:pPr>
             <a:r>
-              <a:rPr lang="nl-NL" altLang="nl-NL" sz="1800" dirty="0" smtClean="0">
+              <a:rPr lang="nl-NL" altLang="nl-NL" sz="1800" dirty="0">
                 <a:latin typeface="Arial Unicode MS" panose="020B0604020202020204" pitchFamily="34" charset="-128"/>
                 <a:ea typeface="Arial Unicode MS" panose="020B0604020202020204" pitchFamily="34" charset="-128"/>
                 <a:cs typeface="Arial Unicode MS" panose="020B0604020202020204" pitchFamily="34" charset="-128"/>
@@ -15935,7 +15521,7 @@
               <a:buChar char="q"/>
             </a:pPr>
             <a:r>
-              <a:rPr lang="nl-NL" altLang="nl-NL" sz="1800" dirty="0" smtClean="0">
+              <a:rPr lang="nl-NL" altLang="nl-NL" sz="1800" dirty="0">
                 <a:latin typeface="Arial Unicode MS" panose="020B0604020202020204" pitchFamily="34" charset="-128"/>
                 <a:ea typeface="Arial Unicode MS" panose="020B0604020202020204" pitchFamily="34" charset="-128"/>
                 <a:cs typeface="Arial Unicode MS" panose="020B0604020202020204" pitchFamily="34" charset="-128"/>
@@ -15949,41 +15535,25 @@
               <a:buChar char="q"/>
             </a:pPr>
             <a:r>
-              <a:rPr lang="nl-NL" altLang="nl-NL" sz="1800" dirty="0" smtClean="0">
+              <a:rPr lang="nl-NL" altLang="nl-NL" sz="1800" dirty="0">
                 <a:latin typeface="Arial Unicode MS" panose="020B0604020202020204" pitchFamily="34" charset="-128"/>
                 <a:ea typeface="Arial Unicode MS" panose="020B0604020202020204" pitchFamily="34" charset="-128"/>
                 <a:cs typeface="Arial Unicode MS" panose="020B0604020202020204" pitchFamily="34" charset="-128"/>
               </a:rPr>
-              <a:t>replace (</a:t>
-            </a:r>
-            <a:r>
+              <a:t>replace (P⋁Q) by two new sets; one with P and one with Q;</a:t>
+            </a:r>
+            <a:br>
               <a:rPr lang="nl-NL" altLang="nl-NL" sz="1800" dirty="0">
-                <a:latin typeface="Arial Unicode MS" pitchFamily="34" charset="-128"/>
-                <a:ea typeface="Arial Unicode MS" pitchFamily="34" charset="-128"/>
-                <a:cs typeface="Arial Unicode MS" pitchFamily="34" charset="-128"/>
-              </a:rPr>
-              <a:t>P⋁Q</a:t>
-            </a:r>
-            <a:r>
-              <a:rPr lang="nl-NL" altLang="nl-NL" sz="1800" dirty="0" smtClean="0">
-                <a:latin typeface="Arial Unicode MS" pitchFamily="34" charset="-128"/>
-                <a:ea typeface="Arial Unicode MS" pitchFamily="34" charset="-128"/>
-                <a:cs typeface="Arial Unicode MS" pitchFamily="34" charset="-128"/>
-              </a:rPr>
-              <a:t>) by two new sets; one with P and one with Q;</a:t>
-            </a:r>
-            <a:br>
-              <a:rPr lang="nl-NL" altLang="nl-NL" sz="1800" dirty="0" smtClean="0">
-                <a:latin typeface="Arial Unicode MS" pitchFamily="34" charset="-128"/>
-                <a:ea typeface="Arial Unicode MS" pitchFamily="34" charset="-128"/>
-                <a:cs typeface="Arial Unicode MS" pitchFamily="34" charset="-128"/>
+                <a:latin typeface="Arial Unicode MS" panose="020B0604020202020204" pitchFamily="34" charset="-128"/>
+                <a:ea typeface="Arial Unicode MS" panose="020B0604020202020204" pitchFamily="34" charset="-128"/>
+                <a:cs typeface="Arial Unicode MS" panose="020B0604020202020204" pitchFamily="34" charset="-128"/>
               </a:rPr>
             </a:br>
             <a:r>
-              <a:rPr lang="nl-NL" altLang="nl-NL" sz="1800" dirty="0" smtClean="0">
-                <a:latin typeface="Arial Unicode MS" pitchFamily="34" charset="-128"/>
-                <a:ea typeface="Arial Unicode MS" pitchFamily="34" charset="-128"/>
-                <a:cs typeface="Arial Unicode MS" pitchFamily="34" charset="-128"/>
+              <a:rPr lang="nl-NL" altLang="nl-NL" sz="1800" dirty="0">
+                <a:latin typeface="Arial Unicode MS" panose="020B0604020202020204" pitchFamily="34" charset="-128"/>
+                <a:ea typeface="Arial Unicode MS" panose="020B0604020202020204" pitchFamily="34" charset="-128"/>
+                <a:cs typeface="Arial Unicode MS" panose="020B0604020202020204" pitchFamily="34" charset="-128"/>
               </a:rPr>
               <a:t>each new set is a new child node</a:t>
             </a:r>
@@ -15994,10 +15564,10 @@
               <a:buChar char="q"/>
             </a:pPr>
             <a:r>
-              <a:rPr lang="nl-NL" altLang="nl-NL" sz="1800" dirty="0" smtClean="0">
-                <a:latin typeface="Arial Unicode MS" pitchFamily="34" charset="-128"/>
-                <a:ea typeface="Arial Unicode MS" pitchFamily="34" charset="-128"/>
-                <a:cs typeface="Arial Unicode MS" pitchFamily="34" charset="-128"/>
+              <a:rPr lang="nl-NL" altLang="nl-NL" sz="1800" dirty="0">
+                <a:latin typeface="Arial Unicode MS" panose="020B0604020202020204" pitchFamily="34" charset="-128"/>
+                <a:ea typeface="Arial Unicode MS" panose="020B0604020202020204" pitchFamily="34" charset="-128"/>
+                <a:cs typeface="Arial Unicode MS" panose="020B0604020202020204" pitchFamily="34" charset="-128"/>
               </a:rPr>
               <a:t>…</a:t>
             </a:r>
@@ -16064,7 +15634,7 @@
           <a:p>
             <a:pPr algn="ctr"/>
             <a:r>
-              <a:rPr lang="nl-NL" altLang="nl-NL" sz="2000" dirty="0" smtClean="0">
+              <a:rPr lang="nl-NL" altLang="nl-NL" sz="2000" dirty="0">
                 <a:solidFill>
                   <a:schemeClr val="accent3"/>
                 </a:solidFill>
@@ -16075,7 +15645,7 @@
               <a:t>give the rules for: </a:t>
             </a:r>
             <a:br>
-              <a:rPr lang="nl-NL" altLang="nl-NL" sz="2000" dirty="0" smtClean="0">
+              <a:rPr lang="nl-NL" altLang="nl-NL" sz="2000" dirty="0">
                 <a:solidFill>
                   <a:schemeClr val="accent3"/>
                 </a:solidFill>
@@ -16096,7 +15666,7 @@
               <a:t>¬(</a:t>
             </a:r>
             <a:r>
-              <a:rPr lang="nl-NL" altLang="nl-NL" sz="2000" dirty="0" smtClean="0">
+              <a:rPr lang="nl-NL" altLang="nl-NL" sz="2000" dirty="0">
                 <a:solidFill>
                   <a:schemeClr val="accent3"/>
                 </a:solidFill>
@@ -16104,17 +15674,6 @@
                 <a:cs typeface="Arial" pitchFamily="34" charset="0"/>
               </a:rPr>
               <a:t>P</a:t>
-            </a:r>
-            <a:r>
-              <a:rPr lang="nl-NL" altLang="nl-NL" sz="2000" dirty="0" smtClean="0">
-                <a:solidFill>
-                  <a:schemeClr val="accent3"/>
-                </a:solidFill>
-                <a:latin typeface="Arial Unicode MS" pitchFamily="34" charset="-128"/>
-                <a:ea typeface="Arial Unicode MS" pitchFamily="34" charset="-128"/>
-                <a:cs typeface="Arial Unicode MS" pitchFamily="34" charset="-128"/>
-              </a:rPr>
-              <a:t>⋁Q</a:t>
             </a:r>
             <a:r>
               <a:rPr lang="nl-NL" altLang="nl-NL" sz="2000" dirty="0">
@@ -16125,7 +15684,7 @@
                 <a:ea typeface="Arial Unicode MS" pitchFamily="34" charset="-128"/>
                 <a:cs typeface="Arial Unicode MS" pitchFamily="34" charset="-128"/>
               </a:rPr>
-              <a:t>), ¬(</a:t>
+              <a:t>⋁Q), ¬(</a:t>
             </a:r>
             <a:r>
               <a:rPr lang="nl-NL" altLang="nl-NL" sz="2000" dirty="0">
@@ -16146,33 +15705,11 @@
                 <a:ea typeface="Arial Unicode MS" pitchFamily="34" charset="-128"/>
                 <a:cs typeface="Arial Unicode MS" pitchFamily="34" charset="-128"/>
               </a:rPr>
-              <a:t>⋀Q), </a:t>
-            </a:r>
-            <a:r>
-              <a:rPr lang="nl-NL" altLang="nl-NL" sz="2000" dirty="0" smtClean="0">
-                <a:solidFill>
-                  <a:schemeClr val="accent3"/>
-                </a:solidFill>
-                <a:latin typeface="Arial Unicode MS" pitchFamily="34" charset="-128"/>
-                <a:ea typeface="Arial Unicode MS" pitchFamily="34" charset="-128"/>
-                <a:cs typeface="Arial Unicode MS" pitchFamily="34" charset="-128"/>
-              </a:rPr>
-              <a:t>P⇒Q, ¬(P⇒Q), </a:t>
+              <a:t>⋀Q), P⇒Q, ¬(P⇒Q), </a:t>
             </a:r>
           </a:p>
           <a:p>
             <a:pPr algn="ctr"/>
-            <a:r>
-              <a:rPr lang="nl-NL" altLang="nl-NL" sz="2000" dirty="0" smtClean="0">
-                <a:solidFill>
-                  <a:schemeClr val="accent3"/>
-                </a:solidFill>
-                <a:latin typeface="Arial Unicode MS" pitchFamily="34" charset="-128"/>
-                <a:ea typeface="Arial Unicode MS" pitchFamily="34" charset="-128"/>
-                <a:cs typeface="Arial Unicode MS" pitchFamily="34" charset="-128"/>
-              </a:rPr>
-              <a:t>P⇔Q, ¬(P⇔Q</a:t>
-            </a:r>
             <a:r>
               <a:rPr lang="nl-NL" altLang="nl-NL" sz="2000" dirty="0">
                 <a:solidFill>
@@ -16182,40 +15719,7 @@
                 <a:ea typeface="Arial Unicode MS" pitchFamily="34" charset="-128"/>
                 <a:cs typeface="Arial Unicode MS" pitchFamily="34" charset="-128"/>
               </a:rPr>
-              <a:t>), </a:t>
-            </a:r>
-            <a:r>
-              <a:rPr lang="nl-NL" altLang="nl-NL" sz="2000" dirty="0" smtClean="0">
-                <a:solidFill>
-                  <a:schemeClr val="accent3"/>
-                </a:solidFill>
-                <a:latin typeface="Arial Unicode MS" pitchFamily="34" charset="-128"/>
-                <a:ea typeface="Arial Unicode MS" pitchFamily="34" charset="-128"/>
-                <a:cs typeface="Arial Unicode MS" pitchFamily="34" charset="-128"/>
-              </a:rPr>
-              <a:t>P%Q</a:t>
-            </a:r>
-            <a:r>
-              <a:rPr lang="nl-NL" altLang="nl-NL" sz="2000" dirty="0">
-                <a:solidFill>
-                  <a:schemeClr val="accent3"/>
-                </a:solidFill>
-                <a:latin typeface="Arial Unicode MS" pitchFamily="34" charset="-128"/>
-                <a:ea typeface="Arial Unicode MS" pitchFamily="34" charset="-128"/>
-                <a:cs typeface="Arial Unicode MS" pitchFamily="34" charset="-128"/>
-              </a:rPr>
-              <a:t>, ¬(</a:t>
-            </a:r>
-            <a:r>
-              <a:rPr lang="nl-NL" altLang="nl-NL" sz="2000" dirty="0" smtClean="0">
-                <a:solidFill>
-                  <a:schemeClr val="accent3"/>
-                </a:solidFill>
-                <a:latin typeface="Arial Unicode MS" pitchFamily="34" charset="-128"/>
-                <a:ea typeface="Arial Unicode MS" pitchFamily="34" charset="-128"/>
-                <a:cs typeface="Arial Unicode MS" pitchFamily="34" charset="-128"/>
-              </a:rPr>
-              <a:t>P%Q)</a:t>
+              <a:t>P⇔Q, ¬(P⇔Q), P%Q, ¬(P%Q)</a:t>
             </a:r>
             <a:endParaRPr lang="nl-NL" sz="2000" dirty="0">
               <a:solidFill>
@@ -16571,7 +16075,7 @@
           <a:lstStyle/>
           <a:p>
             <a:r>
-              <a:rPr lang="nl-NL" altLang="nl-NL" dirty="0" smtClean="0">
+              <a:rPr lang="nl-NL" altLang="nl-NL" dirty="0">
                 <a:latin typeface="Arial" pitchFamily="34" charset="0"/>
                 <a:cs typeface="Arial" pitchFamily="34" charset="0"/>
               </a:rPr>
@@ -16605,7 +16109,7 @@
               <a:buNone/>
             </a:pPr>
             <a:r>
-              <a:rPr lang="nl-NL" altLang="nl-NL" sz="2400" dirty="0" smtClean="0">
+              <a:rPr lang="nl-NL" altLang="nl-NL" sz="2400" dirty="0">
                 <a:latin typeface="Arial Unicode MS" pitchFamily="34" charset="-128"/>
                 <a:ea typeface="Arial Unicode MS" pitchFamily="34" charset="-128"/>
                 <a:cs typeface="Arial Unicode MS" pitchFamily="34" charset="-128"/>
@@ -16618,7 +16122,7 @@
               <a:buFontTx/>
               <a:buNone/>
             </a:pPr>
-            <a:endParaRPr lang="nl-NL" altLang="nl-NL" sz="2400" dirty="0" smtClean="0">
+            <a:endParaRPr lang="nl-NL" altLang="nl-NL" sz="2400" dirty="0">
               <a:latin typeface="Arial" pitchFamily="34" charset="0"/>
               <a:cs typeface="Arial" pitchFamily="34" charset="0"/>
             </a:endParaRPr>
@@ -16854,7 +16358,7 @@
               <a:defRPr/>
             </a:pPr>
             <a:r>
-              <a:rPr lang="nl-NL" sz="2400" kern="0" dirty="0" smtClean="0">
+              <a:rPr lang="nl-NL" sz="2400" kern="0" dirty="0">
                 <a:latin typeface="Arial Unicode MS"/>
                 <a:ea typeface="Arial Unicode MS"/>
                 <a:cs typeface="Arial Unicode MS"/>
@@ -17128,7 +16632,7 @@
                 <a:defRPr/>
               </a:pPr>
               <a:r>
-                <a:rPr lang="nl-NL" sz="2400" kern="0" dirty="0" smtClean="0">
+                <a:rPr lang="nl-NL" sz="2400" kern="0" dirty="0">
                   <a:latin typeface="Arial Unicode MS"/>
                   <a:ea typeface="Arial Unicode MS"/>
                   <a:cs typeface="Arial Unicode MS"/>
@@ -17346,7 +16850,7 @@
                 <a:defRPr/>
               </a:pPr>
               <a:r>
-                <a:rPr lang="nl-NL" sz="2400" kern="0" dirty="0" smtClean="0">
+                <a:rPr lang="nl-NL" sz="2400" kern="0" dirty="0">
                   <a:latin typeface="Arial Unicode MS"/>
                   <a:ea typeface="Arial Unicode MS"/>
                   <a:cs typeface="Arial Unicode MS"/>
@@ -17621,28 +17125,12 @@
                 <a:defRPr/>
               </a:pPr>
               <a:r>
-                <a:rPr lang="nl-NL" sz="2400" kern="0" dirty="0" smtClean="0">
-                  <a:latin typeface="Arial Unicode MS"/>
-                  <a:ea typeface="Arial Unicode MS"/>
-                  <a:cs typeface="Arial Unicode MS"/>
-                </a:rPr>
-                <a:t>¬(P</a:t>
-              </a:r>
-              <a:r>
                 <a:rPr lang="nl-NL" sz="2400" kern="0" dirty="0">
                   <a:latin typeface="Arial Unicode MS"/>
                   <a:ea typeface="Arial Unicode MS"/>
                   <a:cs typeface="Arial Unicode MS"/>
                 </a:rPr>
-                <a:t>⋁</a:t>
-              </a:r>
-              <a:r>
-                <a:rPr lang="nl-NL" sz="2400" kern="0" dirty="0" smtClean="0">
-                  <a:latin typeface="Arial Unicode MS"/>
-                  <a:ea typeface="Arial Unicode MS"/>
-                  <a:cs typeface="Arial Unicode MS"/>
-                </a:rPr>
-                <a:t>Q)</a:t>
+                <a:t>¬(P⋁Q)</a:t>
               </a:r>
             </a:p>
             <a:p>
@@ -17860,31 +17348,7 @@
                   <a:ea typeface="Arial Unicode MS"/>
                   <a:cs typeface="Arial Unicode MS"/>
                 </a:rPr>
-                <a:t>¬</a:t>
-              </a:r>
-              <a:r>
-                <a:rPr lang="nl-NL" sz="2400" kern="0" dirty="0" smtClean="0">
-                  <a:latin typeface="Arial Unicode MS"/>
-                  <a:ea typeface="Arial Unicode MS"/>
-                  <a:cs typeface="Arial Unicode MS"/>
-                </a:rPr>
-                <a:t>P,</a:t>
-              </a:r>
-              <a:r>
-                <a:rPr lang="nl-NL" sz="2400" kern="0" dirty="0">
-                  <a:latin typeface="Arial Unicode MS"/>
-                  <a:ea typeface="Arial Unicode MS"/>
-                  <a:cs typeface="Arial Unicode MS"/>
-                </a:rPr>
-                <a:t> ¬</a:t>
-              </a:r>
-              <a:r>
-                <a:rPr lang="nl-NL" sz="2400" kern="0" dirty="0" smtClean="0">
-                  <a:latin typeface="Arial Unicode MS"/>
-                  <a:ea typeface="Arial Unicode MS"/>
-                  <a:cs typeface="Arial Unicode MS"/>
-                </a:rPr>
-                <a:t>Q</a:t>
+                <a:t>¬P, ¬Q</a:t>
               </a:r>
             </a:p>
             <a:p>
@@ -18154,7 +17618,7 @@
                 <a:defRPr/>
               </a:pPr>
               <a:r>
-                <a:rPr lang="nl-NL" sz="2400" kern="0" dirty="0" smtClean="0">
+                <a:rPr lang="nl-NL" sz="2400" kern="0" dirty="0">
                   <a:latin typeface="Arial Unicode MS"/>
                   <a:ea typeface="Arial Unicode MS"/>
                   <a:cs typeface="Arial Unicode MS"/>
@@ -18372,28 +17836,12 @@
                 <a:defRPr/>
               </a:pPr>
               <a:r>
-                <a:rPr lang="nl-NL" sz="2400" kern="0" dirty="0" smtClean="0">
-                  <a:latin typeface="Arial Unicode MS"/>
-                  <a:ea typeface="Arial Unicode MS"/>
-                  <a:cs typeface="Arial Unicode MS"/>
-                </a:rPr>
-                <a:t>P,</a:t>
-              </a:r>
-              <a:r>
                 <a:rPr lang="nl-NL" sz="2400" kern="0" dirty="0">
                   <a:latin typeface="Arial Unicode MS"/>
                   <a:ea typeface="Arial Unicode MS"/>
                   <a:cs typeface="Arial Unicode MS"/>
                 </a:rPr>
-                <a:t> ¬</a:t>
-              </a:r>
-              <a:r>
-                <a:rPr lang="nl-NL" sz="2400" kern="0" dirty="0" smtClean="0">
-                  <a:latin typeface="Arial Unicode MS"/>
-                  <a:ea typeface="Arial Unicode MS"/>
-                  <a:cs typeface="Arial Unicode MS"/>
-                </a:rPr>
-                <a:t>Q</a:t>
+                <a:t>P, ¬Q</a:t>
               </a:r>
             </a:p>
             <a:p>
@@ -18663,7 +18111,7 @@
                 <a:defRPr/>
               </a:pPr>
               <a:r>
-                <a:rPr lang="nl-NL" sz="2400" kern="0" dirty="0" smtClean="0">
+                <a:rPr lang="nl-NL" sz="2400" kern="0" dirty="0">
                   <a:latin typeface="Arial Unicode MS"/>
                   <a:ea typeface="Arial Unicode MS"/>
                   <a:cs typeface="Arial Unicode MS"/>
@@ -18873,7 +18321,7 @@
                 <a:defRPr/>
               </a:pPr>
               <a:r>
-                <a:rPr lang="nl-NL" sz="2400" kern="0" dirty="0" smtClean="0">
+                <a:rPr lang="nl-NL" sz="2400" kern="0" dirty="0">
                   <a:latin typeface="Arial Unicode MS"/>
                   <a:ea typeface="Arial Unicode MS"/>
                   <a:cs typeface="Arial Unicode MS"/>
@@ -19148,7 +18596,7 @@
                 <a:defRPr/>
               </a:pPr>
               <a:r>
-                <a:rPr lang="nl-NL" sz="2400" kern="0" dirty="0" smtClean="0">
+                <a:rPr lang="nl-NL" sz="2400" kern="0" dirty="0">
                   <a:latin typeface="Arial Unicode MS"/>
                   <a:ea typeface="Arial Unicode MS"/>
                   <a:cs typeface="Arial Unicode MS"/>
@@ -19366,7 +18814,7 @@
                 <a:defRPr/>
               </a:pPr>
               <a:r>
-                <a:rPr lang="nl-NL" sz="2400" kern="0" dirty="0" smtClean="0">
+                <a:rPr lang="nl-NL" sz="2400" kern="0" dirty="0">
                   <a:latin typeface="Arial Unicode MS"/>
                   <a:ea typeface="Arial Unicode MS"/>
                   <a:cs typeface="Arial Unicode MS"/>
@@ -19646,15 +19094,7 @@
                   <a:ea typeface="Arial Unicode MS"/>
                   <a:cs typeface="Arial Unicode MS"/>
                 </a:rPr>
-                <a:t>¬</a:t>
-              </a:r>
-              <a:r>
-                <a:rPr lang="nl-NL" sz="2400" kern="0" dirty="0" smtClean="0">
-                  <a:latin typeface="Arial Unicode MS"/>
-                  <a:ea typeface="Arial Unicode MS"/>
-                  <a:cs typeface="Arial Unicode MS"/>
-                </a:rPr>
-                <a:t>(P⋀Q)</a:t>
+                <a:t>¬(P⋀Q)</a:t>
               </a:r>
             </a:p>
             <a:p>
@@ -19872,31 +19312,7 @@
                   <a:ea typeface="Arial Unicode MS"/>
                   <a:cs typeface="Arial Unicode MS"/>
                 </a:rPr>
-                <a:t>¬</a:t>
-              </a:r>
-              <a:r>
-                <a:rPr lang="nl-NL" sz="2400" kern="0" dirty="0" smtClean="0">
-                  <a:latin typeface="Arial Unicode MS"/>
-                  <a:ea typeface="Arial Unicode MS"/>
-                  <a:cs typeface="Arial Unicode MS"/>
-                </a:rPr>
-                <a:t>P | </a:t>
-              </a:r>
-              <a:r>
-                <a:rPr lang="nl-NL" sz="2400" kern="0" dirty="0">
-                  <a:latin typeface="Arial Unicode MS"/>
-                  <a:ea typeface="Arial Unicode MS"/>
-                  <a:cs typeface="Arial Unicode MS"/>
-                </a:rPr>
-                <a:t>¬</a:t>
-              </a:r>
-              <a:r>
-                <a:rPr lang="nl-NL" sz="2400" kern="0" dirty="0" smtClean="0">
-                  <a:latin typeface="Arial Unicode MS"/>
-                  <a:ea typeface="Arial Unicode MS"/>
-                  <a:cs typeface="Arial Unicode MS"/>
-                </a:rPr>
-                <a:t>Q</a:t>
+                <a:t>¬P | ¬Q</a:t>
               </a:r>
             </a:p>
             <a:p>
@@ -19975,16 +19391,12 @@
           <a:lstStyle/>
           <a:p>
             <a:r>
-              <a:rPr lang="nl-NL" dirty="0" smtClean="0">
+              <a:rPr lang="nl-NL" dirty="0">
                 <a:latin typeface="Arial" panose="020B0604020202020204" pitchFamily="34" charset="0"/>
                 <a:cs typeface="Arial" panose="020B0604020202020204" pitchFamily="34" charset="0"/>
               </a:rPr>
               <a:t>double negation</a:t>
             </a:r>
-            <a:endParaRPr lang="nl-NL" dirty="0">
-              <a:latin typeface="Arial" panose="020B0604020202020204" pitchFamily="34" charset="0"/>
-              <a:cs typeface="Arial" panose="020B0604020202020204" pitchFamily="34" charset="0"/>
-            </a:endParaRPr>
           </a:p>
         </p:txBody>
       </p:sp>
@@ -20011,23 +19423,19 @@
           <a:lstStyle/>
           <a:p>
             <a:r>
-              <a:rPr lang="el-GR" dirty="0" smtClean="0">
+              <a:rPr lang="el-GR" dirty="0">
                 <a:latin typeface="Times New Roman"/>
                 <a:cs typeface="Times New Roman"/>
               </a:rPr>
               <a:t>α</a:t>
             </a:r>
             <a:r>
-              <a:rPr lang="nl-NL" dirty="0" smtClean="0">
+              <a:rPr lang="nl-NL" dirty="0">
                 <a:latin typeface="Arial" panose="020B0604020202020204" pitchFamily="34" charset="0"/>
                 <a:cs typeface="Arial" panose="020B0604020202020204" pitchFamily="34" charset="0"/>
               </a:rPr>
               <a:t>-rules</a:t>
             </a:r>
-            <a:endParaRPr lang="nl-NL" dirty="0">
-              <a:latin typeface="Arial" panose="020B0604020202020204" pitchFamily="34" charset="0"/>
-              <a:cs typeface="Arial" panose="020B0604020202020204" pitchFamily="34" charset="0"/>
-            </a:endParaRPr>
           </a:p>
         </p:txBody>
       </p:sp>
@@ -20061,16 +19469,12 @@
               <a:t>β</a:t>
             </a:r>
             <a:r>
-              <a:rPr lang="nl-NL" dirty="0" smtClean="0">
+              <a:rPr lang="nl-NL" dirty="0">
                 <a:latin typeface="Arial" panose="020B0604020202020204" pitchFamily="34" charset="0"/>
                 <a:cs typeface="Arial" panose="020B0604020202020204" pitchFamily="34" charset="0"/>
               </a:rPr>
               <a:t>-rules</a:t>
             </a:r>
-            <a:endParaRPr lang="nl-NL" dirty="0">
-              <a:latin typeface="Arial" panose="020B0604020202020204" pitchFamily="34" charset="0"/>
-              <a:cs typeface="Arial" panose="020B0604020202020204" pitchFamily="34" charset="0"/>
-            </a:endParaRPr>
           </a:p>
         </p:txBody>
       </p:sp>
@@ -20105,7 +19509,7 @@
           <a:p>
             <a:pPr algn="ctr"/>
             <a:r>
-              <a:rPr lang="nl-NL" sz="3200" dirty="0" smtClean="0">
+              <a:rPr lang="nl-NL" sz="3200" dirty="0">
                 <a:solidFill>
                   <a:schemeClr val="accent3"/>
                 </a:solidFill>
@@ -20115,7 +19519,7 @@
               <a:t>what to do with % and </a:t>
             </a:r>
             <a:r>
-              <a:rPr lang="nl-NL" sz="3200" dirty="0" smtClean="0">
+              <a:rPr lang="nl-NL" sz="3200" dirty="0">
                 <a:solidFill>
                   <a:schemeClr val="accent3"/>
                 </a:solidFill>
@@ -21263,18 +20667,13 @@
           <a:lstStyle/>
           <a:p>
             <a:r>
-              <a:rPr lang="nl-NL" dirty="0" smtClean="0">
+              <a:rPr lang="nl-NL" dirty="0">
                 <a:latin typeface="Arial Unicode MS" panose="020B0604020202020204" pitchFamily="34" charset="-128"/>
                 <a:ea typeface="Arial Unicode MS" panose="020B0604020202020204" pitchFamily="34" charset="-128"/>
                 <a:cs typeface="Arial Unicode MS" panose="020B0604020202020204" pitchFamily="34" charset="-128"/>
               </a:rPr>
               <a:t>example</a:t>
             </a:r>
-            <a:endParaRPr lang="nl-NL" dirty="0">
-              <a:latin typeface="Arial Unicode MS" panose="020B0604020202020204" pitchFamily="34" charset="-128"/>
-              <a:ea typeface="Arial Unicode MS" panose="020B0604020202020204" pitchFamily="34" charset="-128"/>
-              <a:cs typeface="Arial Unicode MS" panose="020B0604020202020204" pitchFamily="34" charset="-128"/>
-            </a:endParaRPr>
           </a:p>
         </p:txBody>
       </p:sp>
@@ -21331,18 +20730,13 @@
           <a:p>
             <a:pPr algn="ctr"/>
             <a:r>
-              <a:rPr lang="nl-NL" sz="1600" dirty="0" smtClean="0">
+              <a:rPr lang="nl-NL" sz="1600" dirty="0">
                 <a:latin typeface="Arial Unicode MS" panose="020B0604020202020204" pitchFamily="34" charset="-128"/>
                 <a:ea typeface="Arial Unicode MS" panose="020B0604020202020204" pitchFamily="34" charset="-128"/>
                 <a:cs typeface="Arial Unicode MS" panose="020B0604020202020204" pitchFamily="34" charset="-128"/>
               </a:rPr>
               <a:t>{¬(((P⋁Q)⇒R)⇒((P⇒R)⋁(Q⇒R)) }</a:t>
             </a:r>
-            <a:endParaRPr lang="nl-NL" sz="1600" dirty="0">
-              <a:latin typeface="Arial Unicode MS" panose="020B0604020202020204" pitchFamily="34" charset="-128"/>
-              <a:ea typeface="Arial Unicode MS" panose="020B0604020202020204" pitchFamily="34" charset="-128"/>
-              <a:cs typeface="Arial Unicode MS" panose="020B0604020202020204" pitchFamily="34" charset="-128"/>
-            </a:endParaRPr>
           </a:p>
         </p:txBody>
       </p:sp>
@@ -21370,34 +20764,13 @@
           <a:p>
             <a:pPr algn="ctr"/>
             <a:r>
-              <a:rPr lang="nl-NL" sz="1600" dirty="0" smtClean="0">
-                <a:latin typeface="Arial Unicode MS" panose="020B0604020202020204" pitchFamily="34" charset="-128"/>
-                <a:ea typeface="Arial Unicode MS" panose="020B0604020202020204" pitchFamily="34" charset="-128"/>
-                <a:cs typeface="Arial Unicode MS" panose="020B0604020202020204" pitchFamily="34" charset="-128"/>
-              </a:rPr>
-              <a:t>{ (P⋁Q)⇒R, </a:t>
-            </a:r>
-            <a:r>
               <a:rPr lang="nl-NL" sz="1600" dirty="0">
                 <a:latin typeface="Arial Unicode MS" panose="020B0604020202020204" pitchFamily="34" charset="-128"/>
                 <a:ea typeface="Arial Unicode MS" panose="020B0604020202020204" pitchFamily="34" charset="-128"/>
                 <a:cs typeface="Arial Unicode MS" panose="020B0604020202020204" pitchFamily="34" charset="-128"/>
               </a:rPr>
-              <a:t>¬</a:t>
-            </a:r>
-            <a:r>
-              <a:rPr lang="nl-NL" sz="1600" dirty="0" smtClean="0">
-                <a:latin typeface="Arial Unicode MS" panose="020B0604020202020204" pitchFamily="34" charset="-128"/>
-                <a:ea typeface="Arial Unicode MS" panose="020B0604020202020204" pitchFamily="34" charset="-128"/>
-                <a:cs typeface="Arial Unicode MS" panose="020B0604020202020204" pitchFamily="34" charset="-128"/>
-              </a:rPr>
-              <a:t>((P⇒R)⋁(Q⇒R)) }</a:t>
-            </a:r>
-            <a:endParaRPr lang="nl-NL" sz="1600" dirty="0">
-              <a:latin typeface="Arial Unicode MS" panose="020B0604020202020204" pitchFamily="34" charset="-128"/>
-              <a:ea typeface="Arial Unicode MS" panose="020B0604020202020204" pitchFamily="34" charset="-128"/>
-              <a:cs typeface="Arial Unicode MS" panose="020B0604020202020204" pitchFamily="34" charset="-128"/>
-            </a:endParaRPr>
+              <a:t>{ (P⋁Q)⇒R, ¬((P⇒R)⋁(Q⇒R)) }</a:t>
+            </a:r>
           </a:p>
         </p:txBody>
       </p:sp>
@@ -21425,18 +20798,13 @@
           <a:p>
             <a:pPr algn="ctr"/>
             <a:r>
-              <a:rPr lang="nl-NL" sz="1600" dirty="0" smtClean="0">
+              <a:rPr lang="nl-NL" sz="1600" dirty="0">
                 <a:latin typeface="Arial Unicode MS" panose="020B0604020202020204" pitchFamily="34" charset="-128"/>
                 <a:ea typeface="Arial Unicode MS" panose="020B0604020202020204" pitchFamily="34" charset="-128"/>
                 <a:cs typeface="Arial Unicode MS" panose="020B0604020202020204" pitchFamily="34" charset="-128"/>
               </a:rPr>
               <a:t>{ (P⋁Q)⇒R, ¬(P⇒R), ¬(Q⇒R) }</a:t>
             </a:r>
-            <a:endParaRPr lang="nl-NL" sz="1600" dirty="0">
-              <a:latin typeface="Arial Unicode MS" panose="020B0604020202020204" pitchFamily="34" charset="-128"/>
-              <a:ea typeface="Arial Unicode MS" panose="020B0604020202020204" pitchFamily="34" charset="-128"/>
-              <a:cs typeface="Arial Unicode MS" panose="020B0604020202020204" pitchFamily="34" charset="-128"/>
-            </a:endParaRPr>
           </a:p>
         </p:txBody>
       </p:sp>
@@ -21464,18 +20832,13 @@
           <a:p>
             <a:pPr algn="ctr"/>
             <a:r>
-              <a:rPr lang="nl-NL" sz="1600" dirty="0" smtClean="0">
+              <a:rPr lang="nl-NL" sz="1600" dirty="0">
                 <a:latin typeface="Arial Unicode MS" panose="020B0604020202020204" pitchFamily="34" charset="-128"/>
                 <a:ea typeface="Arial Unicode MS" panose="020B0604020202020204" pitchFamily="34" charset="-128"/>
                 <a:cs typeface="Arial Unicode MS" panose="020B0604020202020204" pitchFamily="34" charset="-128"/>
               </a:rPr>
               <a:t>{ (P⋁Q)⇒R, P, ¬R, ¬(Q⇒R) }</a:t>
             </a:r>
-            <a:endParaRPr lang="nl-NL" sz="1600" dirty="0">
-              <a:latin typeface="Arial Unicode MS" panose="020B0604020202020204" pitchFamily="34" charset="-128"/>
-              <a:ea typeface="Arial Unicode MS" panose="020B0604020202020204" pitchFamily="34" charset="-128"/>
-              <a:cs typeface="Arial Unicode MS" panose="020B0604020202020204" pitchFamily="34" charset="-128"/>
-            </a:endParaRPr>
           </a:p>
         </p:txBody>
       </p:sp>
@@ -21503,18 +20866,13 @@
           <a:p>
             <a:pPr algn="ctr"/>
             <a:r>
-              <a:rPr lang="nl-NL" sz="1600" dirty="0" smtClean="0">
+              <a:rPr lang="nl-NL" sz="1600" dirty="0">
                 <a:latin typeface="Arial Unicode MS" panose="020B0604020202020204" pitchFamily="34" charset="-128"/>
                 <a:ea typeface="Arial Unicode MS" panose="020B0604020202020204" pitchFamily="34" charset="-128"/>
                 <a:cs typeface="Arial Unicode MS" panose="020B0604020202020204" pitchFamily="34" charset="-128"/>
               </a:rPr>
               <a:t>{ (P⋁Q)⇒R, P, ¬R, Q }</a:t>
             </a:r>
-            <a:endParaRPr lang="nl-NL" sz="1600" dirty="0">
-              <a:latin typeface="Arial Unicode MS" panose="020B0604020202020204" pitchFamily="34" charset="-128"/>
-              <a:ea typeface="Arial Unicode MS" panose="020B0604020202020204" pitchFamily="34" charset="-128"/>
-              <a:cs typeface="Arial Unicode MS" panose="020B0604020202020204" pitchFamily="34" charset="-128"/>
-            </a:endParaRPr>
           </a:p>
         </p:txBody>
       </p:sp>
@@ -21542,34 +20900,13 @@
           <a:p>
             <a:pPr algn="ctr"/>
             <a:r>
-              <a:rPr lang="nl-NL" sz="1600" dirty="0" smtClean="0">
-                <a:latin typeface="Arial Unicode MS" panose="020B0604020202020204" pitchFamily="34" charset="-128"/>
-                <a:ea typeface="Arial Unicode MS" panose="020B0604020202020204" pitchFamily="34" charset="-128"/>
-                <a:cs typeface="Arial Unicode MS" panose="020B0604020202020204" pitchFamily="34" charset="-128"/>
-              </a:rPr>
-              <a:t>{</a:t>
-            </a:r>
-            <a:r>
               <a:rPr lang="nl-NL" sz="1600" dirty="0">
                 <a:latin typeface="Arial Unicode MS" panose="020B0604020202020204" pitchFamily="34" charset="-128"/>
                 <a:ea typeface="Arial Unicode MS" panose="020B0604020202020204" pitchFamily="34" charset="-128"/>
                 <a:cs typeface="Arial Unicode MS" panose="020B0604020202020204" pitchFamily="34" charset="-128"/>
               </a:rPr>
-              <a:t>¬</a:t>
-            </a:r>
-            <a:r>
-              <a:rPr lang="nl-NL" sz="1600" dirty="0" smtClean="0">
-                <a:latin typeface="Arial Unicode MS" panose="020B0604020202020204" pitchFamily="34" charset="-128"/>
-                <a:ea typeface="Arial Unicode MS" panose="020B0604020202020204" pitchFamily="34" charset="-128"/>
-                <a:cs typeface="Arial Unicode MS" panose="020B0604020202020204" pitchFamily="34" charset="-128"/>
-              </a:rPr>
-              <a:t>(P⋁Q), P, ¬R, Q }</a:t>
-            </a:r>
-            <a:endParaRPr lang="nl-NL" sz="1600" dirty="0">
-              <a:latin typeface="Arial Unicode MS" panose="020B0604020202020204" pitchFamily="34" charset="-128"/>
-              <a:ea typeface="Arial Unicode MS" panose="020B0604020202020204" pitchFamily="34" charset="-128"/>
-              <a:cs typeface="Arial Unicode MS" panose="020B0604020202020204" pitchFamily="34" charset="-128"/>
-            </a:endParaRPr>
+              <a:t>{¬(P⋁Q), P, ¬R, Q }</a:t>
+            </a:r>
           </a:p>
         </p:txBody>
       </p:sp>
@@ -21597,18 +20934,13 @@
           <a:p>
             <a:pPr algn="ctr"/>
             <a:r>
-              <a:rPr lang="nl-NL" sz="1600" dirty="0" smtClean="0">
+              <a:rPr lang="nl-NL" sz="1600" dirty="0">
                 <a:latin typeface="Arial Unicode MS" panose="020B0604020202020204" pitchFamily="34" charset="-128"/>
                 <a:ea typeface="Arial Unicode MS" panose="020B0604020202020204" pitchFamily="34" charset="-128"/>
                 <a:cs typeface="Arial Unicode MS" panose="020B0604020202020204" pitchFamily="34" charset="-128"/>
               </a:rPr>
               <a:t>{R, P, ¬R, Q }</a:t>
             </a:r>
-            <a:endParaRPr lang="nl-NL" sz="1600" dirty="0">
-              <a:latin typeface="Arial Unicode MS" panose="020B0604020202020204" pitchFamily="34" charset="-128"/>
-              <a:ea typeface="Arial Unicode MS" panose="020B0604020202020204" pitchFamily="34" charset="-128"/>
-              <a:cs typeface="Arial Unicode MS" panose="020B0604020202020204" pitchFamily="34" charset="-128"/>
-            </a:endParaRPr>
           </a:p>
         </p:txBody>
       </p:sp>
@@ -21817,18 +21149,13 @@
             <a:lstStyle/>
             <a:p>
               <a:r>
-                <a:rPr lang="nl-NL" sz="1600" dirty="0" smtClean="0">
+                <a:rPr lang="nl-NL" sz="1600" dirty="0">
                   <a:latin typeface="Arial Unicode MS" panose="020B0604020202020204" pitchFamily="34" charset="-128"/>
                   <a:ea typeface="Arial Unicode MS" panose="020B0604020202020204" pitchFamily="34" charset="-128"/>
                   <a:cs typeface="Arial Unicode MS" panose="020B0604020202020204" pitchFamily="34" charset="-128"/>
                 </a:rPr>
                 <a:t>   closed!</a:t>
               </a:r>
-              <a:endParaRPr lang="nl-NL" sz="1600" dirty="0">
-                <a:latin typeface="Arial Unicode MS" panose="020B0604020202020204" pitchFamily="34" charset="-128"/>
-                <a:ea typeface="Arial Unicode MS" panose="020B0604020202020204" pitchFamily="34" charset="-128"/>
-                <a:cs typeface="Arial Unicode MS" panose="020B0604020202020204" pitchFamily="34" charset="-128"/>
-              </a:endParaRPr>
             </a:p>
           </p:txBody>
         </p:sp>
@@ -21857,18 +21184,13 @@
           <a:p>
             <a:pPr algn="ctr"/>
             <a:r>
-              <a:rPr lang="nl-NL" sz="1600" dirty="0" smtClean="0">
+              <a:rPr lang="nl-NL" sz="1600" dirty="0">
                 <a:latin typeface="Arial Unicode MS" panose="020B0604020202020204" pitchFamily="34" charset="-128"/>
                 <a:ea typeface="Arial Unicode MS" panose="020B0604020202020204" pitchFamily="34" charset="-128"/>
                 <a:cs typeface="Arial Unicode MS" panose="020B0604020202020204" pitchFamily="34" charset="-128"/>
               </a:rPr>
               <a:t>{¬P, ¬Q, P, ¬R, Q }</a:t>
             </a:r>
-            <a:endParaRPr lang="nl-NL" sz="1600" dirty="0">
-              <a:latin typeface="Arial Unicode MS" panose="020B0604020202020204" pitchFamily="34" charset="-128"/>
-              <a:ea typeface="Arial Unicode MS" panose="020B0604020202020204" pitchFamily="34" charset="-128"/>
-              <a:cs typeface="Arial Unicode MS" panose="020B0604020202020204" pitchFamily="34" charset="-128"/>
-            </a:endParaRPr>
           </a:p>
         </p:txBody>
       </p:sp>
@@ -22077,18 +21399,13 @@
             <a:lstStyle/>
             <a:p>
               <a:r>
-                <a:rPr lang="nl-NL" sz="1600" dirty="0" smtClean="0">
+                <a:rPr lang="nl-NL" sz="1600" dirty="0">
                   <a:latin typeface="Arial Unicode MS" panose="020B0604020202020204" pitchFamily="34" charset="-128"/>
                   <a:ea typeface="Arial Unicode MS" panose="020B0604020202020204" pitchFamily="34" charset="-128"/>
                   <a:cs typeface="Arial Unicode MS" panose="020B0604020202020204" pitchFamily="34" charset="-128"/>
                 </a:rPr>
                 <a:t>   closed!</a:t>
               </a:r>
-              <a:endParaRPr lang="nl-NL" sz="1600" dirty="0">
-                <a:latin typeface="Arial Unicode MS" panose="020B0604020202020204" pitchFamily="34" charset="-128"/>
-                <a:ea typeface="Arial Unicode MS" panose="020B0604020202020204" pitchFamily="34" charset="-128"/>
-                <a:cs typeface="Arial Unicode MS" panose="020B0604020202020204" pitchFamily="34" charset="-128"/>
-              </a:endParaRPr>
             </a:p>
           </p:txBody>
         </p:sp>
@@ -22440,17 +21757,6 @@
           <a:p>
             <a:pPr algn="ctr"/>
             <a:r>
-              <a:rPr lang="nl-NL" sz="1800" dirty="0" smtClean="0">
-                <a:solidFill>
-                  <a:schemeClr val="bg1"/>
-                </a:solidFill>
-                <a:latin typeface="Arial Unicode MS" panose="020B0604020202020204" pitchFamily="34" charset="-128"/>
-                <a:ea typeface="Arial Unicode MS" panose="020B0604020202020204" pitchFamily="34" charset="-128"/>
-                <a:cs typeface="Arial Unicode MS" panose="020B0604020202020204" pitchFamily="34" charset="-128"/>
-              </a:rPr>
-              <a:t>((</a:t>
-            </a:r>
-            <a:r>
               <a:rPr lang="nl-NL" sz="1800" dirty="0">
                 <a:solidFill>
                   <a:schemeClr val="bg1"/>
@@ -22459,21 +21765,10 @@
                 <a:ea typeface="Arial Unicode MS" panose="020B0604020202020204" pitchFamily="34" charset="-128"/>
                 <a:cs typeface="Arial Unicode MS" panose="020B0604020202020204" pitchFamily="34" charset="-128"/>
               </a:rPr>
-              <a:t>P⋁Q)⇒R)⇒((P⇒R)⋁(Q⇒R</a:t>
-            </a:r>
-            <a:r>
-              <a:rPr lang="nl-NL" sz="1800" dirty="0" smtClean="0">
-                <a:solidFill>
-                  <a:schemeClr val="bg1"/>
-                </a:solidFill>
-                <a:latin typeface="Arial Unicode MS" panose="020B0604020202020204" pitchFamily="34" charset="-128"/>
-                <a:ea typeface="Arial Unicode MS" panose="020B0604020202020204" pitchFamily="34" charset="-128"/>
-                <a:cs typeface="Arial Unicode MS" panose="020B0604020202020204" pitchFamily="34" charset="-128"/>
-              </a:rPr>
-              <a:t>)) </a:t>
+              <a:t>((P⋁Q)⇒R)⇒((P⇒R)⋁(Q⇒R)) </a:t>
             </a:r>
             <a:br>
-              <a:rPr lang="nl-NL" sz="1800" dirty="0" smtClean="0">
+              <a:rPr lang="nl-NL" sz="1800" dirty="0">
                 <a:solidFill>
                   <a:schemeClr val="bg1"/>
                 </a:solidFill>
@@ -22522,7 +21817,7 @@
           <a:p>
             <a:pPr algn="ctr"/>
             <a:r>
-              <a:rPr lang="nl-NL" sz="1800" dirty="0" smtClean="0">
+              <a:rPr lang="nl-NL" sz="1800" dirty="0">
                 <a:solidFill>
                   <a:schemeClr val="bg1"/>
                 </a:solidFill>
@@ -22532,14 +21827,6 @@
               </a:rPr>
               <a:t>is a tautology</a:t>
             </a:r>
-            <a:endParaRPr lang="nl-NL" sz="1800" dirty="0">
-              <a:solidFill>
-                <a:schemeClr val="bg1"/>
-              </a:solidFill>
-              <a:latin typeface="Arial Unicode MS" panose="020B0604020202020204" pitchFamily="34" charset="-128"/>
-              <a:ea typeface="Arial Unicode MS" panose="020B0604020202020204" pitchFamily="34" charset="-128"/>
-              <a:cs typeface="Arial Unicode MS" panose="020B0604020202020204" pitchFamily="34" charset="-128"/>
-            </a:endParaRPr>
           </a:p>
         </p:txBody>
       </p:sp>
@@ -22614,14 +21901,14 @@
                 <a:t>α</a:t>
               </a:r>
               <a:r>
-                <a:rPr lang="nl-NL" sz="1600" dirty="0" smtClean="0">
+                <a:rPr lang="nl-NL" sz="1600" dirty="0">
                   <a:latin typeface="Arial" panose="020B0604020202020204" pitchFamily="34" charset="0"/>
                   <a:cs typeface="Arial" panose="020B0604020202020204" pitchFamily="34" charset="0"/>
                 </a:rPr>
                 <a:t>-rules	    </a:t>
               </a:r>
               <a:r>
-                <a:rPr lang="el-GR" sz="1600" dirty="0" smtClean="0">
+                <a:rPr lang="el-GR" sz="1600" dirty="0">
                   <a:latin typeface="Times New Roman"/>
                   <a:cs typeface="Times New Roman"/>
                 </a:rPr>
@@ -22637,16 +21924,12 @@
             </a:p>
             <a:p>
               <a:r>
-                <a:rPr lang="nl-NL" sz="1600" dirty="0" smtClean="0">
+                <a:rPr lang="nl-NL" sz="1600" dirty="0">
                   <a:latin typeface="Arial" panose="020B0604020202020204" pitchFamily="34" charset="0"/>
                   <a:cs typeface="Arial" panose="020B0604020202020204" pitchFamily="34" charset="0"/>
                 </a:rPr>
                 <a:t>	</a:t>
               </a:r>
-              <a:endParaRPr lang="nl-NL" sz="1600" dirty="0">
-                <a:latin typeface="Arial" panose="020B0604020202020204" pitchFamily="34" charset="0"/>
-                <a:cs typeface="Arial" panose="020B0604020202020204" pitchFamily="34" charset="0"/>
-              </a:endParaRPr>
             </a:p>
           </p:txBody>
         </p:sp>
@@ -24386,10 +23669,9 @@
           <a:lstStyle/>
           <a:p>
             <a:r>
-              <a:rPr lang="nl-NL" dirty="0" smtClean="0"/>
+              <a:rPr lang="nl-NL" dirty="0"/>
               <a:t>Tableaux for quantifiers</a:t>
             </a:r>
-            <a:endParaRPr lang="nl-NL" dirty="0"/>
           </a:p>
         </p:txBody>
       </p:sp>
@@ -24418,7 +23700,7 @@
               <a:buChar char="q"/>
             </a:pPr>
             <a:r>
-              <a:rPr lang="nl-NL" dirty="0" smtClean="0"/>
+              <a:rPr lang="nl-NL" dirty="0"/>
               <a:t>semantic tableaux can be extended with quantifiers</a:t>
             </a:r>
           </a:p>
@@ -24428,7 +23710,7 @@
               <a:buChar char="q"/>
             </a:pPr>
             <a:r>
-              <a:rPr lang="nl-NL" dirty="0" smtClean="0"/>
+              <a:rPr lang="nl-NL" dirty="0"/>
               <a:t>new rules: </a:t>
             </a:r>
             <a:r>
@@ -24443,17 +23725,10 @@
                 <a:latin typeface="Arial" panose="020B0604020202020204" pitchFamily="34" charset="0"/>
                 <a:cs typeface="Arial" panose="020B0604020202020204" pitchFamily="34" charset="0"/>
               </a:rPr>
-              <a:t> </a:t>
-            </a:r>
-            <a:r>
-              <a:rPr lang="nl-NL" dirty="0" smtClean="0">
-                <a:latin typeface="Arial" panose="020B0604020202020204" pitchFamily="34" charset="0"/>
-                <a:cs typeface="Arial" panose="020B0604020202020204" pitchFamily="34" charset="0"/>
-              </a:rPr>
-              <a:t>and </a:t>
-            </a:r>
-            <a:r>
-              <a:rPr lang="el-GR" dirty="0" smtClean="0">
+              <a:t> and </a:t>
+            </a:r>
+            <a:r>
+              <a:rPr lang="el-GR" dirty="0">
                 <a:latin typeface="Times New Roman"/>
                 <a:cs typeface="Times New Roman"/>
               </a:rPr>
@@ -24470,43 +23745,39 @@
               <a:buChar char="q"/>
             </a:pPr>
             <a:r>
-              <a:rPr lang="nl-NL" dirty="0" smtClean="0">
+              <a:rPr lang="nl-NL" dirty="0">
                 <a:latin typeface="Arial" panose="020B0604020202020204" pitchFamily="34" charset="0"/>
                 <a:cs typeface="Arial" panose="020B0604020202020204" pitchFamily="34" charset="0"/>
               </a:rPr>
               <a:t>problem…: </a:t>
             </a:r>
             <a:br>
-              <a:rPr lang="nl-NL" dirty="0" smtClean="0">
+              <a:rPr lang="nl-NL" dirty="0">
                 <a:latin typeface="Arial" panose="020B0604020202020204" pitchFamily="34" charset="0"/>
                 <a:cs typeface="Arial" panose="020B0604020202020204" pitchFamily="34" charset="0"/>
               </a:rPr>
             </a:br>
             <a:r>
-              <a:rPr lang="el-GR" dirty="0" smtClean="0">
+              <a:rPr lang="el-GR" dirty="0">
                 <a:latin typeface="Times New Roman"/>
                 <a:cs typeface="Times New Roman"/>
               </a:rPr>
               <a:t>γ</a:t>
             </a:r>
             <a:r>
-              <a:rPr lang="nl-NL" dirty="0" smtClean="0">
+              <a:rPr lang="nl-NL" dirty="0">
                 <a:latin typeface="Arial" panose="020B0604020202020204" pitchFamily="34" charset="0"/>
                 <a:cs typeface="Arial" panose="020B0604020202020204" pitchFamily="34" charset="0"/>
               </a:rPr>
               <a:t> rules don't give simpler rules</a:t>
             </a:r>
-            <a:endParaRPr lang="nl-NL" dirty="0">
-              <a:latin typeface="Arial" panose="020B0604020202020204" pitchFamily="34" charset="0"/>
-              <a:cs typeface="Arial" panose="020B0604020202020204" pitchFamily="34" charset="0"/>
-            </a:endParaRPr>
           </a:p>
           <a:p>
             <a:pPr>
               <a:buFont typeface="Wingdings" panose="05000000000000000000" pitchFamily="2" charset="2"/>
               <a:buChar char="q"/>
             </a:pPr>
-            <a:endParaRPr lang="nl-NL" dirty="0" smtClean="0"/>
+            <a:endParaRPr lang="nl-NL" dirty="0"/>
           </a:p>
           <a:p>
             <a:pPr>
@@ -26203,6 +25474,12 @@
 </file>
 
 <file path=customXml/item1.xml><?xml version="1.0" encoding="utf-8"?>
+<p:properties xmlns:p="http://schemas.microsoft.com/office/2006/metadata/properties" xmlns:xsi="http://www.w3.org/2001/XMLSchema-instance" xmlns:pc="http://schemas.microsoft.com/office/infopath/2007/PartnerControls">
+  <documentManagement/>
+</p:properties>
+</file>
+
+<file path=customXml/item2.xml><?xml version="1.0" encoding="utf-8"?>
 <?mso-contentType ?>
 <FormTemplates xmlns="http://schemas.microsoft.com/sharepoint/v3/contenttype/forms">
   <Display>DocumentLibraryForm</Display>
@@ -26211,7 +25488,7 @@
 </FormTemplates>
 </file>
 
-<file path=customXml/item2.xml><?xml version="1.0" encoding="utf-8"?>
+<file path=customXml/item3.xml><?xml version="1.0" encoding="utf-8"?>
 <ct:contentTypeSchema xmlns:ct="http://schemas.microsoft.com/office/2006/metadata/contentType" xmlns:ma="http://schemas.microsoft.com/office/2006/metadata/properties/metaAttributes" ct:_="" ma:_="" ma:contentTypeName="Document" ma:contentTypeID="0x010100BEDB9E3990635E489077222A7EA6A8DB" ma:contentTypeVersion="1" ma:contentTypeDescription="Create a new document." ma:contentTypeScope="" ma:versionID="70acdb050635865c6b93f718a306ef46">
   <xsd:schema xmlns:xsd="http://www.w3.org/2001/XMLSchema" xmlns:xs="http://www.w3.org/2001/XMLSchema" xmlns:p="http://schemas.microsoft.com/office/2006/metadata/properties" targetNamespace="http://schemas.microsoft.com/office/2006/metadata/properties" ma:root="true" ma:fieldsID="26e4863383729cb444416dcdc8f5e0bd">
     <xsd:element name="properties">
@@ -26325,13 +25602,16 @@
 </ct:contentTypeSchema>
 </file>
 
-<file path=customXml/item3.xml><?xml version="1.0" encoding="utf-8"?>
-<p:properties xmlns:p="http://schemas.microsoft.com/office/2006/metadata/properties" xmlns:xsi="http://www.w3.org/2001/XMLSchema-instance" xmlns:pc="http://schemas.microsoft.com/office/infopath/2007/PartnerControls">
-  <documentManagement/>
-</p:properties>
+<file path=customXml/itemProps1.xml><?xml version="1.0" encoding="utf-8"?>
+<ds:datastoreItem xmlns:ds="http://schemas.openxmlformats.org/officeDocument/2006/customXml" ds:itemID="{EA66919F-268A-423E-AEF1-C51A642296C1}">
+  <ds:schemaRefs>
+    <ds:schemaRef ds:uri="http://schemas.microsoft.com/office/2006/metadata/properties"/>
+    <ds:schemaRef ds:uri="http://schemas.microsoft.com/office/infopath/2007/PartnerControls"/>
+  </ds:schemaRefs>
+</ds:datastoreItem>
 </file>
 
-<file path=customXml/itemProps1.xml><?xml version="1.0" encoding="utf-8"?>
+<file path=customXml/itemProps2.xml><?xml version="1.0" encoding="utf-8"?>
 <ds:datastoreItem xmlns:ds="http://schemas.openxmlformats.org/officeDocument/2006/customXml" ds:itemID="{24854B25-20DC-4E68-9470-5D51D39ACFC7}">
   <ds:schemaRefs>
     <ds:schemaRef ds:uri="http://schemas.microsoft.com/sharepoint/v3/contenttype/forms"/>
@@ -26339,14 +25619,17 @@
 </ds:datastoreItem>
 </file>
 
-<file path=customXml/itemProps2.xml><?xml version="1.0" encoding="utf-8"?>
-<ds:datastoreItem xmlns:ds="http://schemas.openxmlformats.org/officeDocument/2006/customXml" ds:itemID="{1D55E2B3-2975-41B8-82AD-27BB7E143606}"/>
-</file>
-
 <file path=customXml/itemProps3.xml><?xml version="1.0" encoding="utf-8"?>
-<ds:datastoreItem xmlns:ds="http://schemas.openxmlformats.org/officeDocument/2006/customXml" ds:itemID="{EA66919F-268A-423E-AEF1-C51A642296C1}">
+<ds:datastoreItem xmlns:ds="http://schemas.openxmlformats.org/officeDocument/2006/customXml" ds:itemID="{1D55E2B3-2975-41B8-82AD-27BB7E143606}">
   <ds:schemaRefs>
+    <ds:schemaRef ds:uri="http://schemas.microsoft.com/office/2006/metadata/contentType"/>
+    <ds:schemaRef ds:uri="http://schemas.microsoft.com/office/2006/metadata/properties/metaAttributes"/>
+    <ds:schemaRef ds:uri="http://www.w3.org/2001/XMLSchema"/>
     <ds:schemaRef ds:uri="http://schemas.microsoft.com/office/2006/metadata/properties"/>
+    <ds:schemaRef ds:uri="http://schemas.openxmlformats.org/package/2006/metadata/core-properties"/>
+    <ds:schemaRef ds:uri="http://purl.org/dc/elements/1.1/"/>
+    <ds:schemaRef ds:uri="http://purl.org/dc/terms/"/>
+    <ds:schemaRef ds:uri="http://schemas.microsoft.com/internal/obd"/>
     <ds:schemaRef ds:uri="http://schemas.microsoft.com/office/infopath/2007/PartnerControls"/>
   </ds:schemaRefs>
 </ds:datastoreItem>

</xml_diff>

<commit_message>
Gamma Rules for @ | ~! + Initial Test
</commit_message>
<xml_diff>
--- a/Documents/Slides/Week 6 - Semantic Tabeloux .pptx
+++ b/Documents/Slides/Week 6 - Semantic Tabeloux .pptx
@@ -312,7 +312,7 @@
               <a:pPr>
                 <a:defRPr/>
               </a:pPr>
-              <a:t>25-6-2020</a:t>
+              <a:t>26-6-2020</a:t>
             </a:fld>
             <a:endParaRPr lang="nl-NL"/>
           </a:p>
@@ -563,7 +563,7 @@
               <a:pPr>
                 <a:defRPr/>
               </a:pPr>
-              <a:t>25-6-2020</a:t>
+              <a:t>26-6-2020</a:t>
             </a:fld>
             <a:endParaRPr lang="en-US"/>
           </a:p>
@@ -1337,7 +1337,7 @@
                   <a:spcPct val="0"/>
                 </a:spcBef>
               </a:pPr>
-              <a:t>25-6-2020</a:t>
+              <a:t>26-6-2020</a:t>
             </a:fld>
             <a:endParaRPr lang="en-US" altLang="nl-NL"/>
           </a:p>
@@ -1844,7 +1844,7 @@
               <a:pPr>
                 <a:defRPr/>
               </a:pPr>
-              <a:t>25-6-2020</a:t>
+              <a:t>26-6-2020</a:t>
             </a:fld>
             <a:endParaRPr lang="en-US"/>
           </a:p>
@@ -2141,7 +2141,7 @@
               <a:pPr>
                 <a:defRPr/>
               </a:pPr>
-              <a:t>25-6-2020</a:t>
+              <a:t>26-6-2020</a:t>
             </a:fld>
             <a:endParaRPr lang="en-US"/>
           </a:p>
@@ -2376,7 +2376,7 @@
               <a:pPr>
                 <a:defRPr/>
               </a:pPr>
-              <a:t>25-6-2020</a:t>
+              <a:t>26-6-2020</a:t>
             </a:fld>
             <a:endParaRPr lang="en-US"/>
           </a:p>

</xml_diff>